<commit_message>
Adds section on GassyFS
Fixes #52 fixes #64
</commit_message>
<xml_diff>
--- a/paper/figures/diagrams.pptx
+++ b/paper/figures/diagrams.pptx
@@ -1408,7 +1408,7 @@
                 </a:solidFill>
               </a:rPr>
               <a:pPr/>
-              <a:t>7/17/16</a:t>
+              <a:t>8/11/16</a:t>
             </a:fld>
             <a:endParaRPr lang="en-US">
               <a:solidFill>
@@ -1610,7 +1610,7 @@
                 </a:solidFill>
               </a:rPr>
               <a:pPr/>
-              <a:t>7/17/16</a:t>
+              <a:t>8/11/16</a:t>
             </a:fld>
             <a:endParaRPr lang="en-US">
               <a:solidFill>
@@ -1888,7 +1888,7 @@
                 </a:solidFill>
               </a:rPr>
               <a:pPr/>
-              <a:t>7/17/16</a:t>
+              <a:t>8/11/16</a:t>
             </a:fld>
             <a:endParaRPr lang="en-US">
               <a:solidFill>
@@ -2208,7 +2208,7 @@
                 </a:solidFill>
               </a:rPr>
               <a:pPr/>
-              <a:t>7/17/16</a:t>
+              <a:t>8/11/16</a:t>
             </a:fld>
             <a:endParaRPr lang="en-US">
               <a:solidFill>
@@ -2662,7 +2662,7 @@
                 </a:solidFill>
               </a:rPr>
               <a:pPr/>
-              <a:t>7/17/16</a:t>
+              <a:t>8/11/16</a:t>
             </a:fld>
             <a:endParaRPr lang="en-US">
               <a:solidFill>
@@ -2812,7 +2812,7 @@
                 </a:solidFill>
               </a:rPr>
               <a:pPr/>
-              <a:t>7/17/16</a:t>
+              <a:t>8/11/16</a:t>
             </a:fld>
             <a:endParaRPr lang="en-US">
               <a:solidFill>
@@ -2939,7 +2939,7 @@
                 </a:solidFill>
               </a:rPr>
               <a:pPr/>
-              <a:t>7/17/16</a:t>
+              <a:t>8/11/16</a:t>
             </a:fld>
             <a:endParaRPr lang="en-US">
               <a:solidFill>
@@ -3248,7 +3248,7 @@
                 </a:solidFill>
               </a:rPr>
               <a:pPr/>
-              <a:t>7/17/16</a:t>
+              <a:t>8/11/16</a:t>
             </a:fld>
             <a:endParaRPr lang="en-US">
               <a:solidFill>
@@ -3687,7 +3687,7 @@
                 </a:solidFill>
               </a:rPr>
               <a:pPr/>
-              <a:t>7/17/16</a:t>
+              <a:t>8/11/16</a:t>
             </a:fld>
             <a:endParaRPr lang="en-US">
               <a:solidFill>
@@ -3889,7 +3889,7 @@
                 </a:solidFill>
               </a:rPr>
               <a:pPr/>
-              <a:t>7/17/16</a:t>
+              <a:t>8/11/16</a:t>
             </a:fld>
             <a:endParaRPr lang="en-US">
               <a:solidFill>
@@ -4101,7 +4101,7 @@
                 </a:solidFill>
               </a:rPr>
               <a:pPr/>
-              <a:t>7/17/16</a:t>
+              <a:t>8/11/16</a:t>
             </a:fld>
             <a:endParaRPr lang="en-US">
               <a:solidFill>
@@ -6862,7 +6862,7 @@
                 <a:ea typeface="+mn-ea"/>
               </a:rPr>
               <a:pPr defTabSz="2194560"/>
-              <a:t>7/17/16</a:t>
+              <a:t>8/11/16</a:t>
             </a:fld>
             <a:endParaRPr lang="en-US" kern="1200">
               <a:solidFill>
@@ -9305,7 +9305,7 @@
             </a:avLst>
           </a:prstGeom>
           <a:noFill/>
-          <a:ln w="28575" cap="flat" cmpd="sng">
+          <a:ln w="127000" cap="flat" cmpd="sng">
             <a:solidFill>
               <a:srgbClr val="595959"/>
             </a:solidFill>
@@ -9333,7 +9333,7 @@
             </a:avLst>
           </a:prstGeom>
           <a:noFill/>
-          <a:ln w="28575" cap="flat" cmpd="sng">
+          <a:ln w="127000" cap="flat" cmpd="sng">
             <a:solidFill>
               <a:srgbClr val="595959"/>
             </a:solidFill>
@@ -9361,7 +9361,7 @@
             </a:avLst>
           </a:prstGeom>
           <a:noFill/>
-          <a:ln w="28575" cap="flat" cmpd="sng">
+          <a:ln w="127000" cap="flat" cmpd="sng">
             <a:solidFill>
               <a:srgbClr val="595959"/>
             </a:solidFill>
@@ -9813,7 +9813,7 @@
               <a:avLst/>
             </a:prstGeom>
             <a:noFill/>
-            <a:ln w="28575" cap="flat" cmpd="sng">
+            <a:ln w="127000" cap="flat" cmpd="sng">
               <a:solidFill>
                 <a:srgbClr val="595959"/>
               </a:solidFill>
@@ -9842,7 +9842,7 @@
               <a:avLst/>
             </a:prstGeom>
             <a:noFill/>
-            <a:ln w="28575" cap="flat" cmpd="sng">
+            <a:ln w="127000" cap="flat" cmpd="sng">
               <a:solidFill>
                 <a:srgbClr val="595959"/>
               </a:solidFill>
@@ -9871,7 +9871,7 @@
               <a:avLst/>
             </a:prstGeom>
             <a:noFill/>
-            <a:ln w="28575" cap="flat" cmpd="sng">
+            <a:ln w="127000" cap="flat" cmpd="sng">
               <a:solidFill>
                 <a:srgbClr val="595959"/>
               </a:solidFill>
@@ -9900,7 +9900,7 @@
               <a:avLst/>
             </a:prstGeom>
             <a:noFill/>
-            <a:ln w="28575" cap="flat" cmpd="sng">
+            <a:ln w="127000" cap="flat" cmpd="sng">
               <a:solidFill>
                 <a:srgbClr val="595959"/>
               </a:solidFill>
@@ -9929,7 +9929,7 @@
               <a:avLst/>
             </a:prstGeom>
             <a:noFill/>
-            <a:ln w="28575" cap="flat" cmpd="sng">
+            <a:ln w="127000" cap="flat" cmpd="sng">
               <a:solidFill>
                 <a:srgbClr val="595959"/>
               </a:solidFill>
@@ -9958,7 +9958,7 @@
               <a:avLst/>
             </a:prstGeom>
             <a:noFill/>
-            <a:ln w="28575" cap="flat" cmpd="sng">
+            <a:ln w="127000" cap="flat" cmpd="sng">
               <a:solidFill>
                 <a:srgbClr val="595959"/>
               </a:solidFill>
@@ -9990,7 +9990,7 @@
             </a:avLst>
           </a:prstGeom>
           <a:noFill/>
-          <a:ln w="28575" cap="flat" cmpd="sng">
+          <a:ln w="127000" cap="flat" cmpd="sng">
             <a:solidFill>
               <a:srgbClr val="595959"/>
             </a:solidFill>
@@ -10021,7 +10021,7 @@
             </a:avLst>
           </a:prstGeom>
           <a:noFill/>
-          <a:ln w="28575" cap="flat" cmpd="sng">
+          <a:ln w="127000" cap="flat" cmpd="sng">
             <a:solidFill>
               <a:srgbClr val="595959"/>
             </a:solidFill>
@@ -10052,7 +10052,7 @@
             </a:avLst>
           </a:prstGeom>
           <a:noFill/>
-          <a:ln w="28575" cap="flat" cmpd="sng">
+          <a:ln w="127000" cap="flat" cmpd="sng">
             <a:solidFill>
               <a:srgbClr val="595959"/>
             </a:solidFill>
@@ -10065,69 +10065,24 @@
       </p:cxnSp>
       <p:sp>
         <p:nvSpPr>
-          <p:cNvPr id="22" name="Shape 66"/>
+          <p:cNvPr id="23" name="Shape 66"/>
           <p:cNvSpPr/>
           <p:nvPr/>
         </p:nvSpPr>
         <p:spPr>
           <a:xfrm>
-            <a:off x="247440" y="-2158585"/>
-            <a:ext cx="43580160" cy="14934041"/>
+            <a:off x="233150" y="26252988"/>
+            <a:ext cx="43580160" cy="15843346"/>
           </a:xfrm>
           <a:prstGeom prst="rect">
             <a:avLst/>
           </a:prstGeom>
           <a:noFill/>
-          <a:ln w="28575" cap="flat" cmpd="sng">
+          <a:ln w="127000" cap="flat" cmpd="sng">
             <a:solidFill>
               <a:srgbClr val="595959"/>
             </a:solidFill>
-            <a:prstDash val="dash"/>
-            <a:round/>
-            <a:headEnd type="none" w="med" len="med"/>
-            <a:tailEnd type="none" w="med" len="med"/>
-          </a:ln>
-        </p:spPr>
-        <p:txBody>
-          <a:bodyPr lIns="438768" tIns="438768" rIns="438768" bIns="438768" anchor="b" anchorCtr="0">
-            <a:noAutofit/>
-          </a:bodyPr>
-          <a:lstStyle/>
-          <a:p>
-            <a:pPr defTabSz="4388419">
-              <a:defRPr/>
-            </a:pPr>
-            <a:endParaRPr sz="4800">
-              <a:solidFill>
-                <a:sysClr val="windowText" lastClr="000000"/>
-              </a:solidFill>
-              <a:latin typeface="Calibri"/>
-              <a:ea typeface="+mn-ea"/>
-              <a:cs typeface="+mn-cs"/>
-            </a:endParaRPr>
-          </a:p>
-        </p:txBody>
-      </p:sp>
-      <p:sp>
-        <p:nvSpPr>
-          <p:cNvPr id="23" name="Shape 66"/>
-          <p:cNvSpPr/>
-          <p:nvPr/>
-        </p:nvSpPr>
-        <p:spPr>
-          <a:xfrm>
-            <a:off x="233150" y="26252988"/>
-            <a:ext cx="43580160" cy="15843346"/>
-          </a:xfrm>
-          <a:prstGeom prst="rect">
-            <a:avLst/>
-          </a:prstGeom>
-          <a:noFill/>
-          <a:ln w="28575" cap="flat" cmpd="sng">
-            <a:solidFill>
-              <a:srgbClr val="595959"/>
-            </a:solidFill>
-            <a:prstDash val="dash"/>
+            <a:prstDash val="sysDash"/>
             <a:round/>
             <a:headEnd type="none" w="med" len="med"/>
             <a:tailEnd type="none" w="med" len="med"/>
@@ -10594,7 +10549,7 @@
               <a:avLst/>
             </a:prstGeom>
             <a:noFill/>
-            <a:ln w="28575" cap="flat" cmpd="sng">
+            <a:ln w="127000" cap="flat" cmpd="sng">
               <a:solidFill>
                 <a:srgbClr val="595959"/>
               </a:solidFill>
@@ -10623,7 +10578,7 @@
               <a:avLst/>
             </a:prstGeom>
             <a:noFill/>
-            <a:ln w="28575" cap="flat" cmpd="sng">
+            <a:ln w="127000" cap="flat" cmpd="sng">
               <a:solidFill>
                 <a:srgbClr val="595959"/>
               </a:solidFill>
@@ -10652,7 +10607,7 @@
               <a:avLst/>
             </a:prstGeom>
             <a:noFill/>
-            <a:ln w="28575" cap="flat" cmpd="sng">
+            <a:ln w="127000" cap="flat" cmpd="sng">
               <a:solidFill>
                 <a:srgbClr val="595959"/>
               </a:solidFill>
@@ -10681,7 +10636,7 @@
               <a:avLst/>
             </a:prstGeom>
             <a:noFill/>
-            <a:ln w="28575" cap="flat" cmpd="sng">
+            <a:ln w="127000" cap="flat" cmpd="sng">
               <a:solidFill>
                 <a:srgbClr val="595959"/>
               </a:solidFill>
@@ -10710,7 +10665,7 @@
               <a:avLst/>
             </a:prstGeom>
             <a:noFill/>
-            <a:ln w="28575" cap="flat" cmpd="sng">
+            <a:ln w="127000" cap="flat" cmpd="sng">
               <a:solidFill>
                 <a:srgbClr val="595959"/>
               </a:solidFill>
@@ -10739,7 +10694,7 @@
               <a:avLst/>
             </a:prstGeom>
             <a:noFill/>
-            <a:ln w="28575" cap="flat" cmpd="sng">
+            <a:ln w="127000" cap="flat" cmpd="sng">
               <a:solidFill>
                 <a:srgbClr val="595959"/>
               </a:solidFill>
@@ -10766,11 +10721,11 @@
             <a:avLst/>
           </a:prstGeom>
           <a:noFill/>
-          <a:ln w="9525" cap="flat" cmpd="sng">
+          <a:ln w="127000" cap="flat" cmpd="sng">
             <a:solidFill>
               <a:srgbClr val="595959"/>
             </a:solidFill>
-            <a:prstDash val="dot"/>
+            <a:prstDash val="sysDash"/>
             <a:round/>
             <a:headEnd type="none" w="med" len="med"/>
             <a:tailEnd type="none" w="med" len="med"/>
@@ -10811,11 +10766,11 @@
             <a:avLst/>
           </a:prstGeom>
           <a:noFill/>
-          <a:ln w="9525" cap="flat" cmpd="sng">
+          <a:ln w="127000" cap="flat" cmpd="sng">
             <a:solidFill>
               <a:srgbClr val="595959"/>
             </a:solidFill>
-            <a:prstDash val="dot"/>
+            <a:prstDash val="sysDash"/>
             <a:round/>
             <a:headEnd type="none" w="med" len="med"/>
             <a:tailEnd type="none" w="med" len="med"/>
@@ -10883,11 +10838,11 @@
             <a:avLst/>
           </a:prstGeom>
           <a:noFill/>
-          <a:ln w="9525" cap="flat" cmpd="sng">
+          <a:ln w="127000" cap="flat" cmpd="sng">
             <a:solidFill>
               <a:srgbClr val="595959"/>
             </a:solidFill>
-            <a:prstDash val="dot"/>
+            <a:prstDash val="sysDash"/>
             <a:round/>
             <a:headEnd type="none" w="med" len="med"/>
             <a:tailEnd type="none" w="med" len="med"/>
@@ -10967,11 +10922,11 @@
             <a:avLst/>
           </a:prstGeom>
           <a:noFill/>
-          <a:ln w="9525" cap="flat" cmpd="sng">
+          <a:ln w="127000" cap="flat" cmpd="sng">
             <a:solidFill>
               <a:srgbClr val="595959"/>
             </a:solidFill>
-            <a:prstDash val="dot"/>
+            <a:prstDash val="sysDash"/>
             <a:round/>
             <a:headEnd type="none" w="med" len="med"/>
             <a:tailEnd type="none" w="med" len="med"/>
@@ -11067,11 +11022,11 @@
             <a:avLst/>
           </a:prstGeom>
           <a:noFill/>
-          <a:ln w="9525" cap="flat" cmpd="sng">
+          <a:ln w="127000" cap="flat" cmpd="sng">
             <a:solidFill>
               <a:srgbClr val="595959"/>
             </a:solidFill>
-            <a:prstDash val="dot"/>
+            <a:prstDash val="sysDash"/>
             <a:round/>
             <a:headEnd type="none" w="med" len="med"/>
             <a:tailEnd type="none" w="med" len="med"/>
@@ -11112,11 +11067,11 @@
             <a:avLst/>
           </a:prstGeom>
           <a:noFill/>
-          <a:ln w="9525" cap="flat" cmpd="sng">
+          <a:ln w="127000" cap="flat" cmpd="sng">
             <a:solidFill>
               <a:srgbClr val="595959"/>
             </a:solidFill>
-            <a:prstDash val="dot"/>
+            <a:prstDash val="sysDash"/>
             <a:round/>
             <a:headEnd type="none" w="med" len="med"/>
             <a:tailEnd type="none" w="med" len="med"/>
@@ -11185,11 +11140,11 @@
             <a:avLst/>
           </a:prstGeom>
           <a:noFill/>
-          <a:ln w="9525" cap="flat" cmpd="sng">
+          <a:ln w="127000" cap="flat" cmpd="sng">
             <a:solidFill>
               <a:srgbClr val="595959"/>
             </a:solidFill>
-            <a:prstDash val="dot"/>
+            <a:prstDash val="sysDash"/>
             <a:round/>
             <a:headEnd type="none" w="med" len="med"/>
             <a:tailEnd type="none" w="med" len="med"/>
@@ -11964,6 +11919,54 @@
           </a:prstGeom>
         </p:spPr>
       </p:pic>
+      <p:sp>
+        <p:nvSpPr>
+          <p:cNvPr id="21" name="Rounded Rectangular Callout 20"/>
+          <p:cNvSpPr/>
+          <p:nvPr/>
+        </p:nvSpPr>
+        <p:spPr>
+          <a:xfrm>
+            <a:off x="20016809" y="14579600"/>
+            <a:ext cx="22604391" cy="10449272"/>
+          </a:xfrm>
+          <a:prstGeom prst="wedgeRoundRectCallout">
+            <a:avLst>
+              <a:gd name="adj1" fmla="val 43474"/>
+              <a:gd name="adj2" fmla="val 60233"/>
+              <a:gd name="adj3" fmla="val 16667"/>
+            </a:avLst>
+          </a:prstGeom>
+          <a:noFill/>
+          <a:ln>
+            <a:solidFill>
+              <a:schemeClr val="tx1"/>
+            </a:solidFill>
+          </a:ln>
+        </p:spPr>
+        <p:style>
+          <a:lnRef idx="1">
+            <a:schemeClr val="accent1"/>
+          </a:lnRef>
+          <a:fillRef idx="3">
+            <a:schemeClr val="accent1"/>
+          </a:fillRef>
+          <a:effectRef idx="2">
+            <a:schemeClr val="accent1"/>
+          </a:effectRef>
+          <a:fontRef idx="minor">
+            <a:schemeClr val="lt1"/>
+          </a:fontRef>
+        </p:style>
+        <p:txBody>
+          <a:bodyPr rtlCol="0" anchor="ctr"/>
+          <a:lstStyle/>
+          <a:p>
+            <a:pPr algn="ctr"/>
+            <a:endParaRPr lang="en-US"/>
+          </a:p>
+        </p:txBody>
+      </p:sp>
     </p:spTree>
     <p:extLst>
       <p:ext uri="{BB962C8B-B14F-4D97-AF65-F5344CB8AC3E}">
@@ -12075,21 +12078,39 @@
                                   </p:childTnLst>
                                 </p:cTn>
                               </p:par>
+                            </p:childTnLst>
+                          </p:cTn>
+                        </p:par>
+                      </p:childTnLst>
+                    </p:cTn>
+                  </p:par>
+                  <p:par>
+                    <p:cTn id="11" fill="hold">
+                      <p:stCondLst>
+                        <p:cond delay="indefinite"/>
+                      </p:stCondLst>
+                      <p:childTnLst>
+                        <p:par>
+                          <p:cTn id="12" fill="hold">
+                            <p:stCondLst>
+                              <p:cond delay="0"/>
+                            </p:stCondLst>
+                            <p:childTnLst>
                               <p:par>
-                                <p:cTn id="11" presetID="1" presetClass="entr" presetSubtype="0" fill="hold" grpId="0" nodeType="withEffect">
+                                <p:cTn id="13" presetID="1" presetClass="entr" presetSubtype="0" fill="hold" grpId="0" nodeType="clickEffect">
                                   <p:stCondLst>
                                     <p:cond delay="0"/>
                                   </p:stCondLst>
                                   <p:childTnLst>
                                     <p:set>
                                       <p:cBhvr>
-                                        <p:cTn id="12" dur="1" fill="hold">
+                                        <p:cTn id="14" dur="1" fill="hold">
                                           <p:stCondLst>
                                             <p:cond delay="0"/>
                                           </p:stCondLst>
                                         </p:cTn>
                                         <p:tgtEl>
-                                          <p:spTgt spid="22"/>
+                                          <p:spTgt spid="38"/>
                                         </p:tgtEl>
                                         <p:attrNameLst>
                                           <p:attrName>style.visibility</p:attrName>
@@ -12103,20 +12124,20 @@
                                 </p:cTn>
                               </p:par>
                               <p:par>
-                                <p:cTn id="13" presetID="1" presetClass="entr" presetSubtype="0" fill="hold" grpId="1" nodeType="withEffect">
+                                <p:cTn id="15" presetID="1" presetClass="entr" presetSubtype="0" fill="hold" grpId="0" nodeType="withEffect">
                                   <p:stCondLst>
                                     <p:cond delay="0"/>
                                   </p:stCondLst>
                                   <p:childTnLst>
                                     <p:set>
                                       <p:cBhvr>
-                                        <p:cTn id="14" dur="1" fill="hold">
+                                        <p:cTn id="16" dur="1" fill="hold">
                                           <p:stCondLst>
                                             <p:cond delay="0"/>
                                           </p:stCondLst>
                                         </p:cTn>
                                         <p:tgtEl>
-                                          <p:spTgt spid="22"/>
+                                          <p:spTgt spid="39"/>
                                         </p:tgtEl>
                                         <p:attrNameLst>
                                           <p:attrName>style.visibility</p:attrName>
@@ -12129,26 +12150,8 @@
                                   </p:childTnLst>
                                 </p:cTn>
                               </p:par>
-                            </p:childTnLst>
-                          </p:cTn>
-                        </p:par>
-                      </p:childTnLst>
-                    </p:cTn>
-                  </p:par>
-                  <p:par>
-                    <p:cTn id="15" fill="hold">
-                      <p:stCondLst>
-                        <p:cond delay="indefinite"/>
-                      </p:stCondLst>
-                      <p:childTnLst>
-                        <p:par>
-                          <p:cTn id="16" fill="hold">
-                            <p:stCondLst>
-                              <p:cond delay="0"/>
-                            </p:stCondLst>
-                            <p:childTnLst>
                               <p:par>
-                                <p:cTn id="17" presetID="1" presetClass="entr" presetSubtype="0" fill="hold" grpId="0" nodeType="clickEffect">
+                                <p:cTn id="17" presetID="1" presetClass="entr" presetSubtype="0" fill="hold" nodeType="withEffect">
                                   <p:stCondLst>
                                     <p:cond delay="0"/>
                                   </p:stCondLst>
@@ -12161,7 +12164,7 @@
                                           </p:stCondLst>
                                         </p:cTn>
                                         <p:tgtEl>
-                                          <p:spTgt spid="38"/>
+                                          <p:spTgt spid="40"/>
                                         </p:tgtEl>
                                         <p:attrNameLst>
                                           <p:attrName>style.visibility</p:attrName>
@@ -12188,7 +12191,7 @@
                                           </p:stCondLst>
                                         </p:cTn>
                                         <p:tgtEl>
-                                          <p:spTgt spid="39"/>
+                                          <p:spTgt spid="41"/>
                                         </p:tgtEl>
                                         <p:attrNameLst>
                                           <p:attrName>style.visibility</p:attrName>
@@ -12215,7 +12218,7 @@
                                           </p:stCondLst>
                                         </p:cTn>
                                         <p:tgtEl>
-                                          <p:spTgt spid="40"/>
+                                          <p:spTgt spid="42"/>
                                         </p:tgtEl>
                                         <p:attrNameLst>
                                           <p:attrName>style.visibility</p:attrName>
@@ -12242,7 +12245,7 @@
                                           </p:stCondLst>
                                         </p:cTn>
                                         <p:tgtEl>
-                                          <p:spTgt spid="41"/>
+                                          <p:spTgt spid="43"/>
                                         </p:tgtEl>
                                         <p:attrNameLst>
                                           <p:attrName>style.visibility</p:attrName>
@@ -12269,60 +12272,6 @@
                                           </p:stCondLst>
                                         </p:cTn>
                                         <p:tgtEl>
-                                          <p:spTgt spid="42"/>
-                                        </p:tgtEl>
-                                        <p:attrNameLst>
-                                          <p:attrName>style.visibility</p:attrName>
-                                        </p:attrNameLst>
-                                      </p:cBhvr>
-                                      <p:to>
-                                        <p:strVal val="visible"/>
-                                      </p:to>
-                                    </p:set>
-                                  </p:childTnLst>
-                                </p:cTn>
-                              </p:par>
-                              <p:par>
-                                <p:cTn id="27" presetID="1" presetClass="entr" presetSubtype="0" fill="hold" grpId="0" nodeType="withEffect">
-                                  <p:stCondLst>
-                                    <p:cond delay="0"/>
-                                  </p:stCondLst>
-                                  <p:childTnLst>
-                                    <p:set>
-                                      <p:cBhvr>
-                                        <p:cTn id="28" dur="1" fill="hold">
-                                          <p:stCondLst>
-                                            <p:cond delay="0"/>
-                                          </p:stCondLst>
-                                        </p:cTn>
-                                        <p:tgtEl>
-                                          <p:spTgt spid="43"/>
-                                        </p:tgtEl>
-                                        <p:attrNameLst>
-                                          <p:attrName>style.visibility</p:attrName>
-                                        </p:attrNameLst>
-                                      </p:cBhvr>
-                                      <p:to>
-                                        <p:strVal val="visible"/>
-                                      </p:to>
-                                    </p:set>
-                                  </p:childTnLst>
-                                </p:cTn>
-                              </p:par>
-                              <p:par>
-                                <p:cTn id="29" presetID="1" presetClass="entr" presetSubtype="0" fill="hold" nodeType="withEffect">
-                                  <p:stCondLst>
-                                    <p:cond delay="0"/>
-                                  </p:stCondLst>
-                                  <p:childTnLst>
-                                    <p:set>
-                                      <p:cBhvr>
-                                        <p:cTn id="30" dur="1" fill="hold">
-                                          <p:stCondLst>
-                                            <p:cond delay="0"/>
-                                          </p:stCondLst>
-                                        </p:cTn>
-                                        <p:tgtEl>
                                           <p:spTgt spid="44"/>
                                         </p:tgtEl>
                                         <p:attrNameLst>
@@ -12337,14 +12286,14 @@
                                 </p:cTn>
                               </p:par>
                               <p:par>
-                                <p:cTn id="31" presetID="1" presetClass="entr" presetSubtype="0" fill="hold" nodeType="withEffect">
+                                <p:cTn id="27" presetID="1" presetClass="entr" presetSubtype="0" fill="hold" nodeType="withEffect">
                                   <p:stCondLst>
                                     <p:cond delay="0"/>
                                   </p:stCondLst>
                                   <p:childTnLst>
                                     <p:set>
                                       <p:cBhvr>
-                                        <p:cTn id="32" dur="1" fill="hold">
+                                        <p:cTn id="28" dur="1" fill="hold">
                                           <p:stCondLst>
                                             <p:cond delay="0"/>
                                           </p:stCondLst>
@@ -12364,7 +12313,61 @@
                                 </p:cTn>
                               </p:par>
                               <p:par>
-                                <p:cTn id="33" presetID="1" presetClass="entr" presetSubtype="0" fill="hold" grpId="0" nodeType="withEffect">
+                                <p:cTn id="29" presetID="1" presetClass="entr" presetSubtype="0" fill="hold" grpId="0" nodeType="withEffect">
+                                  <p:stCondLst>
+                                    <p:cond delay="0"/>
+                                  </p:stCondLst>
+                                  <p:childTnLst>
+                                    <p:set>
+                                      <p:cBhvr>
+                                        <p:cTn id="30" dur="1" fill="hold">
+                                          <p:stCondLst>
+                                            <p:cond delay="0"/>
+                                          </p:stCondLst>
+                                        </p:cTn>
+                                        <p:tgtEl>
+                                          <p:spTgt spid="46"/>
+                                        </p:tgtEl>
+                                        <p:attrNameLst>
+                                          <p:attrName>style.visibility</p:attrName>
+                                        </p:attrNameLst>
+                                      </p:cBhvr>
+                                      <p:to>
+                                        <p:strVal val="visible"/>
+                                      </p:to>
+                                    </p:set>
+                                  </p:childTnLst>
+                                </p:cTn>
+                              </p:par>
+                              <p:par>
+                                <p:cTn id="31" presetID="1" presetClass="entr" presetSubtype="0" fill="hold" grpId="0" nodeType="withEffect">
+                                  <p:stCondLst>
+                                    <p:cond delay="0"/>
+                                  </p:stCondLst>
+                                  <p:childTnLst>
+                                    <p:set>
+                                      <p:cBhvr>
+                                        <p:cTn id="32" dur="1" fill="hold">
+                                          <p:stCondLst>
+                                            <p:cond delay="0"/>
+                                          </p:stCondLst>
+                                        </p:cTn>
+                                        <p:tgtEl>
+                                          <p:spTgt spid="47"/>
+                                        </p:tgtEl>
+                                        <p:attrNameLst>
+                                          <p:attrName>style.visibility</p:attrName>
+                                        </p:attrNameLst>
+                                      </p:cBhvr>
+                                      <p:to>
+                                        <p:strVal val="visible"/>
+                                      </p:to>
+                                    </p:set>
+                                  </p:childTnLst>
+                                </p:cTn>
+                              </p:par>
+                              <p:par>
+                                <p:cTn id="33" presetID="1" presetClass="entr" presetSubtype="0" fill="hold" nodeType="withEffect">
                                   <p:stCondLst>
                                     <p:cond delay="0"/>
                                   </p:stCondLst>
@@ -12377,7 +12380,7 @@
                                           </p:stCondLst>
                                         </p:cTn>
                                         <p:tgtEl>
-                                          <p:spTgt spid="46"/>
+                                          <p:spTgt spid="48"/>
                                         </p:tgtEl>
                                         <p:attrNameLst>
                                           <p:attrName>style.visibility</p:attrName>
@@ -12404,7 +12407,7 @@
                                           </p:stCondLst>
                                         </p:cTn>
                                         <p:tgtEl>
-                                          <p:spTgt spid="47"/>
+                                          <p:spTgt spid="49"/>
                                         </p:tgtEl>
                                         <p:attrNameLst>
                                           <p:attrName>style.visibility</p:attrName>
@@ -12431,7 +12434,7 @@
                                           </p:stCondLst>
                                         </p:cTn>
                                         <p:tgtEl>
-                                          <p:spTgt spid="48"/>
+                                          <p:spTgt spid="50"/>
                                         </p:tgtEl>
                                         <p:attrNameLst>
                                           <p:attrName>style.visibility</p:attrName>
@@ -12445,7 +12448,7 @@
                                 </p:cTn>
                               </p:par>
                               <p:par>
-                                <p:cTn id="39" presetID="1" presetClass="entr" presetSubtype="0" fill="hold" grpId="0" nodeType="withEffect">
+                                <p:cTn id="39" presetID="1" presetClass="entr" presetSubtype="0" fill="hold" nodeType="withEffect">
                                   <p:stCondLst>
                                     <p:cond delay="0"/>
                                   </p:stCondLst>
@@ -12458,7 +12461,7 @@
                                           </p:stCondLst>
                                         </p:cTn>
                                         <p:tgtEl>
-                                          <p:spTgt spid="49"/>
+                                          <p:spTgt spid="51"/>
                                         </p:tgtEl>
                                         <p:attrNameLst>
                                           <p:attrName>style.visibility</p:attrName>
@@ -12485,7 +12488,7 @@
                                           </p:stCondLst>
                                         </p:cTn>
                                         <p:tgtEl>
-                                          <p:spTgt spid="50"/>
+                                          <p:spTgt spid="53"/>
                                         </p:tgtEl>
                                         <p:attrNameLst>
                                           <p:attrName>style.visibility</p:attrName>
@@ -12512,7 +12515,7 @@
                                           </p:stCondLst>
                                         </p:cTn>
                                         <p:tgtEl>
-                                          <p:spTgt spid="51"/>
+                                          <p:spTgt spid="54"/>
                                         </p:tgtEl>
                                         <p:attrNameLst>
                                           <p:attrName>style.visibility</p:attrName>
@@ -12539,7 +12542,7 @@
                                           </p:stCondLst>
                                         </p:cTn>
                                         <p:tgtEl>
-                                          <p:spTgt spid="53"/>
+                                          <p:spTgt spid="55"/>
                                         </p:tgtEl>
                                         <p:attrNameLst>
                                           <p:attrName>style.visibility</p:attrName>
@@ -12566,7 +12569,7 @@
                                           </p:stCondLst>
                                         </p:cTn>
                                         <p:tgtEl>
-                                          <p:spTgt spid="54"/>
+                                          <p:spTgt spid="56"/>
                                         </p:tgtEl>
                                         <p:attrNameLst>
                                           <p:attrName>style.visibility</p:attrName>
@@ -12593,7 +12596,7 @@
                                           </p:stCondLst>
                                         </p:cTn>
                                         <p:tgtEl>
-                                          <p:spTgt spid="55"/>
+                                          <p:spTgt spid="57"/>
                                         </p:tgtEl>
                                         <p:attrNameLst>
                                           <p:attrName>style.visibility</p:attrName>
@@ -12620,7 +12623,7 @@
                                           </p:stCondLst>
                                         </p:cTn>
                                         <p:tgtEl>
-                                          <p:spTgt spid="56"/>
+                                          <p:spTgt spid="58"/>
                                         </p:tgtEl>
                                         <p:attrNameLst>
                                           <p:attrName>style.visibility</p:attrName>
@@ -12647,7 +12650,7 @@
                                           </p:stCondLst>
                                         </p:cTn>
                                         <p:tgtEl>
-                                          <p:spTgt spid="57"/>
+                                          <p:spTgt spid="59"/>
                                         </p:tgtEl>
                                         <p:attrNameLst>
                                           <p:attrName>style.visibility</p:attrName>
@@ -12674,7 +12677,7 @@
                                           </p:stCondLst>
                                         </p:cTn>
                                         <p:tgtEl>
-                                          <p:spTgt spid="58"/>
+                                          <p:spTgt spid="60"/>
                                         </p:tgtEl>
                                         <p:attrNameLst>
                                           <p:attrName>style.visibility</p:attrName>
@@ -12701,7 +12704,7 @@
                                           </p:stCondLst>
                                         </p:cTn>
                                         <p:tgtEl>
-                                          <p:spTgt spid="59"/>
+                                          <p:spTgt spid="61"/>
                                         </p:tgtEl>
                                         <p:attrNameLst>
                                           <p:attrName>style.visibility</p:attrName>
@@ -12728,7 +12731,7 @@
                                           </p:stCondLst>
                                         </p:cTn>
                                         <p:tgtEl>
-                                          <p:spTgt spid="60"/>
+                                          <p:spTgt spid="64"/>
                                         </p:tgtEl>
                                         <p:attrNameLst>
                                           <p:attrName>style.visibility</p:attrName>
@@ -12755,7 +12758,7 @@
                                           </p:stCondLst>
                                         </p:cTn>
                                         <p:tgtEl>
-                                          <p:spTgt spid="61"/>
+                                          <p:spTgt spid="65"/>
                                         </p:tgtEl>
                                         <p:attrNameLst>
                                           <p:attrName>style.visibility</p:attrName>
@@ -12782,7 +12785,7 @@
                                           </p:stCondLst>
                                         </p:cTn>
                                         <p:tgtEl>
-                                          <p:spTgt spid="64"/>
+                                          <p:spTgt spid="66"/>
                                         </p:tgtEl>
                                         <p:attrNameLst>
                                           <p:attrName>style.visibility</p:attrName>
@@ -12809,7 +12812,7 @@
                                           </p:stCondLst>
                                         </p:cTn>
                                         <p:tgtEl>
-                                          <p:spTgt spid="65"/>
+                                          <p:spTgt spid="67"/>
                                         </p:tgtEl>
                                         <p:attrNameLst>
                                           <p:attrName>style.visibility</p:attrName>
@@ -12836,7 +12839,7 @@
                                           </p:stCondLst>
                                         </p:cTn>
                                         <p:tgtEl>
-                                          <p:spTgt spid="66"/>
+                                          <p:spTgt spid="68"/>
                                         </p:tgtEl>
                                         <p:attrNameLst>
                                           <p:attrName>style.visibility</p:attrName>
@@ -12863,7 +12866,7 @@
                                           </p:stCondLst>
                                         </p:cTn>
                                         <p:tgtEl>
-                                          <p:spTgt spid="67"/>
+                                          <p:spTgt spid="71"/>
                                         </p:tgtEl>
                                         <p:attrNameLst>
                                           <p:attrName>style.visibility</p:attrName>
@@ -12890,60 +12893,6 @@
                                           </p:stCondLst>
                                         </p:cTn>
                                         <p:tgtEl>
-                                          <p:spTgt spid="68"/>
-                                        </p:tgtEl>
-                                        <p:attrNameLst>
-                                          <p:attrName>style.visibility</p:attrName>
-                                        </p:attrNameLst>
-                                      </p:cBhvr>
-                                      <p:to>
-                                        <p:strVal val="visible"/>
-                                      </p:to>
-                                    </p:set>
-                                  </p:childTnLst>
-                                </p:cTn>
-                              </p:par>
-                              <p:par>
-                                <p:cTn id="73" presetID="1" presetClass="entr" presetSubtype="0" fill="hold" nodeType="withEffect">
-                                  <p:stCondLst>
-                                    <p:cond delay="0"/>
-                                  </p:stCondLst>
-                                  <p:childTnLst>
-                                    <p:set>
-                                      <p:cBhvr>
-                                        <p:cTn id="74" dur="1" fill="hold">
-                                          <p:stCondLst>
-                                            <p:cond delay="0"/>
-                                          </p:stCondLst>
-                                        </p:cTn>
-                                        <p:tgtEl>
-                                          <p:spTgt spid="71"/>
-                                        </p:tgtEl>
-                                        <p:attrNameLst>
-                                          <p:attrName>style.visibility</p:attrName>
-                                        </p:attrNameLst>
-                                      </p:cBhvr>
-                                      <p:to>
-                                        <p:strVal val="visible"/>
-                                      </p:to>
-                                    </p:set>
-                                  </p:childTnLst>
-                                </p:cTn>
-                              </p:par>
-                              <p:par>
-                                <p:cTn id="75" presetID="1" presetClass="entr" presetSubtype="0" fill="hold" nodeType="withEffect">
-                                  <p:stCondLst>
-                                    <p:cond delay="0"/>
-                                  </p:stCondLst>
-                                  <p:childTnLst>
-                                    <p:set>
-                                      <p:cBhvr>
-                                        <p:cTn id="76" dur="1" fill="hold">
-                                          <p:stCondLst>
-                                            <p:cond delay="0"/>
-                                          </p:stCondLst>
-                                        </p:cTn>
-                                        <p:tgtEl>
                                           <p:spTgt spid="72"/>
                                         </p:tgtEl>
                                         <p:attrNameLst>
@@ -12964,26 +12913,26 @@
                     </p:cTn>
                   </p:par>
                   <p:par>
-                    <p:cTn id="77" fill="hold">
+                    <p:cTn id="73" fill="hold">
                       <p:stCondLst>
                         <p:cond delay="indefinite"/>
                       </p:stCondLst>
                       <p:childTnLst>
                         <p:par>
-                          <p:cTn id="78" fill="hold">
+                          <p:cTn id="74" fill="hold">
                             <p:stCondLst>
                               <p:cond delay="0"/>
                             </p:stCondLst>
                             <p:childTnLst>
                               <p:par>
-                                <p:cTn id="79" presetID="1" presetClass="entr" presetSubtype="0" fill="hold" nodeType="clickEffect">
+                                <p:cTn id="75" presetID="1" presetClass="entr" presetSubtype="0" fill="hold" nodeType="clickEffect">
                                   <p:stCondLst>
                                     <p:cond delay="0"/>
                                   </p:stCondLst>
                                   <p:childTnLst>
                                     <p:set>
                                       <p:cBhvr>
-                                        <p:cTn id="80" dur="1" fill="hold">
+                                        <p:cTn id="76" dur="1" fill="hold">
                                           <p:stCondLst>
                                             <p:cond delay="0"/>
                                           </p:stCondLst>
@@ -13003,7 +12952,61 @@
                                 </p:cTn>
                               </p:par>
                               <p:par>
-                                <p:cTn id="81" presetID="1" presetClass="entr" presetSubtype="0" fill="hold" grpId="0" nodeType="withEffect">
+                                <p:cTn id="77" presetID="1" presetClass="entr" presetSubtype="0" fill="hold" grpId="0" nodeType="withEffect">
+                                  <p:stCondLst>
+                                    <p:cond delay="0"/>
+                                  </p:stCondLst>
+                                  <p:childTnLst>
+                                    <p:set>
+                                      <p:cBhvr>
+                                        <p:cTn id="78" dur="1" fill="hold">
+                                          <p:stCondLst>
+                                            <p:cond delay="0"/>
+                                          </p:stCondLst>
+                                        </p:cTn>
+                                        <p:tgtEl>
+                                          <p:spTgt spid="23"/>
+                                        </p:tgtEl>
+                                        <p:attrNameLst>
+                                          <p:attrName>style.visibility</p:attrName>
+                                        </p:attrNameLst>
+                                      </p:cBhvr>
+                                      <p:to>
+                                        <p:strVal val="visible"/>
+                                      </p:to>
+                                    </p:set>
+                                  </p:childTnLst>
+                                </p:cTn>
+                              </p:par>
+                              <p:par>
+                                <p:cTn id="79" presetID="1" presetClass="entr" presetSubtype="0" fill="hold" nodeType="withEffect">
+                                  <p:stCondLst>
+                                    <p:cond delay="0"/>
+                                  </p:stCondLst>
+                                  <p:childTnLst>
+                                    <p:set>
+                                      <p:cBhvr>
+                                        <p:cTn id="80" dur="1" fill="hold">
+                                          <p:stCondLst>
+                                            <p:cond delay="0"/>
+                                          </p:stCondLst>
+                                        </p:cTn>
+                                        <p:tgtEl>
+                                          <p:spTgt spid="63"/>
+                                        </p:tgtEl>
+                                        <p:attrNameLst>
+                                          <p:attrName>style.visibility</p:attrName>
+                                        </p:attrNameLst>
+                                      </p:cBhvr>
+                                      <p:to>
+                                        <p:strVal val="visible"/>
+                                      </p:to>
+                                    </p:set>
+                                  </p:childTnLst>
+                                </p:cTn>
+                              </p:par>
+                              <p:par>
+                                <p:cTn id="81" presetID="1" presetClass="entr" presetSubtype="0" fill="hold" nodeType="withEffect">
                                   <p:stCondLst>
                                     <p:cond delay="0"/>
                                   </p:stCondLst>
@@ -13016,7 +13019,7 @@
                                           </p:stCondLst>
                                         </p:cTn>
                                         <p:tgtEl>
-                                          <p:spTgt spid="23"/>
+                                          <p:spTgt spid="52"/>
                                         </p:tgtEl>
                                         <p:attrNameLst>
                                           <p:attrName>style.visibility</p:attrName>
@@ -13043,60 +13046,6 @@
                                           </p:stCondLst>
                                         </p:cTn>
                                         <p:tgtEl>
-                                          <p:spTgt spid="63"/>
-                                        </p:tgtEl>
-                                        <p:attrNameLst>
-                                          <p:attrName>style.visibility</p:attrName>
-                                        </p:attrNameLst>
-                                      </p:cBhvr>
-                                      <p:to>
-                                        <p:strVal val="visible"/>
-                                      </p:to>
-                                    </p:set>
-                                  </p:childTnLst>
-                                </p:cTn>
-                              </p:par>
-                              <p:par>
-                                <p:cTn id="85" presetID="1" presetClass="entr" presetSubtype="0" fill="hold" nodeType="withEffect">
-                                  <p:stCondLst>
-                                    <p:cond delay="0"/>
-                                  </p:stCondLst>
-                                  <p:childTnLst>
-                                    <p:set>
-                                      <p:cBhvr>
-                                        <p:cTn id="86" dur="1" fill="hold">
-                                          <p:stCondLst>
-                                            <p:cond delay="0"/>
-                                          </p:stCondLst>
-                                        </p:cTn>
-                                        <p:tgtEl>
-                                          <p:spTgt spid="52"/>
-                                        </p:tgtEl>
-                                        <p:attrNameLst>
-                                          <p:attrName>style.visibility</p:attrName>
-                                        </p:attrNameLst>
-                                      </p:cBhvr>
-                                      <p:to>
-                                        <p:strVal val="visible"/>
-                                      </p:to>
-                                    </p:set>
-                                  </p:childTnLst>
-                                </p:cTn>
-                              </p:par>
-                              <p:par>
-                                <p:cTn id="87" presetID="1" presetClass="entr" presetSubtype="0" fill="hold" nodeType="withEffect">
-                                  <p:stCondLst>
-                                    <p:cond delay="0"/>
-                                  </p:stCondLst>
-                                  <p:childTnLst>
-                                    <p:set>
-                                      <p:cBhvr>
-                                        <p:cTn id="88" dur="1" fill="hold">
-                                          <p:stCondLst>
-                                            <p:cond delay="0"/>
-                                          </p:stCondLst>
-                                        </p:cTn>
-                                        <p:tgtEl>
                                           <p:spTgt spid="62"/>
                                         </p:tgtEl>
                                         <p:attrNameLst>
@@ -13117,26 +13066,26 @@
                     </p:cTn>
                   </p:par>
                   <p:par>
-                    <p:cTn id="89" fill="hold">
+                    <p:cTn id="85" fill="hold">
                       <p:stCondLst>
                         <p:cond delay="indefinite"/>
                       </p:stCondLst>
                       <p:childTnLst>
                         <p:par>
-                          <p:cTn id="90" fill="hold">
+                          <p:cTn id="86" fill="hold">
                             <p:stCondLst>
                               <p:cond delay="0"/>
                             </p:stCondLst>
                             <p:childTnLst>
                               <p:par>
-                                <p:cTn id="91" presetID="1" presetClass="entr" presetSubtype="0" fill="hold" nodeType="clickEffect">
+                                <p:cTn id="87" presetID="1" presetClass="entr" presetSubtype="0" fill="hold" nodeType="clickEffect">
                                   <p:stCondLst>
                                     <p:cond delay="0"/>
                                   </p:stCondLst>
                                   <p:childTnLst>
                                     <p:set>
                                       <p:cBhvr>
-                                        <p:cTn id="92" dur="1" fill="hold">
+                                        <p:cTn id="88" dur="1" fill="hold">
                                           <p:stCondLst>
                                             <p:cond delay="0"/>
                                           </p:stCondLst>
@@ -13156,14 +13105,14 @@
                                 </p:cTn>
                               </p:par>
                               <p:par>
-                                <p:cTn id="93" presetID="1" presetClass="entr" presetSubtype="0" fill="hold" nodeType="withEffect">
+                                <p:cTn id="89" presetID="1" presetClass="entr" presetSubtype="0" fill="hold" nodeType="withEffect">
                                   <p:stCondLst>
                                     <p:cond delay="0"/>
                                   </p:stCondLst>
                                   <p:childTnLst>
                                     <p:set>
                                       <p:cBhvr>
-                                        <p:cTn id="94" dur="1" fill="hold">
+                                        <p:cTn id="90" dur="1" fill="hold">
                                           <p:stCondLst>
                                             <p:cond delay="0"/>
                                           </p:stCondLst>
@@ -13183,14 +13132,14 @@
                                 </p:cTn>
                               </p:par>
                               <p:par>
-                                <p:cTn id="95" presetID="1" presetClass="entr" presetSubtype="0" fill="hold" nodeType="withEffect">
+                                <p:cTn id="91" presetID="1" presetClass="entr" presetSubtype="0" fill="hold" nodeType="withEffect">
                                   <p:stCondLst>
                                     <p:cond delay="0"/>
                                   </p:stCondLst>
                                   <p:childTnLst>
                                     <p:set>
                                       <p:cBhvr>
-                                        <p:cTn id="96" dur="1" fill="hold">
+                                        <p:cTn id="92" dur="1" fill="hold">
                                           <p:stCondLst>
                                             <p:cond delay="0"/>
                                           </p:stCondLst>
@@ -13237,8 +13186,6 @@
       </p:par>
     </p:tnLst>
     <p:bldLst>
-      <p:bldP spid="22" grpId="0" animBg="1"/>
-      <p:bldP spid="22" grpId="1" animBg="1"/>
       <p:bldP spid="23" grpId="0" animBg="1"/>
       <p:bldP spid="38" grpId="0" animBg="1"/>
       <p:bldP spid="39" grpId="0" animBg="1"/>

</xml_diff>

<commit_message>
Breaks figure into two
fixes #78
</commit_message>
<xml_diff>
--- a/paper/figures/diagrams.pptx
+++ b/paper/figures/diagrams.pptx
@@ -1408,7 +1408,7 @@
                 </a:solidFill>
               </a:rPr>
               <a:pPr/>
-              <a:t>8/11/16</a:t>
+              <a:t>8/15/16</a:t>
             </a:fld>
             <a:endParaRPr lang="en-US">
               <a:solidFill>
@@ -1610,7 +1610,7 @@
                 </a:solidFill>
               </a:rPr>
               <a:pPr/>
-              <a:t>8/11/16</a:t>
+              <a:t>8/15/16</a:t>
             </a:fld>
             <a:endParaRPr lang="en-US">
               <a:solidFill>
@@ -1888,7 +1888,7 @@
                 </a:solidFill>
               </a:rPr>
               <a:pPr/>
-              <a:t>8/11/16</a:t>
+              <a:t>8/15/16</a:t>
             </a:fld>
             <a:endParaRPr lang="en-US">
               <a:solidFill>
@@ -2208,7 +2208,7 @@
                 </a:solidFill>
               </a:rPr>
               <a:pPr/>
-              <a:t>8/11/16</a:t>
+              <a:t>8/15/16</a:t>
             </a:fld>
             <a:endParaRPr lang="en-US">
               <a:solidFill>
@@ -2662,7 +2662,7 @@
                 </a:solidFill>
               </a:rPr>
               <a:pPr/>
-              <a:t>8/11/16</a:t>
+              <a:t>8/15/16</a:t>
             </a:fld>
             <a:endParaRPr lang="en-US">
               <a:solidFill>
@@ -2812,7 +2812,7 @@
                 </a:solidFill>
               </a:rPr>
               <a:pPr/>
-              <a:t>8/11/16</a:t>
+              <a:t>8/15/16</a:t>
             </a:fld>
             <a:endParaRPr lang="en-US">
               <a:solidFill>
@@ -2939,7 +2939,7 @@
                 </a:solidFill>
               </a:rPr>
               <a:pPr/>
-              <a:t>8/11/16</a:t>
+              <a:t>8/15/16</a:t>
             </a:fld>
             <a:endParaRPr lang="en-US">
               <a:solidFill>
@@ -3248,7 +3248,7 @@
                 </a:solidFill>
               </a:rPr>
               <a:pPr/>
-              <a:t>8/11/16</a:t>
+              <a:t>8/15/16</a:t>
             </a:fld>
             <a:endParaRPr lang="en-US">
               <a:solidFill>
@@ -3687,7 +3687,7 @@
                 </a:solidFill>
               </a:rPr>
               <a:pPr/>
-              <a:t>8/11/16</a:t>
+              <a:t>8/15/16</a:t>
             </a:fld>
             <a:endParaRPr lang="en-US">
               <a:solidFill>
@@ -3889,7 +3889,7 @@
                 </a:solidFill>
               </a:rPr>
               <a:pPr/>
-              <a:t>8/11/16</a:t>
+              <a:t>8/15/16</a:t>
             </a:fld>
             <a:endParaRPr lang="en-US">
               <a:solidFill>
@@ -4101,7 +4101,7 @@
                 </a:solidFill>
               </a:rPr>
               <a:pPr/>
-              <a:t>8/11/16</a:t>
+              <a:t>8/15/16</a:t>
             </a:fld>
             <a:endParaRPr lang="en-US">
               <a:solidFill>
@@ -6862,7 +6862,7 @@
                 <a:ea typeface="+mn-ea"/>
               </a:rPr>
               <a:pPr defTabSz="2194560"/>
-              <a:t>8/11/16</a:t>
+              <a:t>8/15/16</a:t>
             </a:fld>
             <a:endParaRPr lang="en-US" kern="1200">
               <a:solidFill>
@@ -9288,6 +9288,108 @@
           <a:chExt cx="0" cy="0"/>
         </a:xfrm>
       </p:grpSpPr>
+      <p:pic>
+        <p:nvPicPr>
+          <p:cNvPr id="73" name="Picture 72"/>
+          <p:cNvPicPr>
+            <a:picLocks noChangeAspect="1"/>
+          </p:cNvPicPr>
+          <p:nvPr/>
+        </p:nvPicPr>
+        <p:blipFill>
+          <a:blip r:embed="rId2"/>
+          <a:stretch>
+            <a:fillRect/>
+          </a:stretch>
+        </p:blipFill>
+        <p:spPr>
+          <a:xfrm>
+            <a:off x="-11512179" y="20515456"/>
+            <a:ext cx="21832324" cy="9237346"/>
+          </a:xfrm>
+          <a:prstGeom prst="rect">
+            <a:avLst/>
+          </a:prstGeom>
+        </p:spPr>
+      </p:pic>
+      <p:sp>
+        <p:nvSpPr>
+          <p:cNvPr id="21" name="Rounded Rectangular Callout 20"/>
+          <p:cNvSpPr/>
+          <p:nvPr/>
+        </p:nvSpPr>
+        <p:spPr>
+          <a:xfrm>
+            <a:off x="-11887303" y="19700856"/>
+            <a:ext cx="22604391" cy="10449272"/>
+          </a:xfrm>
+          <a:prstGeom prst="wedgeRoundRectCallout">
+            <a:avLst>
+              <a:gd name="adj1" fmla="val 31677"/>
+              <a:gd name="adj2" fmla="val 59018"/>
+              <a:gd name="adj3" fmla="val 16667"/>
+            </a:avLst>
+          </a:prstGeom>
+          <a:noFill/>
+          <a:ln>
+            <a:solidFill>
+              <a:schemeClr val="tx1"/>
+            </a:solidFill>
+          </a:ln>
+        </p:spPr>
+        <p:style>
+          <a:lnRef idx="1">
+            <a:schemeClr val="accent1"/>
+          </a:lnRef>
+          <a:fillRef idx="3">
+            <a:schemeClr val="accent1"/>
+          </a:fillRef>
+          <a:effectRef idx="2">
+            <a:schemeClr val="accent1"/>
+          </a:effectRef>
+          <a:fontRef idx="minor">
+            <a:schemeClr val="lt1"/>
+          </a:fontRef>
+        </p:style>
+        <p:txBody>
+          <a:bodyPr rtlCol="0" anchor="ctr"/>
+          <a:lstStyle/>
+          <a:p>
+            <a:pPr algn="ctr"/>
+            <a:endParaRPr lang="en-US"/>
+          </a:p>
+        </p:txBody>
+      </p:sp>
+      <p:pic>
+        <p:nvPicPr>
+          <p:cNvPr id="83" name="Picture 82" descr="Screen Shot 2016-07-17 at 8.18.31 PM.png"/>
+          <p:cNvPicPr>
+            <a:picLocks noChangeAspect="1"/>
+          </p:cNvPicPr>
+          <p:nvPr/>
+        </p:nvPicPr>
+        <p:blipFill>
+          <a:blip r:embed="rId3">
+            <a:extLst>
+              <a:ext uri="{28A0092B-C50C-407E-A947-70E740481C1C}">
+                <a14:useLocalDpi xmlns:a14="http://schemas.microsoft.com/office/drawing/2010/main" val="0"/>
+              </a:ext>
+            </a:extLst>
+          </a:blip>
+          <a:stretch>
+            <a:fillRect/>
+          </a:stretch>
+        </p:blipFill>
+        <p:spPr>
+          <a:xfrm>
+            <a:off x="31704428" y="-3140479"/>
+            <a:ext cx="16996161" cy="11338535"/>
+          </a:xfrm>
+          <a:prstGeom prst="rect">
+            <a:avLst/>
+          </a:prstGeom>
+        </p:spPr>
+      </p:pic>
       <p:cxnSp>
         <p:nvCxnSpPr>
           <p:cNvPr id="74" name="Shape 79"/>
@@ -9296,7 +9398,7 @@
         </p:nvCxnSpPr>
         <p:spPr>
           <a:xfrm rot="16200000" flipH="1" flipV="1">
-            <a:off x="26526523" y="25244359"/>
+            <a:off x="-7260365" y="29609738"/>
             <a:ext cx="832291" cy="13101470"/>
           </a:xfrm>
           <a:prstGeom prst="curvedConnector3">
@@ -9324,7 +9426,7 @@
         </p:nvCxnSpPr>
         <p:spPr>
           <a:xfrm rot="16200000" flipH="1" flipV="1">
-            <a:off x="20894580" y="23501323"/>
+            <a:off x="-12892308" y="27866702"/>
             <a:ext cx="4721198" cy="20476445"/>
           </a:xfrm>
           <a:prstGeom prst="curvedConnector3">
@@ -9352,7 +9454,7 @@
         </p:nvCxnSpPr>
         <p:spPr>
           <a:xfrm rot="16200000" flipV="1">
-            <a:off x="18395791" y="16281336"/>
+            <a:off x="-15391097" y="20646715"/>
             <a:ext cx="2343806" cy="27851424"/>
           </a:xfrm>
           <a:prstGeom prst="curvedConnector3">
@@ -9380,7 +9482,7 @@
         </p:nvGrpSpPr>
         <p:grpSpPr>
           <a:xfrm>
-            <a:off x="641688" y="-542395"/>
+            <a:off x="7768866" y="6112068"/>
             <a:ext cx="42560640" cy="12748685"/>
             <a:chOff x="148549" y="1623925"/>
             <a:chExt cx="8866800" cy="2655976"/>
@@ -9981,7 +10083,7 @@
         </p:nvCxnSpPr>
         <p:spPr>
           <a:xfrm rot="16200000" flipH="1" flipV="1">
-            <a:off x="26151399" y="-3500825"/>
+            <a:off x="33278577" y="3153638"/>
             <a:ext cx="832291" cy="13101470"/>
           </a:xfrm>
           <a:prstGeom prst="curvedConnector3">
@@ -10012,7 +10114,7 @@
         </p:nvCxnSpPr>
         <p:spPr>
           <a:xfrm rot="16200000" flipH="1" flipV="1">
-            <a:off x="20519455" y="-5243861"/>
+            <a:off x="27646633" y="1410602"/>
             <a:ext cx="4721198" cy="20476445"/>
           </a:xfrm>
           <a:prstGeom prst="curvedConnector3">
@@ -10043,7 +10145,7 @@
         </p:nvCxnSpPr>
         <p:spPr>
           <a:xfrm rot="16200000" flipV="1">
-            <a:off x="18020671" y="-12463848"/>
+            <a:off x="25147849" y="-5809385"/>
             <a:ext cx="2343806" cy="27851424"/>
           </a:xfrm>
           <a:prstGeom prst="curvedConnector3">
@@ -10071,7 +10173,7 @@
         </p:nvSpPr>
         <p:spPr>
           <a:xfrm>
-            <a:off x="233150" y="26252988"/>
+            <a:off x="-33553738" y="30618367"/>
             <a:ext cx="43580160" cy="15843346"/>
           </a:xfrm>
           <a:prstGeom prst="rect">
@@ -10116,7 +10218,7 @@
         </p:nvGrpSpPr>
         <p:grpSpPr>
           <a:xfrm>
-            <a:off x="698746" y="28553021"/>
+            <a:off x="-33088142" y="32918400"/>
             <a:ext cx="42560640" cy="12748685"/>
             <a:chOff x="148549" y="1623925"/>
             <a:chExt cx="8866800" cy="2655976"/>
@@ -10714,7 +10816,7 @@
         </p:nvSpPr>
         <p:spPr>
           <a:xfrm>
-            <a:off x="634190" y="27625661"/>
+            <a:off x="-33152698" y="31991040"/>
             <a:ext cx="5929920" cy="6945120"/>
           </a:xfrm>
           <a:prstGeom prst="rect">
@@ -10759,7 +10861,7 @@
         </p:nvSpPr>
         <p:spPr>
           <a:xfrm>
-            <a:off x="7999910" y="27626381"/>
+            <a:off x="-25786978" y="31991760"/>
             <a:ext cx="6642720" cy="6945120"/>
           </a:xfrm>
           <a:prstGeom prst="rect">
@@ -10803,7 +10905,7 @@
           <p:nvPr/>
         </p:nvPicPr>
         <p:blipFill rotWithShape="1">
-          <a:blip r:embed="rId2">
+          <a:blip r:embed="rId4">
             <a:alphaModFix/>
           </a:blip>
           <a:srcRect l="6030" t="11670" r="56580" b="19024"/>
@@ -10811,7 +10913,7 @@
         </p:blipFill>
         <p:spPr>
           <a:xfrm>
-            <a:off x="8073706" y="27626383"/>
+            <a:off x="-25713182" y="31991762"/>
             <a:ext cx="3000230" cy="2235720"/>
           </a:xfrm>
           <a:prstGeom prst="rect">
@@ -10831,7 +10933,7 @@
         </p:nvSpPr>
         <p:spPr>
           <a:xfrm>
-            <a:off x="7999910" y="35309381"/>
+            <a:off x="-25786978" y="39674760"/>
             <a:ext cx="6642720" cy="6278400"/>
           </a:xfrm>
           <a:prstGeom prst="rect">
@@ -10875,12 +10977,12 @@
           <p:nvPr/>
         </p:nvPicPr>
         <p:blipFill>
-          <a:blip r:embed="rId3">
+          <a:blip r:embed="rId5">
             <a:alphaModFix/>
             <a:extLst>
               <a:ext uri="{BEBA8EAE-BF5A-486C-A8C5-ECC9F3942E4B}">
                 <a14:imgProps xmlns:a14="http://schemas.microsoft.com/office/drawing/2010/main">
-                  <a14:imgLayer r:embed="rId4">
+                  <a14:imgLayer r:embed="rId6">
                     <a14:imgEffect>
                       <a14:backgroundRemoval t="0" b="100000" l="0" r="100000"/>
                     </a14:imgEffect>
@@ -10895,7 +10997,7 @@
         </p:blipFill>
         <p:spPr>
           <a:xfrm>
-            <a:off x="8073710" y="35309388"/>
+            <a:off x="-25713178" y="39674767"/>
             <a:ext cx="2748960" cy="2748955"/>
           </a:xfrm>
           <a:prstGeom prst="rect">
@@ -10915,7 +11017,7 @@
         </p:nvSpPr>
         <p:spPr>
           <a:xfrm>
-            <a:off x="15039710" y="31595981"/>
+            <a:off x="-18747178" y="35961360"/>
             <a:ext cx="6236640" cy="6033600"/>
           </a:xfrm>
           <a:prstGeom prst="rect">
@@ -10959,7 +11061,7 @@
           <p:nvPr/>
         </p:nvPicPr>
         <p:blipFill rotWithShape="1">
-          <a:blip r:embed="rId5">
+          <a:blip r:embed="rId7">
             <a:alphaModFix/>
           </a:blip>
           <a:srcRect l="14387" t="5689" r="15155" b="25765"/>
@@ -10967,7 +11069,7 @@
         </p:blipFill>
         <p:spPr>
           <a:xfrm>
-            <a:off x="18534483" y="31764747"/>
+            <a:off x="-15252405" y="36130126"/>
             <a:ext cx="2750395" cy="2675611"/>
           </a:xfrm>
           <a:prstGeom prst="rect">
@@ -10986,7 +11088,7 @@
           <p:nvPr/>
         </p:nvPicPr>
         <p:blipFill>
-          <a:blip r:embed="rId6">
+          <a:blip r:embed="rId8">
             <a:alphaModFix/>
           </a:blip>
           <a:stretch>
@@ -10995,7 +11097,7 @@
         </p:blipFill>
         <p:spPr>
           <a:xfrm>
-            <a:off x="15617150" y="31211863"/>
+            <a:off x="-18169738" y="35577242"/>
             <a:ext cx="3709920" cy="3710059"/>
           </a:xfrm>
           <a:prstGeom prst="rect">
@@ -11015,7 +11117,7 @@
         </p:nvSpPr>
         <p:spPr>
           <a:xfrm>
-            <a:off x="22345310" y="31431821"/>
+            <a:off x="-11441578" y="35797200"/>
             <a:ext cx="6642720" cy="6278400"/>
           </a:xfrm>
           <a:prstGeom prst="rect">
@@ -11060,7 +11162,7 @@
         </p:nvSpPr>
         <p:spPr>
           <a:xfrm>
-            <a:off x="30092990" y="31431821"/>
+            <a:off x="-3693898" y="35797200"/>
             <a:ext cx="6642720" cy="6278400"/>
           </a:xfrm>
           <a:prstGeom prst="rect">
@@ -11104,7 +11206,7 @@
           <p:nvPr/>
         </p:nvPicPr>
         <p:blipFill>
-          <a:blip r:embed="rId7">
+          <a:blip r:embed="rId9">
             <a:alphaModFix/>
           </a:blip>
           <a:stretch>
@@ -11113,7 +11215,7 @@
         </p:blipFill>
         <p:spPr>
           <a:xfrm>
-            <a:off x="30149871" y="31412517"/>
+            <a:off x="-3637017" y="35777896"/>
             <a:ext cx="2284675" cy="2407474"/>
           </a:xfrm>
           <a:prstGeom prst="rect">
@@ -11133,7 +11235,7 @@
         </p:nvSpPr>
         <p:spPr>
           <a:xfrm>
-            <a:off x="37069790" y="31431821"/>
+            <a:off x="3282902" y="35797200"/>
             <a:ext cx="6642720" cy="6278400"/>
           </a:xfrm>
           <a:prstGeom prst="rect">
@@ -11177,7 +11279,7 @@
           <p:nvPr/>
         </p:nvPicPr>
         <p:blipFill>
-          <a:blip r:embed="rId8">
+          <a:blip r:embed="rId10">
             <a:alphaModFix/>
           </a:blip>
           <a:stretch>
@@ -11186,7 +11288,7 @@
         </p:blipFill>
         <p:spPr>
           <a:xfrm>
-            <a:off x="39820193" y="35102414"/>
+            <a:off x="6033305" y="39467793"/>
             <a:ext cx="2225021" cy="2227147"/>
           </a:xfrm>
           <a:prstGeom prst="rect">
@@ -11201,62 +11303,6 @@
       <p:pic>
         <p:nvPicPr>
           <p:cNvPr id="51" name="Shape 95"/>
-          <p:cNvPicPr preferRelativeResize="0"/>
-          <p:nvPr/>
-        </p:nvPicPr>
-        <p:blipFill>
-          <a:blip r:embed="rId9">
-            <a:alphaModFix/>
-          </a:blip>
-          <a:stretch>
-            <a:fillRect/>
-          </a:stretch>
-        </p:blipFill>
-        <p:spPr>
-          <a:xfrm>
-            <a:off x="37210673" y="32381777"/>
-            <a:ext cx="3156134" cy="1433362"/>
-          </a:xfrm>
-          <a:prstGeom prst="rect">
-            <a:avLst/>
-          </a:prstGeom>
-          <a:noFill/>
-          <a:ln>
-            <a:noFill/>
-          </a:ln>
-        </p:spPr>
-      </p:pic>
-      <p:pic>
-        <p:nvPicPr>
-          <p:cNvPr id="52" name="Shape 96"/>
-          <p:cNvPicPr preferRelativeResize="0"/>
-          <p:nvPr/>
-        </p:nvPicPr>
-        <p:blipFill>
-          <a:blip r:embed="rId10">
-            <a:alphaModFix/>
-          </a:blip>
-          <a:stretch>
-            <a:fillRect/>
-          </a:stretch>
-        </p:blipFill>
-        <p:spPr>
-          <a:xfrm>
-            <a:off x="39820186" y="26485359"/>
-            <a:ext cx="3827280" cy="3178675"/>
-          </a:xfrm>
-          <a:prstGeom prst="rect">
-            <a:avLst/>
-          </a:prstGeom>
-          <a:noFill/>
-          <a:ln>
-            <a:noFill/>
-          </a:ln>
-        </p:spPr>
-      </p:pic>
-      <p:pic>
-        <p:nvPicPr>
-          <p:cNvPr id="53" name="Shape 97" descr="@frictionlessdata"/>
           <p:cNvPicPr preferRelativeResize="0"/>
           <p:nvPr/>
         </p:nvPicPr>
@@ -11270,8 +11316,8 @@
         </p:blipFill>
         <p:spPr>
           <a:xfrm>
-            <a:off x="25176830" y="31336061"/>
-            <a:ext cx="3000240" cy="3000240"/>
+            <a:off x="3423785" y="36747156"/>
+            <a:ext cx="3156134" cy="1433362"/>
           </a:xfrm>
           <a:prstGeom prst="rect">
             <a:avLst/>
@@ -11284,35 +11330,7 @@
       </p:pic>
       <p:pic>
         <p:nvPicPr>
-          <p:cNvPr id="54" name="Shape 98" descr="@frictionlessdata"/>
-          <p:cNvPicPr preferRelativeResize="0"/>
-          <p:nvPr/>
-        </p:nvPicPr>
-        <p:blipFill>
-          <a:blip r:embed="rId11">
-            <a:alphaModFix/>
-          </a:blip>
-          <a:stretch>
-            <a:fillRect/>
-          </a:stretch>
-        </p:blipFill>
-        <p:spPr>
-          <a:xfrm>
-            <a:off x="10822670" y="35183741"/>
-            <a:ext cx="3000240" cy="3000240"/>
-          </a:xfrm>
-          <a:prstGeom prst="rect">
-            <a:avLst/>
-          </a:prstGeom>
-          <a:noFill/>
-          <a:ln>
-            <a:noFill/>
-          </a:ln>
-        </p:spPr>
-      </p:pic>
-      <p:pic>
-        <p:nvPicPr>
-          <p:cNvPr id="55" name="Shape 99"/>
+          <p:cNvPr id="52" name="Shape 96"/>
           <p:cNvPicPr preferRelativeResize="0"/>
           <p:nvPr/>
         </p:nvPicPr>
@@ -11326,8 +11344,8 @@
         </p:blipFill>
         <p:spPr>
           <a:xfrm>
-            <a:off x="32355382" y="31291025"/>
-            <a:ext cx="1842283" cy="2397106"/>
+            <a:off x="6033298" y="30850738"/>
+            <a:ext cx="3827280" cy="3178675"/>
           </a:xfrm>
           <a:prstGeom prst="rect">
             <a:avLst/>
@@ -11340,7 +11358,7 @@
       </p:pic>
       <p:pic>
         <p:nvPicPr>
-          <p:cNvPr id="56" name="Shape 100"/>
+          <p:cNvPr id="53" name="Shape 97" descr="@frictionlessdata"/>
           <p:cNvPicPr preferRelativeResize="0"/>
           <p:nvPr/>
         </p:nvPicPr>
@@ -11354,8 +11372,8 @@
         </p:blipFill>
         <p:spPr>
           <a:xfrm>
-            <a:off x="698746" y="27626376"/>
-            <a:ext cx="2402755" cy="2402755"/>
+            <a:off x="-8610058" y="35701440"/>
+            <a:ext cx="3000240" cy="3000240"/>
           </a:xfrm>
           <a:prstGeom prst="rect">
             <a:avLst/>
@@ -11368,7 +11386,35 @@
       </p:pic>
       <p:pic>
         <p:nvPicPr>
-          <p:cNvPr id="57" name="Shape 101"/>
+          <p:cNvPr id="54" name="Shape 98" descr="@frictionlessdata"/>
+          <p:cNvPicPr preferRelativeResize="0"/>
+          <p:nvPr/>
+        </p:nvPicPr>
+        <p:blipFill>
+          <a:blip r:embed="rId13">
+            <a:alphaModFix/>
+          </a:blip>
+          <a:stretch>
+            <a:fillRect/>
+          </a:stretch>
+        </p:blipFill>
+        <p:spPr>
+          <a:xfrm>
+            <a:off x="-22964218" y="39549120"/>
+            <a:ext cx="3000240" cy="3000240"/>
+          </a:xfrm>
+          <a:prstGeom prst="rect">
+            <a:avLst/>
+          </a:prstGeom>
+          <a:noFill/>
+          <a:ln>
+            <a:noFill/>
+          </a:ln>
+        </p:spPr>
+      </p:pic>
+      <p:pic>
+        <p:nvPicPr>
+          <p:cNvPr id="55" name="Shape 99"/>
           <p:cNvPicPr preferRelativeResize="0"/>
           <p:nvPr/>
         </p:nvPicPr>
@@ -11382,8 +11428,8 @@
         </p:blipFill>
         <p:spPr>
           <a:xfrm>
-            <a:off x="3101506" y="27626371"/>
-            <a:ext cx="2402755" cy="2402755"/>
+            <a:off x="-1431506" y="35656404"/>
+            <a:ext cx="1842283" cy="2397106"/>
           </a:xfrm>
           <a:prstGeom prst="rect">
             <a:avLst/>
@@ -11396,7 +11442,7 @@
       </p:pic>
       <p:pic>
         <p:nvPicPr>
-          <p:cNvPr id="58" name="Shape 102"/>
+          <p:cNvPr id="56" name="Shape 100"/>
           <p:cNvPicPr preferRelativeResize="0"/>
           <p:nvPr/>
         </p:nvPicPr>
@@ -11410,7 +11456,63 @@
         </p:blipFill>
         <p:spPr>
           <a:xfrm>
-            <a:off x="11121408" y="27626381"/>
+            <a:off x="-33088142" y="31991755"/>
+            <a:ext cx="2402755" cy="2402755"/>
+          </a:xfrm>
+          <a:prstGeom prst="rect">
+            <a:avLst/>
+          </a:prstGeom>
+          <a:noFill/>
+          <a:ln>
+            <a:noFill/>
+          </a:ln>
+        </p:spPr>
+      </p:pic>
+      <p:pic>
+        <p:nvPicPr>
+          <p:cNvPr id="57" name="Shape 101"/>
+          <p:cNvPicPr preferRelativeResize="0"/>
+          <p:nvPr/>
+        </p:nvPicPr>
+        <p:blipFill>
+          <a:blip r:embed="rId16">
+            <a:alphaModFix/>
+          </a:blip>
+          <a:stretch>
+            <a:fillRect/>
+          </a:stretch>
+        </p:blipFill>
+        <p:spPr>
+          <a:xfrm>
+            <a:off x="-30685382" y="31991750"/>
+            <a:ext cx="2402755" cy="2402755"/>
+          </a:xfrm>
+          <a:prstGeom prst="rect">
+            <a:avLst/>
+          </a:prstGeom>
+          <a:noFill/>
+          <a:ln>
+            <a:noFill/>
+          </a:ln>
+        </p:spPr>
+      </p:pic>
+      <p:pic>
+        <p:nvPicPr>
+          <p:cNvPr id="58" name="Shape 102"/>
+          <p:cNvPicPr preferRelativeResize="0"/>
+          <p:nvPr/>
+        </p:nvPicPr>
+        <p:blipFill>
+          <a:blip r:embed="rId17">
+            <a:alphaModFix/>
+          </a:blip>
+          <a:stretch>
+            <a:fillRect/>
+          </a:stretch>
+        </p:blipFill>
+        <p:spPr>
+          <a:xfrm>
+            <a:off x="-22665480" y="31991760"/>
             <a:ext cx="2402755" cy="2402755"/>
           </a:xfrm>
           <a:prstGeom prst="rect">
@@ -11429,12 +11531,12 @@
           <p:nvPr/>
         </p:nvPicPr>
         <p:blipFill>
-          <a:blip r:embed="rId3">
+          <a:blip r:embed="rId5">
             <a:alphaModFix/>
             <a:extLst>
               <a:ext uri="{BEBA8EAE-BF5A-486C-A8C5-ECC9F3942E4B}">
                 <a14:imgProps xmlns:a14="http://schemas.microsoft.com/office/drawing/2010/main">
-                  <a14:imgLayer r:embed="rId4">
+                  <a14:imgLayer r:embed="rId6">
                     <a14:imgEffect>
                       <a14:backgroundRemoval t="0" b="100000" l="0" r="100000"/>
                     </a14:imgEffect>
@@ -11449,7 +11551,7 @@
         </p:blipFill>
         <p:spPr>
           <a:xfrm>
-            <a:off x="22345310" y="31487753"/>
+            <a:off x="-11441578" y="35853132"/>
             <a:ext cx="2748960" cy="2748955"/>
           </a:xfrm>
           <a:prstGeom prst="rect">
@@ -11464,54 +11566,6 @@
       <p:pic>
         <p:nvPicPr>
           <p:cNvPr id="60" name="Picture 59"/>
-          <p:cNvPicPr>
-            <a:picLocks noChangeAspect="1"/>
-          </p:cNvPicPr>
-          <p:nvPr/>
-        </p:nvPicPr>
-        <p:blipFill>
-          <a:blip r:embed="rId16"/>
-          <a:stretch>
-            <a:fillRect/>
-          </a:stretch>
-        </p:blipFill>
-        <p:spPr>
-          <a:xfrm>
-            <a:off x="30149873" y="35421226"/>
-            <a:ext cx="1996507" cy="1980566"/>
-          </a:xfrm>
-          <a:prstGeom prst="rect">
-            <a:avLst/>
-          </a:prstGeom>
-        </p:spPr>
-      </p:pic>
-      <p:pic>
-        <p:nvPicPr>
-          <p:cNvPr id="61" name="Picture 60"/>
-          <p:cNvPicPr>
-            <a:picLocks noChangeAspect="1"/>
-          </p:cNvPicPr>
-          <p:nvPr/>
-        </p:nvPicPr>
-        <p:blipFill>
-          <a:blip r:embed="rId17"/>
-          <a:stretch>
-            <a:fillRect/>
-          </a:stretch>
-        </p:blipFill>
-        <p:spPr>
-          <a:xfrm>
-            <a:off x="32434541" y="35387066"/>
-            <a:ext cx="1734979" cy="2400840"/>
-          </a:xfrm>
-          <a:prstGeom prst="rect">
-            <a:avLst/>
-          </a:prstGeom>
-        </p:spPr>
-      </p:pic>
-      <p:pic>
-        <p:nvPicPr>
-          <p:cNvPr id="62" name="Picture 61"/>
           <p:cNvPicPr>
             <a:picLocks noChangeAspect="1"/>
           </p:cNvPicPr>
@@ -11525,8 +11579,8 @@
         </p:blipFill>
         <p:spPr>
           <a:xfrm>
-            <a:off x="37531443" y="26755990"/>
-            <a:ext cx="2288750" cy="2637432"/>
+            <a:off x="-3637015" y="39786605"/>
+            <a:ext cx="1996507" cy="1980566"/>
           </a:xfrm>
           <a:prstGeom prst="rect">
             <a:avLst/>
@@ -11535,7 +11589,7 @@
       </p:pic>
       <p:pic>
         <p:nvPicPr>
-          <p:cNvPr id="63" name="Picture 62"/>
+          <p:cNvPr id="61" name="Picture 60"/>
           <p:cNvPicPr>
             <a:picLocks noChangeAspect="1"/>
           </p:cNvPicPr>
@@ -11549,8 +11603,8 @@
         </p:blipFill>
         <p:spPr>
           <a:xfrm>
-            <a:off x="34395586" y="26832487"/>
-            <a:ext cx="2545920" cy="2352427"/>
+            <a:off x="-1352347" y="39752445"/>
+            <a:ext cx="1734979" cy="2400840"/>
           </a:xfrm>
           <a:prstGeom prst="rect">
             <a:avLst/>
@@ -11559,21 +11613,22 @@
       </p:pic>
       <p:pic>
         <p:nvPicPr>
-          <p:cNvPr id="64" name="Picture 63"/>
+          <p:cNvPr id="62" name="Picture 61"/>
           <p:cNvPicPr>
             <a:picLocks noChangeAspect="1"/>
           </p:cNvPicPr>
           <p:nvPr/>
         </p:nvPicPr>
-        <p:blipFill rotWithShape="1">
+        <p:blipFill>
           <a:blip r:embed="rId20"/>
-          <a:srcRect r="73480"/>
-          <a:stretch/>
+          <a:stretch>
+            <a:fillRect/>
+          </a:stretch>
         </p:blipFill>
         <p:spPr>
           <a:xfrm>
-            <a:off x="8225626" y="31709765"/>
-            <a:ext cx="2895782" cy="2637072"/>
+            <a:off x="3744555" y="31121369"/>
+            <a:ext cx="2288750" cy="2637432"/>
           </a:xfrm>
           <a:prstGeom prst="rect">
             <a:avLst/>
@@ -11582,7 +11637,7 @@
       </p:pic>
       <p:pic>
         <p:nvPicPr>
-          <p:cNvPr id="65" name="Picture 64"/>
+          <p:cNvPr id="63" name="Picture 62"/>
           <p:cNvPicPr>
             <a:picLocks noChangeAspect="1"/>
           </p:cNvPicPr>
@@ -11596,8 +11651,8 @@
         </p:blipFill>
         <p:spPr>
           <a:xfrm>
-            <a:off x="11121410" y="31487748"/>
-            <a:ext cx="3069346" cy="2656814"/>
+            <a:off x="608698" y="31197866"/>
+            <a:ext cx="2545920" cy="2352427"/>
           </a:xfrm>
           <a:prstGeom prst="rect">
             <a:avLst/>
@@ -11606,22 +11661,21 @@
       </p:pic>
       <p:pic>
         <p:nvPicPr>
-          <p:cNvPr id="66" name="Picture 65"/>
+          <p:cNvPr id="64" name="Picture 63"/>
           <p:cNvPicPr>
             <a:picLocks noChangeAspect="1"/>
           </p:cNvPicPr>
           <p:nvPr/>
         </p:nvPicPr>
-        <p:blipFill>
+        <p:blipFill rotWithShape="1">
           <a:blip r:embed="rId22"/>
-          <a:stretch>
-            <a:fillRect/>
-          </a:stretch>
+          <a:srcRect r="73480"/>
+          <a:stretch/>
         </p:blipFill>
         <p:spPr>
           <a:xfrm>
-            <a:off x="979106" y="32070609"/>
-            <a:ext cx="2122402" cy="1917466"/>
+            <a:off x="-25561262" y="36075144"/>
+            <a:ext cx="2895782" cy="2637072"/>
           </a:xfrm>
           <a:prstGeom prst="rect">
             <a:avLst/>
@@ -11630,7 +11684,7 @@
       </p:pic>
       <p:pic>
         <p:nvPicPr>
-          <p:cNvPr id="67" name="Picture 66"/>
+          <p:cNvPr id="65" name="Picture 64"/>
           <p:cNvPicPr>
             <a:picLocks noChangeAspect="1"/>
           </p:cNvPicPr>
@@ -11644,7 +11698,55 @@
         </p:blipFill>
         <p:spPr>
           <a:xfrm>
-            <a:off x="19020782" y="34921915"/>
+            <a:off x="-22665478" y="35853127"/>
+            <a:ext cx="3069346" cy="2656814"/>
+          </a:xfrm>
+          <a:prstGeom prst="rect">
+            <a:avLst/>
+          </a:prstGeom>
+        </p:spPr>
+      </p:pic>
+      <p:pic>
+        <p:nvPicPr>
+          <p:cNvPr id="66" name="Picture 65"/>
+          <p:cNvPicPr>
+            <a:picLocks noChangeAspect="1"/>
+          </p:cNvPicPr>
+          <p:nvPr/>
+        </p:nvPicPr>
+        <p:blipFill>
+          <a:blip r:embed="rId24"/>
+          <a:stretch>
+            <a:fillRect/>
+          </a:stretch>
+        </p:blipFill>
+        <p:spPr>
+          <a:xfrm>
+            <a:off x="-32807782" y="36435988"/>
+            <a:ext cx="2122402" cy="1917466"/>
+          </a:xfrm>
+          <a:prstGeom prst="rect">
+            <a:avLst/>
+          </a:prstGeom>
+        </p:spPr>
+      </p:pic>
+      <p:pic>
+        <p:nvPicPr>
+          <p:cNvPr id="67" name="Picture 66"/>
+          <p:cNvPicPr>
+            <a:picLocks noChangeAspect="1"/>
+          </p:cNvPicPr>
+          <p:nvPr/>
+        </p:nvPicPr>
+        <p:blipFill>
+          <a:blip r:embed="rId25"/>
+          <a:stretch>
+            <a:fillRect/>
+          </a:stretch>
+        </p:blipFill>
+        <p:spPr>
+          <a:xfrm>
+            <a:off x="-14766106" y="39287294"/>
             <a:ext cx="2255568" cy="2069328"/>
           </a:xfrm>
           <a:prstGeom prst="rect">
@@ -11661,13 +11763,13 @@
           <p:nvPr/>
         </p:nvPicPr>
         <p:blipFill rotWithShape="1">
-          <a:blip r:embed="rId24"/>
+          <a:blip r:embed="rId26"/>
           <a:srcRect r="71369"/>
           <a:stretch/>
         </p:blipFill>
         <p:spPr>
           <a:xfrm>
-            <a:off x="16395934" y="34921915"/>
+            <a:off x="-17390954" y="39287294"/>
             <a:ext cx="2138549" cy="2163322"/>
           </a:xfrm>
           <a:prstGeom prst="rect">
@@ -11684,13 +11786,13 @@
           <p:nvPr/>
         </p:nvPicPr>
         <p:blipFill rotWithShape="1">
-          <a:blip r:embed="rId25"/>
+          <a:blip r:embed="rId27"/>
           <a:srcRect l="51186" r="26169" b="53017"/>
           <a:stretch/>
         </p:blipFill>
         <p:spPr>
           <a:xfrm>
-            <a:off x="10583182" y="38258767"/>
+            <a:off x="-23203706" y="42624146"/>
             <a:ext cx="3464520" cy="2479877"/>
           </a:xfrm>
           <a:prstGeom prst="rect">
@@ -11707,13 +11809,13 @@
           <p:nvPr/>
         </p:nvPicPr>
         <p:blipFill rotWithShape="1">
-          <a:blip r:embed="rId26"/>
+          <a:blip r:embed="rId28"/>
           <a:srcRect l="33394" r="33923" b="34986"/>
           <a:stretch/>
         </p:blipFill>
         <p:spPr>
           <a:xfrm>
-            <a:off x="8294390" y="38092368"/>
+            <a:off x="-25492498" y="42457747"/>
             <a:ext cx="2288784" cy="2830291"/>
           </a:xfrm>
           <a:prstGeom prst="rect">
@@ -11723,89 +11825,7 @@
       </p:pic>
       <p:pic>
         <p:nvPicPr>
-          <p:cNvPr id="73" name="Picture 72"/>
-          <p:cNvPicPr>
-            <a:picLocks noChangeAspect="1"/>
-          </p:cNvPicPr>
-          <p:nvPr/>
-        </p:nvPicPr>
-        <p:blipFill>
-          <a:blip r:embed="rId27"/>
-          <a:stretch>
-            <a:fillRect/>
-          </a:stretch>
-        </p:blipFill>
-        <p:spPr>
-          <a:xfrm>
-            <a:off x="20391933" y="15394200"/>
-            <a:ext cx="21832324" cy="9237346"/>
-          </a:xfrm>
-          <a:prstGeom prst="rect">
-            <a:avLst/>
-          </a:prstGeom>
-        </p:spPr>
-      </p:pic>
-      <p:cxnSp>
-        <p:nvCxnSpPr>
-          <p:cNvPr id="78" name="Straight Connector 77"/>
-          <p:cNvCxnSpPr/>
-          <p:nvPr/>
-        </p:nvCxnSpPr>
-        <p:spPr>
-          <a:xfrm flipV="1">
-            <a:off x="-1396899" y="13840330"/>
-            <a:ext cx="46732620" cy="11442542"/>
-          </a:xfrm>
-          <a:prstGeom prst="bentConnector3">
-            <a:avLst>
-              <a:gd name="adj1" fmla="val 44565"/>
-            </a:avLst>
-          </a:prstGeom>
-          <a:ln w="317500" cmpd="sng"/>
-          <a:effectLst/>
-        </p:spPr>
-        <p:style>
-          <a:lnRef idx="1">
-            <a:schemeClr val="dk1"/>
-          </a:lnRef>
-          <a:fillRef idx="0">
-            <a:schemeClr val="dk1"/>
-          </a:fillRef>
-          <a:effectRef idx="0">
-            <a:schemeClr val="dk1"/>
-          </a:effectRef>
-          <a:fontRef idx="minor">
-            <a:schemeClr val="tx1"/>
-          </a:fontRef>
-        </p:style>
-      </p:cxnSp>
-      <p:pic>
-        <p:nvPicPr>
           <p:cNvPr id="2" name="Picture 1"/>
-          <p:cNvPicPr>
-            <a:picLocks noChangeAspect="1"/>
-          </p:cNvPicPr>
-          <p:nvPr/>
-        </p:nvPicPr>
-        <p:blipFill>
-          <a:blip r:embed="rId28"/>
-          <a:stretch>
-            <a:fillRect/>
-          </a:stretch>
-        </p:blipFill>
-        <p:spPr>
-          <a:xfrm>
-            <a:off x="37332702" y="35016708"/>
-            <a:ext cx="2429846" cy="2429846"/>
-          </a:xfrm>
-          <a:prstGeom prst="rect">
-            <a:avLst/>
-          </a:prstGeom>
-        </p:spPr>
-      </p:pic>
-      <p:pic>
-        <p:nvPicPr>
-          <p:cNvPr id="3" name="Picture 2"/>
           <p:cNvPicPr>
             <a:picLocks noChangeAspect="1"/>
           </p:cNvPicPr>
@@ -11819,7 +11839,31 @@
         </p:blipFill>
         <p:spPr>
           <a:xfrm>
-            <a:off x="22274709" y="35183741"/>
+            <a:off x="3545814" y="39382087"/>
+            <a:ext cx="2429846" cy="2429846"/>
+          </a:xfrm>
+          <a:prstGeom prst="rect">
+            <a:avLst/>
+          </a:prstGeom>
+        </p:spPr>
+      </p:pic>
+      <p:pic>
+        <p:nvPicPr>
+          <p:cNvPr id="3" name="Picture 2"/>
+          <p:cNvPicPr>
+            <a:picLocks noChangeAspect="1"/>
+          </p:cNvPicPr>
+          <p:nvPr/>
+        </p:nvPicPr>
+        <p:blipFill>
+          <a:blip r:embed="rId30"/>
+          <a:stretch>
+            <a:fillRect/>
+          </a:stretch>
+        </p:blipFill>
+        <p:spPr>
+          <a:xfrm>
+            <a:off x="-11512179" y="39549120"/>
             <a:ext cx="2819561" cy="2314129"/>
           </a:xfrm>
           <a:prstGeom prst="rect">
@@ -11836,11 +11880,11 @@
           <p:nvPr/>
         </p:nvPicPr>
         <p:blipFill>
-          <a:blip r:embed="rId30">
+          <a:blip r:embed="rId31">
             <a:extLst>
               <a:ext uri="{BEBA8EAE-BF5A-486C-A8C5-ECC9F3942E4B}">
                 <a14:imgProps xmlns:a14="http://schemas.microsoft.com/office/drawing/2010/main">
-                  <a14:imgLayer r:embed="rId31">
+                  <a14:imgLayer r:embed="rId32">
                     <a14:imgEffect>
                       <a14:backgroundRemoval t="0" b="86328" l="11426" r="89844">
                         <a14:foregroundMark x1="34473" y1="86328" x2="34473" y2="86328"/>
@@ -11857,7 +11901,7 @@
         </p:blipFill>
         <p:spPr>
           <a:xfrm>
-            <a:off x="24430825" y="35241686"/>
+            <a:off x="-9356063" y="39607065"/>
             <a:ext cx="2621406" cy="2621406"/>
           </a:xfrm>
           <a:prstGeom prst="rect">
@@ -11874,14 +11918,14 @@
           <p:nvPr/>
         </p:nvPicPr>
         <p:blipFill>
-          <a:blip r:embed="rId32"/>
+          <a:blip r:embed="rId33"/>
           <a:stretch>
             <a:fillRect/>
           </a:stretch>
         </p:blipFill>
         <p:spPr>
           <a:xfrm>
-            <a:off x="37332702" y="31626924"/>
+            <a:off x="3545814" y="35992303"/>
             <a:ext cx="6030152" cy="572631"/>
           </a:xfrm>
           <a:prstGeom prst="rect">
@@ -11889,84 +11933,6 @@
           </a:prstGeom>
         </p:spPr>
       </p:pic>
-      <p:pic>
-        <p:nvPicPr>
-          <p:cNvPr id="83" name="Picture 82" descr="Screen Shot 2016-07-17 at 8.18.31 PM.png"/>
-          <p:cNvPicPr>
-            <a:picLocks noChangeAspect="1"/>
-          </p:cNvPicPr>
-          <p:nvPr/>
-        </p:nvPicPr>
-        <p:blipFill>
-          <a:blip r:embed="rId33">
-            <a:extLst>
-              <a:ext uri="{28A0092B-C50C-407E-A947-70E740481C1C}">
-                <a14:useLocalDpi xmlns:a14="http://schemas.microsoft.com/office/drawing/2010/main" val="0"/>
-              </a:ext>
-            </a:extLst>
-          </a:blip>
-          <a:stretch>
-            <a:fillRect/>
-          </a:stretch>
-        </p:blipFill>
-        <p:spPr>
-          <a:xfrm>
-            <a:off x="1358167" y="13294000"/>
-            <a:ext cx="16996161" cy="11338535"/>
-          </a:xfrm>
-          <a:prstGeom prst="rect">
-            <a:avLst/>
-          </a:prstGeom>
-        </p:spPr>
-      </p:pic>
-      <p:sp>
-        <p:nvSpPr>
-          <p:cNvPr id="21" name="Rounded Rectangular Callout 20"/>
-          <p:cNvSpPr/>
-          <p:nvPr/>
-        </p:nvSpPr>
-        <p:spPr>
-          <a:xfrm>
-            <a:off x="20016809" y="14579600"/>
-            <a:ext cx="22604391" cy="10449272"/>
-          </a:xfrm>
-          <a:prstGeom prst="wedgeRoundRectCallout">
-            <a:avLst>
-              <a:gd name="adj1" fmla="val 43474"/>
-              <a:gd name="adj2" fmla="val 60233"/>
-              <a:gd name="adj3" fmla="val 16667"/>
-            </a:avLst>
-          </a:prstGeom>
-          <a:noFill/>
-          <a:ln>
-            <a:solidFill>
-              <a:schemeClr val="tx1"/>
-            </a:solidFill>
-          </a:ln>
-        </p:spPr>
-        <p:style>
-          <a:lnRef idx="1">
-            <a:schemeClr val="accent1"/>
-          </a:lnRef>
-          <a:fillRef idx="3">
-            <a:schemeClr val="accent1"/>
-          </a:fillRef>
-          <a:effectRef idx="2">
-            <a:schemeClr val="accent1"/>
-          </a:effectRef>
-          <a:fontRef idx="minor">
-            <a:schemeClr val="lt1"/>
-          </a:fontRef>
-        </p:style>
-        <p:txBody>
-          <a:bodyPr rtlCol="0" anchor="ctr"/>
-          <a:lstStyle/>
-          <a:p>
-            <a:pPr algn="ctr"/>
-            <a:endParaRPr lang="en-US"/>
-          </a:p>
-        </p:txBody>
-      </p:sp>
     </p:spTree>
     <p:extLst>
       <p:ext uri="{BB962C8B-B14F-4D97-AF65-F5344CB8AC3E}">

</xml_diff>

<commit_message>
Adds links to all referenced tools.
Also adds new version of diagram. Shortens paper to fit in 10 pages
</commit_message>
<xml_diff>
--- a/paper/figures/diagrams.pptx
+++ b/paper/figures/diagrams.pptx
@@ -6,11 +6,12 @@
     <p:sldMasterId id="2147483660" r:id="rId2"/>
   </p:sldMasterIdLst>
   <p:notesMasterIdLst>
-    <p:notesMasterId r:id="rId5"/>
+    <p:notesMasterId r:id="rId6"/>
   </p:notesMasterIdLst>
   <p:sldIdLst>
     <p:sldId id="256" r:id="rId3"/>
     <p:sldId id="257" r:id="rId4"/>
+    <p:sldId id="258" r:id="rId5"/>
   </p:sldIdLst>
   <p:sldSz cx="43891200" cy="32918400"/>
   <p:notesSz cx="6858000" cy="9144000"/>
@@ -1217,6 +1218,224 @@
 </file>
 
 <file path=ppt/slideLayouts/slideLayout12.xml><?xml version="1.0" encoding="utf-8"?>
+<p:sldLayout xmlns:a="http://schemas.openxmlformats.org/drawingml/2006/main" xmlns:r="http://schemas.openxmlformats.org/officeDocument/2006/relationships" xmlns:p="http://schemas.openxmlformats.org/presentationml/2006/main" type="obj">
+  <p:cSld name="Title and Content">
+    <p:spTree>
+      <p:nvGrpSpPr>
+        <p:cNvPr id="1" name=""/>
+        <p:cNvGrpSpPr/>
+        <p:nvPr/>
+      </p:nvGrpSpPr>
+      <p:grpSpPr>
+        <a:xfrm>
+          <a:off x="0" y="0"/>
+          <a:ext cx="0" cy="0"/>
+          <a:chOff x="0" y="0"/>
+          <a:chExt cx="0" cy="0"/>
+        </a:xfrm>
+      </p:grpSpPr>
+      <p:sp>
+        <p:nvSpPr>
+          <p:cNvPr id="2" name="Title 1"/>
+          <p:cNvSpPr>
+            <a:spLocks noGrp="1"/>
+          </p:cNvSpPr>
+          <p:nvPr>
+            <p:ph type="title"/>
+          </p:nvPr>
+        </p:nvSpPr>
+        <p:spPr/>
+        <p:txBody>
+          <a:bodyPr/>
+          <a:lstStyle/>
+          <a:p>
+            <a:r>
+              <a:rPr lang="en-US" smtClean="0"/>
+              <a:t>Click to edit Master title style</a:t>
+            </a:r>
+            <a:endParaRPr lang="en-US"/>
+          </a:p>
+        </p:txBody>
+      </p:sp>
+      <p:sp>
+        <p:nvSpPr>
+          <p:cNvPr id="3" name="Content Placeholder 2"/>
+          <p:cNvSpPr>
+            <a:spLocks noGrp="1"/>
+          </p:cNvSpPr>
+          <p:nvPr>
+            <p:ph idx="1"/>
+          </p:nvPr>
+        </p:nvSpPr>
+        <p:spPr/>
+        <p:txBody>
+          <a:bodyPr/>
+          <a:lstStyle/>
+          <a:p>
+            <a:pPr lvl="0"/>
+            <a:r>
+              <a:rPr lang="en-US" smtClean="0"/>
+              <a:t>Click to edit Master text styles</a:t>
+            </a:r>
+          </a:p>
+          <a:p>
+            <a:pPr lvl="1"/>
+            <a:r>
+              <a:rPr lang="en-US" smtClean="0"/>
+              <a:t>Second level</a:t>
+            </a:r>
+          </a:p>
+          <a:p>
+            <a:pPr lvl="2"/>
+            <a:r>
+              <a:rPr lang="en-US" smtClean="0"/>
+              <a:t>Third level</a:t>
+            </a:r>
+          </a:p>
+          <a:p>
+            <a:pPr lvl="3"/>
+            <a:r>
+              <a:rPr lang="en-US" smtClean="0"/>
+              <a:t>Fourth level</a:t>
+            </a:r>
+          </a:p>
+          <a:p>
+            <a:pPr lvl="4"/>
+            <a:r>
+              <a:rPr lang="en-US" smtClean="0"/>
+              <a:t>Fifth level</a:t>
+            </a:r>
+            <a:endParaRPr lang="en-US"/>
+          </a:p>
+        </p:txBody>
+      </p:sp>
+      <p:sp>
+        <p:nvSpPr>
+          <p:cNvPr id="4" name="Date Placeholder 3"/>
+          <p:cNvSpPr>
+            <a:spLocks noGrp="1"/>
+          </p:cNvSpPr>
+          <p:nvPr>
+            <p:ph type="dt" sz="half" idx="10"/>
+          </p:nvPr>
+        </p:nvSpPr>
+        <p:spPr>
+          <a:xfrm>
+            <a:off x="2194560" y="30510482"/>
+            <a:ext cx="10241280" cy="1752600"/>
+          </a:xfrm>
+          <a:prstGeom prst="rect">
+            <a:avLst/>
+          </a:prstGeom>
+        </p:spPr>
+        <p:txBody>
+          <a:bodyPr/>
+          <a:lstStyle/>
+          <a:p>
+            <a:fld id="{14DFED3A-14C8-D747-897D-AFEB0A4F419F}" type="datetimeFigureOut">
+              <a:rPr lang="en-US" smtClean="0">
+                <a:solidFill>
+                  <a:prstClr val="black">
+                    <a:tint val="75000"/>
+                  </a:prstClr>
+                </a:solidFill>
+              </a:rPr>
+              <a:pPr/>
+              <a:t>1/20/17</a:t>
+            </a:fld>
+            <a:endParaRPr lang="en-US">
+              <a:solidFill>
+                <a:prstClr val="black">
+                  <a:tint val="75000"/>
+                </a:prstClr>
+              </a:solidFill>
+            </a:endParaRPr>
+          </a:p>
+        </p:txBody>
+      </p:sp>
+      <p:sp>
+        <p:nvSpPr>
+          <p:cNvPr id="5" name="Footer Placeholder 4"/>
+          <p:cNvSpPr>
+            <a:spLocks noGrp="1"/>
+          </p:cNvSpPr>
+          <p:nvPr>
+            <p:ph type="ftr" sz="quarter" idx="11"/>
+          </p:nvPr>
+        </p:nvSpPr>
+        <p:spPr>
+          <a:xfrm>
+            <a:off x="14996160" y="30510482"/>
+            <a:ext cx="13898880" cy="1752600"/>
+          </a:xfrm>
+          <a:prstGeom prst="rect">
+            <a:avLst/>
+          </a:prstGeom>
+        </p:spPr>
+        <p:txBody>
+          <a:bodyPr/>
+          <a:lstStyle/>
+          <a:p>
+            <a:endParaRPr lang="en-US">
+              <a:solidFill>
+                <a:prstClr val="black">
+                  <a:tint val="75000"/>
+                </a:prstClr>
+              </a:solidFill>
+            </a:endParaRPr>
+          </a:p>
+        </p:txBody>
+      </p:sp>
+      <p:sp>
+        <p:nvSpPr>
+          <p:cNvPr id="6" name="Slide Number Placeholder 5"/>
+          <p:cNvSpPr>
+            <a:spLocks noGrp="1"/>
+          </p:cNvSpPr>
+          <p:nvPr>
+            <p:ph type="sldNum" sz="quarter" idx="12"/>
+          </p:nvPr>
+        </p:nvSpPr>
+        <p:spPr/>
+        <p:txBody>
+          <a:bodyPr/>
+          <a:lstStyle/>
+          <a:p>
+            <a:fld id="{87583EC5-A978-DE45-AE47-732F80EBA852}" type="slidenum">
+              <a:rPr lang="en-US" smtClean="0">
+                <a:solidFill>
+                  <a:prstClr val="black">
+                    <a:tint val="75000"/>
+                  </a:prstClr>
+                </a:solidFill>
+              </a:rPr>
+              <a:pPr/>
+              <a:t>‹#›</a:t>
+            </a:fld>
+            <a:endParaRPr lang="en-US">
+              <a:solidFill>
+                <a:prstClr val="black">
+                  <a:tint val="75000"/>
+                </a:prstClr>
+              </a:solidFill>
+            </a:endParaRPr>
+          </a:p>
+        </p:txBody>
+      </p:sp>
+    </p:spTree>
+    <p:extLst>
+      <p:ext uri="{BB962C8B-B14F-4D97-AF65-F5344CB8AC3E}">
+        <p14:creationId xmlns:p14="http://schemas.microsoft.com/office/powerpoint/2010/main" val="1654872813"/>
+      </p:ext>
+    </p:extLst>
+  </p:cSld>
+  <p:clrMapOvr>
+    <a:masterClrMapping/>
+  </p:clrMapOvr>
+</p:sldLayout>
+</file>
+
+<file path=ppt/slideLayouts/slideLayout13.xml><?xml version="1.0" encoding="utf-8"?>
 <p:sldLayout xmlns:a="http://schemas.openxmlformats.org/drawingml/2006/main" xmlns:r="http://schemas.openxmlformats.org/officeDocument/2006/relationships" xmlns:p="http://schemas.openxmlformats.org/presentationml/2006/main" type="title" preserve="1">
   <p:cSld name="Title Slide">
     <p:spTree>
@@ -1408,7 +1627,7 @@
                 </a:solidFill>
               </a:rPr>
               <a:pPr/>
-              <a:t>8/15/16</a:t>
+              <a:t>1/20/17</a:t>
             </a:fld>
             <a:endParaRPr lang="en-US">
               <a:solidFill>
@@ -1494,7 +1713,7 @@
 </p:sldLayout>
 </file>
 
-<file path=ppt/slideLayouts/slideLayout13.xml><?xml version="1.0" encoding="utf-8"?>
+<file path=ppt/slideLayouts/slideLayout14.xml><?xml version="1.0" encoding="utf-8"?>
 <p:sldLayout xmlns:a="http://schemas.openxmlformats.org/drawingml/2006/main" xmlns:r="http://schemas.openxmlformats.org/officeDocument/2006/relationships" xmlns:p="http://schemas.openxmlformats.org/presentationml/2006/main" type="obj" preserve="1">
   <p:cSld name="Title and Content">
     <p:spTree>
@@ -1610,7 +1829,7 @@
                 </a:solidFill>
               </a:rPr>
               <a:pPr/>
-              <a:t>8/15/16</a:t>
+              <a:t>1/20/17</a:t>
             </a:fld>
             <a:endParaRPr lang="en-US">
               <a:solidFill>
@@ -1696,7 +1915,7 @@
 </p:sldLayout>
 </file>
 
-<file path=ppt/slideLayouts/slideLayout14.xml><?xml version="1.0" encoding="utf-8"?>
+<file path=ppt/slideLayouts/slideLayout15.xml><?xml version="1.0" encoding="utf-8"?>
 <p:sldLayout xmlns:a="http://schemas.openxmlformats.org/drawingml/2006/main" xmlns:r="http://schemas.openxmlformats.org/officeDocument/2006/relationships" xmlns:p="http://schemas.openxmlformats.org/presentationml/2006/main" type="secHead" preserve="1">
   <p:cSld name="Section Header">
     <p:spTree>
@@ -1888,7 +2107,7 @@
                 </a:solidFill>
               </a:rPr>
               <a:pPr/>
-              <a:t>8/15/16</a:t>
+              <a:t>1/20/17</a:t>
             </a:fld>
             <a:endParaRPr lang="en-US">
               <a:solidFill>
@@ -1974,7 +2193,7 @@
 </p:sldLayout>
 </file>
 
-<file path=ppt/slideLayouts/slideLayout15.xml><?xml version="1.0" encoding="utf-8"?>
+<file path=ppt/slideLayouts/slideLayout16.xml><?xml version="1.0" encoding="utf-8"?>
 <p:sldLayout xmlns:a="http://schemas.openxmlformats.org/drawingml/2006/main" xmlns:r="http://schemas.openxmlformats.org/officeDocument/2006/relationships" xmlns:p="http://schemas.openxmlformats.org/presentationml/2006/main" type="twoObj" preserve="1">
   <p:cSld name="Two Content">
     <p:spTree>
@@ -2208,7 +2427,7 @@
                 </a:solidFill>
               </a:rPr>
               <a:pPr/>
-              <a:t>8/15/16</a:t>
+              <a:t>1/20/17</a:t>
             </a:fld>
             <a:endParaRPr lang="en-US">
               <a:solidFill>
@@ -2294,7 +2513,7 @@
 </p:sldLayout>
 </file>
 
-<file path=ppt/slideLayouts/slideLayout16.xml><?xml version="1.0" encoding="utf-8"?>
+<file path=ppt/slideLayouts/slideLayout17.xml><?xml version="1.0" encoding="utf-8"?>
 <p:sldLayout xmlns:a="http://schemas.openxmlformats.org/drawingml/2006/main" xmlns:r="http://schemas.openxmlformats.org/officeDocument/2006/relationships" xmlns:p="http://schemas.openxmlformats.org/presentationml/2006/main" type="twoTxTwoObj" preserve="1">
   <p:cSld name="Comparison">
     <p:spTree>
@@ -2662,7 +2881,7 @@
                 </a:solidFill>
               </a:rPr>
               <a:pPr/>
-              <a:t>8/15/16</a:t>
+              <a:t>1/20/17</a:t>
             </a:fld>
             <a:endParaRPr lang="en-US">
               <a:solidFill>
@@ -2748,7 +2967,7 @@
 </p:sldLayout>
 </file>
 
-<file path=ppt/slideLayouts/slideLayout17.xml><?xml version="1.0" encoding="utf-8"?>
+<file path=ppt/slideLayouts/slideLayout18.xml><?xml version="1.0" encoding="utf-8"?>
 <p:sldLayout xmlns:a="http://schemas.openxmlformats.org/drawingml/2006/main" xmlns:r="http://schemas.openxmlformats.org/officeDocument/2006/relationships" xmlns:p="http://schemas.openxmlformats.org/presentationml/2006/main" type="titleOnly" preserve="1">
   <p:cSld name="Title Only">
     <p:spTree>
@@ -2812,7 +3031,7 @@
                 </a:solidFill>
               </a:rPr>
               <a:pPr/>
-              <a:t>8/15/16</a:t>
+              <a:t>1/20/17</a:t>
             </a:fld>
             <a:endParaRPr lang="en-US">
               <a:solidFill>
@@ -2898,7 +3117,7 @@
 </p:sldLayout>
 </file>
 
-<file path=ppt/slideLayouts/slideLayout18.xml><?xml version="1.0" encoding="utf-8"?>
+<file path=ppt/slideLayouts/slideLayout19.xml><?xml version="1.0" encoding="utf-8"?>
 <p:sldLayout xmlns:a="http://schemas.openxmlformats.org/drawingml/2006/main" xmlns:r="http://schemas.openxmlformats.org/officeDocument/2006/relationships" xmlns:p="http://schemas.openxmlformats.org/presentationml/2006/main" type="blank" preserve="1">
   <p:cSld name="Blank">
     <p:spTree>
@@ -2939,7 +3158,7 @@
                 </a:solidFill>
               </a:rPr>
               <a:pPr/>
-              <a:t>8/15/16</a:t>
+              <a:t>1/20/17</a:t>
             </a:fld>
             <a:endParaRPr lang="en-US">
               <a:solidFill>
@@ -3025,7 +3244,157 @@
 </p:sldLayout>
 </file>
 
-<file path=ppt/slideLayouts/slideLayout19.xml><?xml version="1.0" encoding="utf-8"?>
+<file path=ppt/slideLayouts/slideLayout2.xml><?xml version="1.0" encoding="utf-8"?>
+<p:sldLayout xmlns:a="http://schemas.openxmlformats.org/drawingml/2006/main" xmlns:r="http://schemas.openxmlformats.org/officeDocument/2006/relationships" xmlns:p="http://schemas.openxmlformats.org/presentationml/2006/main" type="secHead">
+  <p:cSld name="Section header">
+    <p:spTree>
+      <p:nvGrpSpPr>
+        <p:cNvPr id="1" name="Shape 13"/>
+        <p:cNvGrpSpPr/>
+        <p:nvPr/>
+      </p:nvGrpSpPr>
+      <p:grpSpPr>
+        <a:xfrm>
+          <a:off x="0" y="0"/>
+          <a:ext cx="0" cy="0"/>
+          <a:chOff x="0" y="0"/>
+          <a:chExt cx="0" cy="0"/>
+        </a:xfrm>
+      </p:grpSpPr>
+      <p:sp>
+        <p:nvSpPr>
+          <p:cNvPr id="14" name="Shape 14"/>
+          <p:cNvSpPr txBox="1">
+            <a:spLocks noGrp="1"/>
+          </p:cNvSpPr>
+          <p:nvPr>
+            <p:ph type="title"/>
+          </p:nvPr>
+        </p:nvSpPr>
+        <p:spPr>
+          <a:xfrm>
+            <a:off x="1496162" y="13765440"/>
+            <a:ext cx="40899000" cy="5387699"/>
+          </a:xfrm>
+          <a:prstGeom prst="rect">
+            <a:avLst/>
+          </a:prstGeom>
+        </p:spPr>
+        <p:txBody>
+          <a:bodyPr lIns="552588" tIns="552588" rIns="552588" bIns="552588" anchor="ctr" anchorCtr="0"/>
+          <a:lstStyle>
+            <a:lvl1pPr lvl="0" algn="ctr">
+              <a:spcBef>
+                <a:spcPts val="0"/>
+              </a:spcBef>
+              <a:buSzPct val="100000"/>
+              <a:defRPr sz="22000"/>
+            </a:lvl1pPr>
+            <a:lvl2pPr lvl="1" algn="ctr">
+              <a:spcBef>
+                <a:spcPts val="0"/>
+              </a:spcBef>
+              <a:buSzPct val="100000"/>
+              <a:defRPr sz="22000"/>
+            </a:lvl2pPr>
+            <a:lvl3pPr lvl="2" algn="ctr">
+              <a:spcBef>
+                <a:spcPts val="0"/>
+              </a:spcBef>
+              <a:buSzPct val="100000"/>
+              <a:defRPr sz="22000"/>
+            </a:lvl3pPr>
+            <a:lvl4pPr lvl="3" algn="ctr">
+              <a:spcBef>
+                <a:spcPts val="0"/>
+              </a:spcBef>
+              <a:buSzPct val="100000"/>
+              <a:defRPr sz="22000"/>
+            </a:lvl4pPr>
+            <a:lvl5pPr lvl="4" algn="ctr">
+              <a:spcBef>
+                <a:spcPts val="0"/>
+              </a:spcBef>
+              <a:buSzPct val="100000"/>
+              <a:defRPr sz="22000"/>
+            </a:lvl5pPr>
+            <a:lvl6pPr lvl="5" algn="ctr">
+              <a:spcBef>
+                <a:spcPts val="0"/>
+              </a:spcBef>
+              <a:buSzPct val="100000"/>
+              <a:defRPr sz="22000"/>
+            </a:lvl6pPr>
+            <a:lvl7pPr lvl="6" algn="ctr">
+              <a:spcBef>
+                <a:spcPts val="0"/>
+              </a:spcBef>
+              <a:buSzPct val="100000"/>
+              <a:defRPr sz="22000"/>
+            </a:lvl7pPr>
+            <a:lvl8pPr lvl="7" algn="ctr">
+              <a:spcBef>
+                <a:spcPts val="0"/>
+              </a:spcBef>
+              <a:buSzPct val="100000"/>
+              <a:defRPr sz="22000"/>
+            </a:lvl8pPr>
+            <a:lvl9pPr lvl="8" algn="ctr">
+              <a:spcBef>
+                <a:spcPts val="0"/>
+              </a:spcBef>
+              <a:buSzPct val="100000"/>
+              <a:defRPr sz="22000"/>
+            </a:lvl9pPr>
+          </a:lstStyle>
+          <a:p>
+            <a:endParaRPr/>
+          </a:p>
+        </p:txBody>
+      </p:sp>
+      <p:sp>
+        <p:nvSpPr>
+          <p:cNvPr id="15" name="Shape 15"/>
+          <p:cNvSpPr txBox="1">
+            <a:spLocks noGrp="1"/>
+          </p:cNvSpPr>
+          <p:nvPr>
+            <p:ph type="sldNum" idx="12"/>
+          </p:nvPr>
+        </p:nvSpPr>
+        <p:spPr>
+          <a:xfrm>
+            <a:off x="40667794" y="29844592"/>
+            <a:ext cx="2633702" cy="2519098"/>
+          </a:xfrm>
+          <a:prstGeom prst="rect">
+            <a:avLst/>
+          </a:prstGeom>
+        </p:spPr>
+        <p:txBody>
+          <a:bodyPr lIns="552588" tIns="552588" rIns="552588" bIns="552588" anchor="ctr" anchorCtr="0">
+            <a:noAutofit/>
+          </a:bodyPr>
+          <a:lstStyle/>
+          <a:p>
+            <a:fld id="{00000000-1234-1234-1234-123412341234}" type="slidenum">
+              <a:rPr lang="en" smtClean="0"/>
+              <a:pPr/>
+              <a:t>‹#›</a:t>
+            </a:fld>
+            <a:endParaRPr lang="en"/>
+          </a:p>
+        </p:txBody>
+      </p:sp>
+    </p:spTree>
+  </p:cSld>
+  <p:clrMapOvr>
+    <a:masterClrMapping/>
+  </p:clrMapOvr>
+</p:sldLayout>
+</file>
+
+<file path=ppt/slideLayouts/slideLayout20.xml><?xml version="1.0" encoding="utf-8"?>
 <p:sldLayout xmlns:a="http://schemas.openxmlformats.org/drawingml/2006/main" xmlns:r="http://schemas.openxmlformats.org/officeDocument/2006/relationships" xmlns:p="http://schemas.openxmlformats.org/presentationml/2006/main" type="objTx" preserve="1">
   <p:cSld name="Content with Caption">
     <p:spTree>
@@ -3248,7 +3617,7 @@
                 </a:solidFill>
               </a:rPr>
               <a:pPr/>
-              <a:t>8/15/16</a:t>
+              <a:t>1/20/17</a:t>
             </a:fld>
             <a:endParaRPr lang="en-US">
               <a:solidFill>
@@ -3334,157 +3703,7 @@
 </p:sldLayout>
 </file>
 
-<file path=ppt/slideLayouts/slideLayout2.xml><?xml version="1.0" encoding="utf-8"?>
-<p:sldLayout xmlns:a="http://schemas.openxmlformats.org/drawingml/2006/main" xmlns:r="http://schemas.openxmlformats.org/officeDocument/2006/relationships" xmlns:p="http://schemas.openxmlformats.org/presentationml/2006/main" type="secHead">
-  <p:cSld name="Section header">
-    <p:spTree>
-      <p:nvGrpSpPr>
-        <p:cNvPr id="1" name="Shape 13"/>
-        <p:cNvGrpSpPr/>
-        <p:nvPr/>
-      </p:nvGrpSpPr>
-      <p:grpSpPr>
-        <a:xfrm>
-          <a:off x="0" y="0"/>
-          <a:ext cx="0" cy="0"/>
-          <a:chOff x="0" y="0"/>
-          <a:chExt cx="0" cy="0"/>
-        </a:xfrm>
-      </p:grpSpPr>
-      <p:sp>
-        <p:nvSpPr>
-          <p:cNvPr id="14" name="Shape 14"/>
-          <p:cNvSpPr txBox="1">
-            <a:spLocks noGrp="1"/>
-          </p:cNvSpPr>
-          <p:nvPr>
-            <p:ph type="title"/>
-          </p:nvPr>
-        </p:nvSpPr>
-        <p:spPr>
-          <a:xfrm>
-            <a:off x="1496162" y="13765440"/>
-            <a:ext cx="40899000" cy="5387699"/>
-          </a:xfrm>
-          <a:prstGeom prst="rect">
-            <a:avLst/>
-          </a:prstGeom>
-        </p:spPr>
-        <p:txBody>
-          <a:bodyPr lIns="552588" tIns="552588" rIns="552588" bIns="552588" anchor="ctr" anchorCtr="0"/>
-          <a:lstStyle>
-            <a:lvl1pPr lvl="0" algn="ctr">
-              <a:spcBef>
-                <a:spcPts val="0"/>
-              </a:spcBef>
-              <a:buSzPct val="100000"/>
-              <a:defRPr sz="22000"/>
-            </a:lvl1pPr>
-            <a:lvl2pPr lvl="1" algn="ctr">
-              <a:spcBef>
-                <a:spcPts val="0"/>
-              </a:spcBef>
-              <a:buSzPct val="100000"/>
-              <a:defRPr sz="22000"/>
-            </a:lvl2pPr>
-            <a:lvl3pPr lvl="2" algn="ctr">
-              <a:spcBef>
-                <a:spcPts val="0"/>
-              </a:spcBef>
-              <a:buSzPct val="100000"/>
-              <a:defRPr sz="22000"/>
-            </a:lvl3pPr>
-            <a:lvl4pPr lvl="3" algn="ctr">
-              <a:spcBef>
-                <a:spcPts val="0"/>
-              </a:spcBef>
-              <a:buSzPct val="100000"/>
-              <a:defRPr sz="22000"/>
-            </a:lvl4pPr>
-            <a:lvl5pPr lvl="4" algn="ctr">
-              <a:spcBef>
-                <a:spcPts val="0"/>
-              </a:spcBef>
-              <a:buSzPct val="100000"/>
-              <a:defRPr sz="22000"/>
-            </a:lvl5pPr>
-            <a:lvl6pPr lvl="5" algn="ctr">
-              <a:spcBef>
-                <a:spcPts val="0"/>
-              </a:spcBef>
-              <a:buSzPct val="100000"/>
-              <a:defRPr sz="22000"/>
-            </a:lvl6pPr>
-            <a:lvl7pPr lvl="6" algn="ctr">
-              <a:spcBef>
-                <a:spcPts val="0"/>
-              </a:spcBef>
-              <a:buSzPct val="100000"/>
-              <a:defRPr sz="22000"/>
-            </a:lvl7pPr>
-            <a:lvl8pPr lvl="7" algn="ctr">
-              <a:spcBef>
-                <a:spcPts val="0"/>
-              </a:spcBef>
-              <a:buSzPct val="100000"/>
-              <a:defRPr sz="22000"/>
-            </a:lvl8pPr>
-            <a:lvl9pPr lvl="8" algn="ctr">
-              <a:spcBef>
-                <a:spcPts val="0"/>
-              </a:spcBef>
-              <a:buSzPct val="100000"/>
-              <a:defRPr sz="22000"/>
-            </a:lvl9pPr>
-          </a:lstStyle>
-          <a:p>
-            <a:endParaRPr/>
-          </a:p>
-        </p:txBody>
-      </p:sp>
-      <p:sp>
-        <p:nvSpPr>
-          <p:cNvPr id="15" name="Shape 15"/>
-          <p:cNvSpPr txBox="1">
-            <a:spLocks noGrp="1"/>
-          </p:cNvSpPr>
-          <p:nvPr>
-            <p:ph type="sldNum" idx="12"/>
-          </p:nvPr>
-        </p:nvSpPr>
-        <p:spPr>
-          <a:xfrm>
-            <a:off x="40667794" y="29844592"/>
-            <a:ext cx="2633702" cy="2519098"/>
-          </a:xfrm>
-          <a:prstGeom prst="rect">
-            <a:avLst/>
-          </a:prstGeom>
-        </p:spPr>
-        <p:txBody>
-          <a:bodyPr lIns="552588" tIns="552588" rIns="552588" bIns="552588" anchor="ctr" anchorCtr="0">
-            <a:noAutofit/>
-          </a:bodyPr>
-          <a:lstStyle/>
-          <a:p>
-            <a:fld id="{00000000-1234-1234-1234-123412341234}" type="slidenum">
-              <a:rPr lang="en" smtClean="0"/>
-              <a:pPr/>
-              <a:t>‹#›</a:t>
-            </a:fld>
-            <a:endParaRPr lang="en"/>
-          </a:p>
-        </p:txBody>
-      </p:sp>
-    </p:spTree>
-  </p:cSld>
-  <p:clrMapOvr>
-    <a:masterClrMapping/>
-  </p:clrMapOvr>
-</p:sldLayout>
-</file>
-
-<file path=ppt/slideLayouts/slideLayout20.xml><?xml version="1.0" encoding="utf-8"?>
+<file path=ppt/slideLayouts/slideLayout21.xml><?xml version="1.0" encoding="utf-8"?>
 <p:sldLayout xmlns:a="http://schemas.openxmlformats.org/drawingml/2006/main" xmlns:r="http://schemas.openxmlformats.org/officeDocument/2006/relationships" xmlns:p="http://schemas.openxmlformats.org/presentationml/2006/main" type="picTx" preserve="1">
   <p:cSld name="Picture with Caption">
     <p:spTree>
@@ -3687,7 +3906,7 @@
                 </a:solidFill>
               </a:rPr>
               <a:pPr/>
-              <a:t>8/15/16</a:t>
+              <a:t>1/20/17</a:t>
             </a:fld>
             <a:endParaRPr lang="en-US">
               <a:solidFill>
@@ -3773,7 +3992,7 @@
 </p:sldLayout>
 </file>
 
-<file path=ppt/slideLayouts/slideLayout21.xml><?xml version="1.0" encoding="utf-8"?>
+<file path=ppt/slideLayouts/slideLayout22.xml><?xml version="1.0" encoding="utf-8"?>
 <p:sldLayout xmlns:a="http://schemas.openxmlformats.org/drawingml/2006/main" xmlns:r="http://schemas.openxmlformats.org/officeDocument/2006/relationships" xmlns:p="http://schemas.openxmlformats.org/presentationml/2006/main" type="vertTx" preserve="1">
   <p:cSld name="Title and Vertical Text">
     <p:spTree>
@@ -3889,7 +4108,7 @@
                 </a:solidFill>
               </a:rPr>
               <a:pPr/>
-              <a:t>8/15/16</a:t>
+              <a:t>1/20/17</a:t>
             </a:fld>
             <a:endParaRPr lang="en-US">
               <a:solidFill>
@@ -3975,7 +4194,7 @@
 </p:sldLayout>
 </file>
 
-<file path=ppt/slideLayouts/slideLayout22.xml><?xml version="1.0" encoding="utf-8"?>
+<file path=ppt/slideLayouts/slideLayout23.xml><?xml version="1.0" encoding="utf-8"?>
 <p:sldLayout xmlns:a="http://schemas.openxmlformats.org/drawingml/2006/main" xmlns:r="http://schemas.openxmlformats.org/officeDocument/2006/relationships" xmlns:p="http://schemas.openxmlformats.org/presentationml/2006/main" type="vertTitleAndTx" preserve="1">
   <p:cSld name="Vertical Title and Text">
     <p:spTree>
@@ -4101,7 +4320,7 @@
                 </a:solidFill>
               </a:rPr>
               <a:pPr/>
-              <a:t>8/15/16</a:t>
+              <a:t>1/20/17</a:t>
             </a:fld>
             <a:endParaRPr lang="en-US">
               <a:solidFill>
@@ -6254,6 +6473,7 @@
     <p:sldLayoutId id="2147483656" r:id="rId9"/>
     <p:sldLayoutId id="2147483657" r:id="rId10"/>
     <p:sldLayoutId id="2147483658" r:id="rId11"/>
+    <p:sldLayoutId id="2147483672" r:id="rId12"/>
   </p:sldLayoutIdLst>
   <p:hf sldNum="0" hdr="0" ftr="0" dt="0"/>
   <p:txStyles>
@@ -6862,7 +7082,7 @@
                 <a:ea typeface="+mn-ea"/>
               </a:rPr>
               <a:pPr defTabSz="2194560"/>
-              <a:t>8/15/16</a:t>
+              <a:t>1/20/17</a:t>
             </a:fld>
             <a:endParaRPr lang="en-US" kern="1200">
               <a:solidFill>
@@ -9290,78 +9510,6 @@
       </p:grpSpPr>
       <p:pic>
         <p:nvPicPr>
-          <p:cNvPr id="73" name="Picture 72"/>
-          <p:cNvPicPr>
-            <a:picLocks noChangeAspect="1"/>
-          </p:cNvPicPr>
-          <p:nvPr/>
-        </p:nvPicPr>
-        <p:blipFill>
-          <a:blip r:embed="rId2"/>
-          <a:stretch>
-            <a:fillRect/>
-          </a:stretch>
-        </p:blipFill>
-        <p:spPr>
-          <a:xfrm>
-            <a:off x="-11512179" y="20515456"/>
-            <a:ext cx="21832324" cy="9237346"/>
-          </a:xfrm>
-          <a:prstGeom prst="rect">
-            <a:avLst/>
-          </a:prstGeom>
-        </p:spPr>
-      </p:pic>
-      <p:sp>
-        <p:nvSpPr>
-          <p:cNvPr id="21" name="Rounded Rectangular Callout 20"/>
-          <p:cNvSpPr/>
-          <p:nvPr/>
-        </p:nvSpPr>
-        <p:spPr>
-          <a:xfrm>
-            <a:off x="-11887303" y="19700856"/>
-            <a:ext cx="22604391" cy="10449272"/>
-          </a:xfrm>
-          <a:prstGeom prst="wedgeRoundRectCallout">
-            <a:avLst>
-              <a:gd name="adj1" fmla="val 31677"/>
-              <a:gd name="adj2" fmla="val 59018"/>
-              <a:gd name="adj3" fmla="val 16667"/>
-            </a:avLst>
-          </a:prstGeom>
-          <a:noFill/>
-          <a:ln>
-            <a:solidFill>
-              <a:schemeClr val="tx1"/>
-            </a:solidFill>
-          </a:ln>
-        </p:spPr>
-        <p:style>
-          <a:lnRef idx="1">
-            <a:schemeClr val="accent1"/>
-          </a:lnRef>
-          <a:fillRef idx="3">
-            <a:schemeClr val="accent1"/>
-          </a:fillRef>
-          <a:effectRef idx="2">
-            <a:schemeClr val="accent1"/>
-          </a:effectRef>
-          <a:fontRef idx="minor">
-            <a:schemeClr val="lt1"/>
-          </a:fontRef>
-        </p:style>
-        <p:txBody>
-          <a:bodyPr rtlCol="0" anchor="ctr"/>
-          <a:lstStyle/>
-          <a:p>
-            <a:pPr algn="ctr"/>
-            <a:endParaRPr lang="en-US"/>
-          </a:p>
-        </p:txBody>
-      </p:sp>
-      <p:pic>
-        <p:nvPicPr>
           <p:cNvPr id="83" name="Picture 82" descr="Screen Shot 2016-07-17 at 8.18.31 PM.png"/>
           <p:cNvPicPr>
             <a:picLocks noChangeAspect="1"/>
@@ -9369,7 +9517,7 @@
           <p:nvPr/>
         </p:nvPicPr>
         <p:blipFill>
-          <a:blip r:embed="rId3">
+          <a:blip r:embed="rId2">
             <a:extLst>
               <a:ext uri="{28A0092B-C50C-407E-A947-70E740481C1C}">
                 <a14:useLocalDpi xmlns:a14="http://schemas.microsoft.com/office/drawing/2010/main" val="0"/>
@@ -9382,7 +9530,7 @@
         </p:blipFill>
         <p:spPr>
           <a:xfrm>
-            <a:off x="31704428" y="-3140479"/>
+            <a:off x="24348454" y="3284640"/>
             <a:ext cx="16996161" cy="11338535"/>
           </a:xfrm>
           <a:prstGeom prst="rect">
@@ -9390,90 +9538,6 @@
           </a:prstGeom>
         </p:spPr>
       </p:pic>
-      <p:cxnSp>
-        <p:nvCxnSpPr>
-          <p:cNvPr id="74" name="Shape 79"/>
-          <p:cNvCxnSpPr/>
-          <p:nvPr/>
-        </p:nvCxnSpPr>
-        <p:spPr>
-          <a:xfrm rot="16200000" flipH="1" flipV="1">
-            <a:off x="-7260365" y="29609738"/>
-            <a:ext cx="832291" cy="13101470"/>
-          </a:xfrm>
-          <a:prstGeom prst="curvedConnector3">
-            <a:avLst>
-              <a:gd name="adj1" fmla="val -203506"/>
-            </a:avLst>
-          </a:prstGeom>
-          <a:noFill/>
-          <a:ln w="127000" cap="flat" cmpd="sng">
-            <a:solidFill>
-              <a:srgbClr val="595959"/>
-            </a:solidFill>
-            <a:prstDash val="solid"/>
-            <a:round/>
-            <a:headEnd type="none" w="lg" len="lg"/>
-            <a:tailEnd type="triangle" w="lg" len="lg"/>
-          </a:ln>
-        </p:spPr>
-      </p:cxnSp>
-      <p:cxnSp>
-        <p:nvCxnSpPr>
-          <p:cNvPr id="75" name="Shape 79"/>
-          <p:cNvCxnSpPr/>
-          <p:nvPr/>
-        </p:nvCxnSpPr>
-        <p:spPr>
-          <a:xfrm rot="16200000" flipH="1" flipV="1">
-            <a:off x="-12892308" y="27866702"/>
-            <a:ext cx="4721198" cy="20476445"/>
-          </a:xfrm>
-          <a:prstGeom prst="curvedConnector3">
-            <a:avLst>
-              <a:gd name="adj1" fmla="val -63947"/>
-            </a:avLst>
-          </a:prstGeom>
-          <a:noFill/>
-          <a:ln w="127000" cap="flat" cmpd="sng">
-            <a:solidFill>
-              <a:srgbClr val="595959"/>
-            </a:solidFill>
-            <a:prstDash val="solid"/>
-            <a:round/>
-            <a:headEnd type="none" w="lg" len="lg"/>
-            <a:tailEnd type="triangle" w="lg" len="lg"/>
-          </a:ln>
-        </p:spPr>
-      </p:cxnSp>
-      <p:cxnSp>
-        <p:nvCxnSpPr>
-          <p:cNvPr id="76" name="Shape 79"/>
-          <p:cNvCxnSpPr/>
-          <p:nvPr/>
-        </p:nvCxnSpPr>
-        <p:spPr>
-          <a:xfrm rot="16200000" flipV="1">
-            <a:off x="-15391097" y="20646715"/>
-            <a:ext cx="2343806" cy="27851424"/>
-          </a:xfrm>
-          <a:prstGeom prst="curvedConnector3">
-            <a:avLst>
-              <a:gd name="adj1" fmla="val 182329"/>
-            </a:avLst>
-          </a:prstGeom>
-          <a:noFill/>
-          <a:ln w="127000" cap="flat" cmpd="sng">
-            <a:solidFill>
-              <a:srgbClr val="595959"/>
-            </a:solidFill>
-            <a:prstDash val="solid"/>
-            <a:round/>
-            <a:headEnd type="none" w="lg" len="lg"/>
-            <a:tailEnd type="triangle" w="lg" len="lg"/>
-          </a:ln>
-        </p:spPr>
-      </p:cxnSp>
       <p:grpSp>
         <p:nvGrpSpPr>
           <p:cNvPr id="4" name="Group 3"/>
@@ -9482,7 +9546,7 @@
         </p:nvGrpSpPr>
         <p:grpSpPr>
           <a:xfrm>
-            <a:off x="7768866" y="6112068"/>
+            <a:off x="412892" y="12537187"/>
             <a:ext cx="42560640" cy="12748685"/>
             <a:chOff x="148549" y="1623925"/>
             <a:chExt cx="8866800" cy="2655976"/>
@@ -10083,7 +10147,7 @@
         </p:nvCxnSpPr>
         <p:spPr>
           <a:xfrm rot="16200000" flipH="1" flipV="1">
-            <a:off x="33278577" y="3153638"/>
+            <a:off x="25922603" y="9578757"/>
             <a:ext cx="832291" cy="13101470"/>
           </a:xfrm>
           <a:prstGeom prst="curvedConnector3">
@@ -10114,7 +10178,7 @@
         </p:nvCxnSpPr>
         <p:spPr>
           <a:xfrm rot="16200000" flipH="1" flipV="1">
-            <a:off x="27646633" y="1410602"/>
+            <a:off x="20290659" y="7835721"/>
             <a:ext cx="4721198" cy="20476445"/>
           </a:xfrm>
           <a:prstGeom prst="curvedConnector3">
@@ -10145,7 +10209,7 @@
         </p:nvCxnSpPr>
         <p:spPr>
           <a:xfrm rot="16200000" flipV="1">
-            <a:off x="25147849" y="-5809385"/>
+            <a:off x="17791875" y="615734"/>
             <a:ext cx="2343806" cy="27851424"/>
           </a:xfrm>
           <a:prstGeom prst="curvedConnector3">
@@ -10165,6 +10229,249 @@
           </a:ln>
         </p:spPr>
       </p:cxnSp>
+    </p:spTree>
+    <p:extLst>
+      <p:ext uri="{BB962C8B-B14F-4D97-AF65-F5344CB8AC3E}">
+        <p14:creationId xmlns:p14="http://schemas.microsoft.com/office/powerpoint/2010/main" val="3449162792"/>
+      </p:ext>
+    </p:extLst>
+  </p:cSld>
+  <p:clrMapOvr>
+    <a:masterClrMapping/>
+  </p:clrMapOvr>
+  <p:timing>
+    <p:tnLst>
+      <p:par>
+        <p:cTn xmlns:p14="http://schemas.microsoft.com/office/powerpoint/2010/main" id="1" dur="indefinite" restart="never" nodeType="tmRoot">
+          <p:childTnLst>
+            <p:seq concurrent="1" nextAc="seek">
+              <p:cTn id="2" dur="indefinite" nodeType="mainSeq">
+                <p:childTnLst>
+                  <p:par>
+                    <p:cTn id="3" fill="hold">
+                      <p:stCondLst>
+                        <p:cond delay="indefinite"/>
+                      </p:stCondLst>
+                      <p:childTnLst>
+                        <p:par>
+                          <p:cTn id="4" fill="hold">
+                            <p:stCondLst>
+                              <p:cond delay="0"/>
+                            </p:stCondLst>
+                            <p:childTnLst>
+                              <p:par>
+                                <p:cTn id="5" presetID="1" presetClass="entr" presetSubtype="0" fill="hold" nodeType="clickEffect">
+                                  <p:stCondLst>
+                                    <p:cond delay="0"/>
+                                  </p:stCondLst>
+                                  <p:childTnLst>
+                                    <p:set>
+                                      <p:cBhvr>
+                                        <p:cTn id="6" dur="1" fill="hold">
+                                          <p:stCondLst>
+                                            <p:cond delay="0"/>
+                                          </p:stCondLst>
+                                        </p:cTn>
+                                        <p:tgtEl>
+                                          <p:spTgt spid="20"/>
+                                        </p:tgtEl>
+                                        <p:attrNameLst>
+                                          <p:attrName>style.visibility</p:attrName>
+                                        </p:attrNameLst>
+                                      </p:cBhvr>
+                                      <p:to>
+                                        <p:strVal val="visible"/>
+                                      </p:to>
+                                    </p:set>
+                                  </p:childTnLst>
+                                </p:cTn>
+                              </p:par>
+                              <p:par>
+                                <p:cTn id="7" presetID="1" presetClass="entr" presetSubtype="0" fill="hold" nodeType="withEffect">
+                                  <p:stCondLst>
+                                    <p:cond delay="0"/>
+                                  </p:stCondLst>
+                                  <p:childTnLst>
+                                    <p:set>
+                                      <p:cBhvr>
+                                        <p:cTn id="8" dur="1" fill="hold">
+                                          <p:stCondLst>
+                                            <p:cond delay="0"/>
+                                          </p:stCondLst>
+                                        </p:cTn>
+                                        <p:tgtEl>
+                                          <p:spTgt spid="19"/>
+                                        </p:tgtEl>
+                                        <p:attrNameLst>
+                                          <p:attrName>style.visibility</p:attrName>
+                                        </p:attrNameLst>
+                                      </p:cBhvr>
+                                      <p:to>
+                                        <p:strVal val="visible"/>
+                                      </p:to>
+                                    </p:set>
+                                  </p:childTnLst>
+                                </p:cTn>
+                              </p:par>
+                              <p:par>
+                                <p:cTn id="9" presetID="1" presetClass="entr" presetSubtype="0" fill="hold" nodeType="withEffect">
+                                  <p:stCondLst>
+                                    <p:cond delay="0"/>
+                                  </p:stCondLst>
+                                  <p:childTnLst>
+                                    <p:set>
+                                      <p:cBhvr>
+                                        <p:cTn id="10" dur="1" fill="hold">
+                                          <p:stCondLst>
+                                            <p:cond delay="0"/>
+                                          </p:stCondLst>
+                                        </p:cTn>
+                                        <p:tgtEl>
+                                          <p:spTgt spid="18"/>
+                                        </p:tgtEl>
+                                        <p:attrNameLst>
+                                          <p:attrName>style.visibility</p:attrName>
+                                        </p:attrNameLst>
+                                      </p:cBhvr>
+                                      <p:to>
+                                        <p:strVal val="visible"/>
+                                      </p:to>
+                                    </p:set>
+                                  </p:childTnLst>
+                                </p:cTn>
+                              </p:par>
+                            </p:childTnLst>
+                          </p:cTn>
+                        </p:par>
+                      </p:childTnLst>
+                    </p:cTn>
+                  </p:par>
+                </p:childTnLst>
+              </p:cTn>
+              <p:prevCondLst>
+                <p:cond evt="onPrev" delay="0">
+                  <p:tgtEl>
+                    <p:sldTgt/>
+                  </p:tgtEl>
+                </p:cond>
+              </p:prevCondLst>
+              <p:nextCondLst>
+                <p:cond evt="onNext" delay="0">
+                  <p:tgtEl>
+                    <p:sldTgt/>
+                  </p:tgtEl>
+                </p:cond>
+              </p:nextCondLst>
+            </p:seq>
+          </p:childTnLst>
+        </p:cTn>
+      </p:par>
+    </p:tnLst>
+  </p:timing>
+</p:sld>
+</file>
+
+<file path=ppt/slides/slide3.xml><?xml version="1.0" encoding="utf-8"?>
+<p:sld xmlns:a="http://schemas.openxmlformats.org/drawingml/2006/main" xmlns:r="http://schemas.openxmlformats.org/officeDocument/2006/relationships" xmlns:p="http://schemas.openxmlformats.org/presentationml/2006/main">
+  <p:cSld>
+    <p:spTree>
+      <p:nvGrpSpPr>
+        <p:cNvPr id="1" name=""/>
+        <p:cNvGrpSpPr/>
+        <p:nvPr/>
+      </p:nvGrpSpPr>
+      <p:grpSpPr>
+        <a:xfrm>
+          <a:off x="0" y="0"/>
+          <a:ext cx="0" cy="0"/>
+          <a:chOff x="0" y="0"/>
+          <a:chExt cx="0" cy="0"/>
+        </a:xfrm>
+      </p:grpSpPr>
+      <p:cxnSp>
+        <p:nvCxnSpPr>
+          <p:cNvPr id="74" name="Shape 79"/>
+          <p:cNvCxnSpPr/>
+          <p:nvPr/>
+        </p:nvCxnSpPr>
+        <p:spPr>
+          <a:xfrm rot="16200000" flipH="1" flipV="1">
+            <a:off x="26539244" y="3198833"/>
+            <a:ext cx="832291" cy="13101470"/>
+          </a:xfrm>
+          <a:prstGeom prst="curvedConnector3">
+            <a:avLst>
+              <a:gd name="adj1" fmla="val -203506"/>
+            </a:avLst>
+          </a:prstGeom>
+          <a:noFill/>
+          <a:ln w="127000" cap="flat" cmpd="sng">
+            <a:solidFill>
+              <a:srgbClr val="595959"/>
+            </a:solidFill>
+            <a:prstDash val="solid"/>
+            <a:round/>
+            <a:headEnd type="none" w="lg" len="lg"/>
+            <a:tailEnd type="triangle" w="lg" len="lg"/>
+          </a:ln>
+        </p:spPr>
+      </p:cxnSp>
+      <p:cxnSp>
+        <p:nvCxnSpPr>
+          <p:cNvPr id="75" name="Shape 79"/>
+          <p:cNvCxnSpPr/>
+          <p:nvPr/>
+        </p:nvCxnSpPr>
+        <p:spPr>
+          <a:xfrm rot="16200000" flipH="1" flipV="1">
+            <a:off x="20907301" y="1455797"/>
+            <a:ext cx="4721198" cy="20476445"/>
+          </a:xfrm>
+          <a:prstGeom prst="curvedConnector3">
+            <a:avLst>
+              <a:gd name="adj1" fmla="val -63947"/>
+            </a:avLst>
+          </a:prstGeom>
+          <a:noFill/>
+          <a:ln w="127000" cap="flat" cmpd="sng">
+            <a:solidFill>
+              <a:srgbClr val="595959"/>
+            </a:solidFill>
+            <a:prstDash val="solid"/>
+            <a:round/>
+            <a:headEnd type="none" w="lg" len="lg"/>
+            <a:tailEnd type="triangle" w="lg" len="lg"/>
+          </a:ln>
+        </p:spPr>
+      </p:cxnSp>
+      <p:cxnSp>
+        <p:nvCxnSpPr>
+          <p:cNvPr id="76" name="Shape 79"/>
+          <p:cNvCxnSpPr/>
+          <p:nvPr/>
+        </p:nvCxnSpPr>
+        <p:spPr>
+          <a:xfrm rot="16200000" flipV="1">
+            <a:off x="18408512" y="-5764190"/>
+            <a:ext cx="2343806" cy="27851424"/>
+          </a:xfrm>
+          <a:prstGeom prst="curvedConnector3">
+            <a:avLst>
+              <a:gd name="adj1" fmla="val 182329"/>
+            </a:avLst>
+          </a:prstGeom>
+          <a:noFill/>
+          <a:ln w="127000" cap="flat" cmpd="sng">
+            <a:solidFill>
+              <a:srgbClr val="595959"/>
+            </a:solidFill>
+            <a:prstDash val="solid"/>
+            <a:round/>
+            <a:headEnd type="none" w="lg" len="lg"/>
+            <a:tailEnd type="triangle" w="lg" len="lg"/>
+          </a:ln>
+        </p:spPr>
+      </p:cxnSp>
       <p:sp>
         <p:nvSpPr>
           <p:cNvPr id="23" name="Shape 66"/>
@@ -10173,7 +10480,7 @@
         </p:nvSpPr>
         <p:spPr>
           <a:xfrm>
-            <a:off x="-33553738" y="30618367"/>
+            <a:off x="245871" y="4207462"/>
             <a:ext cx="43580160" cy="15843346"/>
           </a:xfrm>
           <a:prstGeom prst="rect">
@@ -10218,7 +10525,7 @@
         </p:nvGrpSpPr>
         <p:grpSpPr>
           <a:xfrm>
-            <a:off x="-33088142" y="32918400"/>
+            <a:off x="711467" y="6507495"/>
             <a:ext cx="42560640" cy="12748685"/>
             <a:chOff x="148549" y="1623925"/>
             <a:chExt cx="8866800" cy="2655976"/>
@@ -10816,7 +11123,7 @@
         </p:nvSpPr>
         <p:spPr>
           <a:xfrm>
-            <a:off x="-33152698" y="31991040"/>
+            <a:off x="646911" y="5580135"/>
             <a:ext cx="5929920" cy="6945120"/>
           </a:xfrm>
           <a:prstGeom prst="rect">
@@ -10861,7 +11168,7 @@
         </p:nvSpPr>
         <p:spPr>
           <a:xfrm>
-            <a:off x="-25786978" y="31991760"/>
+            <a:off x="8012631" y="5580855"/>
             <a:ext cx="6642720" cy="6945120"/>
           </a:xfrm>
           <a:prstGeom prst="rect">
@@ -10905,7 +11212,7 @@
           <p:nvPr/>
         </p:nvPicPr>
         <p:blipFill rotWithShape="1">
-          <a:blip r:embed="rId4">
+          <a:blip r:embed="rId2">
             <a:alphaModFix/>
           </a:blip>
           <a:srcRect l="6030" t="11670" r="56580" b="19024"/>
@@ -10913,7 +11220,7 @@
         </p:blipFill>
         <p:spPr>
           <a:xfrm>
-            <a:off x="-25713182" y="31991762"/>
+            <a:off x="8086427" y="5580857"/>
             <a:ext cx="3000230" cy="2235720"/>
           </a:xfrm>
           <a:prstGeom prst="rect">
@@ -10933,7 +11240,7 @@
         </p:nvSpPr>
         <p:spPr>
           <a:xfrm>
-            <a:off x="-25786978" y="39674760"/>
+            <a:off x="8012631" y="13263855"/>
             <a:ext cx="6642720" cy="6278400"/>
           </a:xfrm>
           <a:prstGeom prst="rect">
@@ -10977,12 +11284,12 @@
           <p:nvPr/>
         </p:nvPicPr>
         <p:blipFill>
-          <a:blip r:embed="rId5">
+          <a:blip r:embed="rId3">
             <a:alphaModFix/>
             <a:extLst>
               <a:ext uri="{BEBA8EAE-BF5A-486C-A8C5-ECC9F3942E4B}">
                 <a14:imgProps xmlns:a14="http://schemas.microsoft.com/office/drawing/2010/main">
-                  <a14:imgLayer r:embed="rId6">
+                  <a14:imgLayer r:embed="rId4">
                     <a14:imgEffect>
                       <a14:backgroundRemoval t="0" b="100000" l="0" r="100000"/>
                     </a14:imgEffect>
@@ -10997,7 +11304,7 @@
         </p:blipFill>
         <p:spPr>
           <a:xfrm>
-            <a:off x="-25713178" y="39674767"/>
+            <a:off x="8086431" y="13263862"/>
             <a:ext cx="2748960" cy="2748955"/>
           </a:xfrm>
           <a:prstGeom prst="rect">
@@ -11017,7 +11324,7 @@
         </p:nvSpPr>
         <p:spPr>
           <a:xfrm>
-            <a:off x="-18747178" y="35961360"/>
+            <a:off x="15052431" y="9550455"/>
             <a:ext cx="6236640" cy="6033600"/>
           </a:xfrm>
           <a:prstGeom prst="rect">
@@ -11061,7 +11368,7 @@
           <p:nvPr/>
         </p:nvPicPr>
         <p:blipFill rotWithShape="1">
-          <a:blip r:embed="rId7">
+          <a:blip r:embed="rId5">
             <a:alphaModFix/>
           </a:blip>
           <a:srcRect l="14387" t="5689" r="15155" b="25765"/>
@@ -11069,7 +11376,7 @@
         </p:blipFill>
         <p:spPr>
           <a:xfrm>
-            <a:off x="-15252405" y="36130126"/>
+            <a:off x="18547204" y="9719221"/>
             <a:ext cx="2750395" cy="2675611"/>
           </a:xfrm>
           <a:prstGeom prst="rect">
@@ -11088,7 +11395,7 @@
           <p:nvPr/>
         </p:nvPicPr>
         <p:blipFill>
-          <a:blip r:embed="rId8">
+          <a:blip r:embed="rId6">
             <a:alphaModFix/>
           </a:blip>
           <a:stretch>
@@ -11097,7 +11404,7 @@
         </p:blipFill>
         <p:spPr>
           <a:xfrm>
-            <a:off x="-18169738" y="35577242"/>
+            <a:off x="15629871" y="9166337"/>
             <a:ext cx="3709920" cy="3710059"/>
           </a:xfrm>
           <a:prstGeom prst="rect">
@@ -11117,7 +11424,7 @@
         </p:nvSpPr>
         <p:spPr>
           <a:xfrm>
-            <a:off x="-11441578" y="35797200"/>
+            <a:off x="22358031" y="9386295"/>
             <a:ext cx="6642720" cy="6278400"/>
           </a:xfrm>
           <a:prstGeom prst="rect">
@@ -11162,7 +11469,7 @@
         </p:nvSpPr>
         <p:spPr>
           <a:xfrm>
-            <a:off x="-3693898" y="35797200"/>
+            <a:off x="30105711" y="9386295"/>
             <a:ext cx="6642720" cy="6278400"/>
           </a:xfrm>
           <a:prstGeom prst="rect">
@@ -11206,7 +11513,7 @@
           <p:nvPr/>
         </p:nvPicPr>
         <p:blipFill>
-          <a:blip r:embed="rId9">
+          <a:blip r:embed="rId7">
             <a:alphaModFix/>
           </a:blip>
           <a:stretch>
@@ -11215,7 +11522,7 @@
         </p:blipFill>
         <p:spPr>
           <a:xfrm>
-            <a:off x="-3637017" y="35777896"/>
+            <a:off x="30162592" y="9366991"/>
             <a:ext cx="2284675" cy="2407474"/>
           </a:xfrm>
           <a:prstGeom prst="rect">
@@ -11235,7 +11542,7 @@
         </p:nvSpPr>
         <p:spPr>
           <a:xfrm>
-            <a:off x="3282902" y="35797200"/>
+            <a:off x="37082511" y="9386295"/>
             <a:ext cx="6642720" cy="6278400"/>
           </a:xfrm>
           <a:prstGeom prst="rect">
@@ -11279,6 +11586,62 @@
           <p:nvPr/>
         </p:nvPicPr>
         <p:blipFill>
+          <a:blip r:embed="rId8">
+            <a:alphaModFix/>
+          </a:blip>
+          <a:stretch>
+            <a:fillRect/>
+          </a:stretch>
+        </p:blipFill>
+        <p:spPr>
+          <a:xfrm>
+            <a:off x="39832914" y="13056888"/>
+            <a:ext cx="2225021" cy="2227147"/>
+          </a:xfrm>
+          <a:prstGeom prst="rect">
+            <a:avLst/>
+          </a:prstGeom>
+          <a:noFill/>
+          <a:ln>
+            <a:noFill/>
+          </a:ln>
+        </p:spPr>
+      </p:pic>
+      <p:pic>
+        <p:nvPicPr>
+          <p:cNvPr id="51" name="Shape 95"/>
+          <p:cNvPicPr preferRelativeResize="0"/>
+          <p:nvPr/>
+        </p:nvPicPr>
+        <p:blipFill>
+          <a:blip r:embed="rId9">
+            <a:alphaModFix/>
+          </a:blip>
+          <a:stretch>
+            <a:fillRect/>
+          </a:stretch>
+        </p:blipFill>
+        <p:spPr>
+          <a:xfrm>
+            <a:off x="37223394" y="10336251"/>
+            <a:ext cx="3156134" cy="1433362"/>
+          </a:xfrm>
+          <a:prstGeom prst="rect">
+            <a:avLst/>
+          </a:prstGeom>
+          <a:noFill/>
+          <a:ln>
+            <a:noFill/>
+          </a:ln>
+        </p:spPr>
+      </p:pic>
+      <p:pic>
+        <p:nvPicPr>
+          <p:cNvPr id="52" name="Shape 96"/>
+          <p:cNvPicPr preferRelativeResize="0"/>
+          <p:nvPr/>
+        </p:nvPicPr>
+        <p:blipFill>
           <a:blip r:embed="rId10">
             <a:alphaModFix/>
           </a:blip>
@@ -11288,8 +11651,8 @@
         </p:blipFill>
         <p:spPr>
           <a:xfrm>
-            <a:off x="6033305" y="39467793"/>
-            <a:ext cx="2225021" cy="2227147"/>
+            <a:off x="39832907" y="4439833"/>
+            <a:ext cx="3827280" cy="3178675"/>
           </a:xfrm>
           <a:prstGeom prst="rect">
             <a:avLst/>
@@ -11302,7 +11665,7 @@
       </p:pic>
       <p:pic>
         <p:nvPicPr>
-          <p:cNvPr id="51" name="Shape 95"/>
+          <p:cNvPr id="53" name="Shape 97" descr="@frictionlessdata"/>
           <p:cNvPicPr preferRelativeResize="0"/>
           <p:nvPr/>
         </p:nvPicPr>
@@ -11316,8 +11679,8 @@
         </p:blipFill>
         <p:spPr>
           <a:xfrm>
-            <a:off x="3423785" y="36747156"/>
-            <a:ext cx="3156134" cy="1433362"/>
+            <a:off x="25189551" y="9290535"/>
+            <a:ext cx="3000240" cy="3000240"/>
           </a:xfrm>
           <a:prstGeom prst="rect">
             <a:avLst/>
@@ -11330,7 +11693,35 @@
       </p:pic>
       <p:pic>
         <p:nvPicPr>
-          <p:cNvPr id="52" name="Shape 96"/>
+          <p:cNvPr id="54" name="Shape 98" descr="@frictionlessdata"/>
+          <p:cNvPicPr preferRelativeResize="0"/>
+          <p:nvPr/>
+        </p:nvPicPr>
+        <p:blipFill>
+          <a:blip r:embed="rId11">
+            <a:alphaModFix/>
+          </a:blip>
+          <a:stretch>
+            <a:fillRect/>
+          </a:stretch>
+        </p:blipFill>
+        <p:spPr>
+          <a:xfrm>
+            <a:off x="10835391" y="13138215"/>
+            <a:ext cx="3000240" cy="3000240"/>
+          </a:xfrm>
+          <a:prstGeom prst="rect">
+            <a:avLst/>
+          </a:prstGeom>
+          <a:noFill/>
+          <a:ln>
+            <a:noFill/>
+          </a:ln>
+        </p:spPr>
+      </p:pic>
+      <p:pic>
+        <p:nvPicPr>
+          <p:cNvPr id="55" name="Shape 99"/>
           <p:cNvPicPr preferRelativeResize="0"/>
           <p:nvPr/>
         </p:nvPicPr>
@@ -11344,8 +11735,8 @@
         </p:blipFill>
         <p:spPr>
           <a:xfrm>
-            <a:off x="6033298" y="30850738"/>
-            <a:ext cx="3827280" cy="3178675"/>
+            <a:off x="30439434" y="13138215"/>
+            <a:ext cx="1842283" cy="2397106"/>
           </a:xfrm>
           <a:prstGeom prst="rect">
             <a:avLst/>
@@ -11358,7 +11749,7 @@
       </p:pic>
       <p:pic>
         <p:nvPicPr>
-          <p:cNvPr id="53" name="Shape 97" descr="@frictionlessdata"/>
+          <p:cNvPr id="56" name="Shape 100"/>
           <p:cNvPicPr preferRelativeResize="0"/>
           <p:nvPr/>
         </p:nvPicPr>
@@ -11372,8 +11763,8 @@
         </p:blipFill>
         <p:spPr>
           <a:xfrm>
-            <a:off x="-8610058" y="35701440"/>
-            <a:ext cx="3000240" cy="3000240"/>
+            <a:off x="711467" y="5580850"/>
+            <a:ext cx="2402755" cy="2402755"/>
           </a:xfrm>
           <a:prstGeom prst="rect">
             <a:avLst/>
@@ -11386,35 +11777,7 @@
       </p:pic>
       <p:pic>
         <p:nvPicPr>
-          <p:cNvPr id="54" name="Shape 98" descr="@frictionlessdata"/>
-          <p:cNvPicPr preferRelativeResize="0"/>
-          <p:nvPr/>
-        </p:nvPicPr>
-        <p:blipFill>
-          <a:blip r:embed="rId13">
-            <a:alphaModFix/>
-          </a:blip>
-          <a:stretch>
-            <a:fillRect/>
-          </a:stretch>
-        </p:blipFill>
-        <p:spPr>
-          <a:xfrm>
-            <a:off x="-22964218" y="39549120"/>
-            <a:ext cx="3000240" cy="3000240"/>
-          </a:xfrm>
-          <a:prstGeom prst="rect">
-            <a:avLst/>
-          </a:prstGeom>
-          <a:noFill/>
-          <a:ln>
-            <a:noFill/>
-          </a:ln>
-        </p:spPr>
-      </p:pic>
-      <p:pic>
-        <p:nvPicPr>
-          <p:cNvPr id="55" name="Shape 99"/>
+          <p:cNvPr id="57" name="Shape 101"/>
           <p:cNvPicPr preferRelativeResize="0"/>
           <p:nvPr/>
         </p:nvPicPr>
@@ -11428,8 +11791,8 @@
         </p:blipFill>
         <p:spPr>
           <a:xfrm>
-            <a:off x="-1431506" y="35656404"/>
-            <a:ext cx="1842283" cy="2397106"/>
+            <a:off x="3114227" y="5580845"/>
+            <a:ext cx="2402755" cy="2402755"/>
           </a:xfrm>
           <a:prstGeom prst="rect">
             <a:avLst/>
@@ -11442,7 +11805,7 @@
       </p:pic>
       <p:pic>
         <p:nvPicPr>
-          <p:cNvPr id="56" name="Shape 100"/>
+          <p:cNvPr id="58" name="Shape 102"/>
           <p:cNvPicPr preferRelativeResize="0"/>
           <p:nvPr/>
         </p:nvPicPr>
@@ -11456,63 +11819,7 @@
         </p:blipFill>
         <p:spPr>
           <a:xfrm>
-            <a:off x="-33088142" y="31991755"/>
-            <a:ext cx="2402755" cy="2402755"/>
-          </a:xfrm>
-          <a:prstGeom prst="rect">
-            <a:avLst/>
-          </a:prstGeom>
-          <a:noFill/>
-          <a:ln>
-            <a:noFill/>
-          </a:ln>
-        </p:spPr>
-      </p:pic>
-      <p:pic>
-        <p:nvPicPr>
-          <p:cNvPr id="57" name="Shape 101"/>
-          <p:cNvPicPr preferRelativeResize="0"/>
-          <p:nvPr/>
-        </p:nvPicPr>
-        <p:blipFill>
-          <a:blip r:embed="rId16">
-            <a:alphaModFix/>
-          </a:blip>
-          <a:stretch>
-            <a:fillRect/>
-          </a:stretch>
-        </p:blipFill>
-        <p:spPr>
-          <a:xfrm>
-            <a:off x="-30685382" y="31991750"/>
-            <a:ext cx="2402755" cy="2402755"/>
-          </a:xfrm>
-          <a:prstGeom prst="rect">
-            <a:avLst/>
-          </a:prstGeom>
-          <a:noFill/>
-          <a:ln>
-            <a:noFill/>
-          </a:ln>
-        </p:spPr>
-      </p:pic>
-      <p:pic>
-        <p:nvPicPr>
-          <p:cNvPr id="58" name="Shape 102"/>
-          <p:cNvPicPr preferRelativeResize="0"/>
-          <p:nvPr/>
-        </p:nvPicPr>
-        <p:blipFill>
-          <a:blip r:embed="rId17">
-            <a:alphaModFix/>
-          </a:blip>
-          <a:stretch>
-            <a:fillRect/>
-          </a:stretch>
-        </p:blipFill>
-        <p:spPr>
-          <a:xfrm>
-            <a:off x="-22665480" y="31991760"/>
+            <a:off x="11134129" y="5580855"/>
             <a:ext cx="2402755" cy="2402755"/>
           </a:xfrm>
           <a:prstGeom prst="rect">
@@ -11531,12 +11838,12 @@
           <p:nvPr/>
         </p:nvPicPr>
         <p:blipFill>
-          <a:blip r:embed="rId5">
+          <a:blip r:embed="rId3">
             <a:alphaModFix/>
             <a:extLst>
               <a:ext uri="{BEBA8EAE-BF5A-486C-A8C5-ECC9F3942E4B}">
                 <a14:imgProps xmlns:a14="http://schemas.microsoft.com/office/drawing/2010/main">
-                  <a14:imgLayer r:embed="rId6">
+                  <a14:imgLayer r:embed="rId4">
                     <a14:imgEffect>
                       <a14:backgroundRemoval t="0" b="100000" l="0" r="100000"/>
                     </a14:imgEffect>
@@ -11551,7 +11858,7 @@
         </p:blipFill>
         <p:spPr>
           <a:xfrm>
-            <a:off x="-11441578" y="35853132"/>
+            <a:off x="22358031" y="9442227"/>
             <a:ext cx="2748960" cy="2748955"/>
           </a:xfrm>
           <a:prstGeom prst="rect">
@@ -11565,22 +11872,22 @@
       </p:pic>
       <p:pic>
         <p:nvPicPr>
-          <p:cNvPr id="60" name="Picture 59"/>
+          <p:cNvPr id="62" name="Picture 61"/>
           <p:cNvPicPr>
             <a:picLocks noChangeAspect="1"/>
           </p:cNvPicPr>
           <p:nvPr/>
         </p:nvPicPr>
         <p:blipFill>
-          <a:blip r:embed="rId18"/>
+          <a:blip r:embed="rId16"/>
           <a:stretch>
             <a:fillRect/>
           </a:stretch>
         </p:blipFill>
         <p:spPr>
           <a:xfrm>
-            <a:off x="-3637015" y="39786605"/>
-            <a:ext cx="1996507" cy="1980566"/>
+            <a:off x="37544164" y="4710464"/>
+            <a:ext cx="2288750" cy="2637432"/>
           </a:xfrm>
           <a:prstGeom prst="rect">
             <a:avLst/>
@@ -11589,7 +11896,54 @@
       </p:pic>
       <p:pic>
         <p:nvPicPr>
-          <p:cNvPr id="61" name="Picture 60"/>
+          <p:cNvPr id="63" name="Picture 62"/>
+          <p:cNvPicPr>
+            <a:picLocks noChangeAspect="1"/>
+          </p:cNvPicPr>
+          <p:nvPr/>
+        </p:nvPicPr>
+        <p:blipFill>
+          <a:blip r:embed="rId17"/>
+          <a:stretch>
+            <a:fillRect/>
+          </a:stretch>
+        </p:blipFill>
+        <p:spPr>
+          <a:xfrm>
+            <a:off x="34408307" y="4786961"/>
+            <a:ext cx="2545920" cy="2352427"/>
+          </a:xfrm>
+          <a:prstGeom prst="rect">
+            <a:avLst/>
+          </a:prstGeom>
+        </p:spPr>
+      </p:pic>
+      <p:pic>
+        <p:nvPicPr>
+          <p:cNvPr id="64" name="Picture 63"/>
+          <p:cNvPicPr>
+            <a:picLocks noChangeAspect="1"/>
+          </p:cNvPicPr>
+          <p:nvPr/>
+        </p:nvPicPr>
+        <p:blipFill rotWithShape="1">
+          <a:blip r:embed="rId18"/>
+          <a:srcRect r="73480"/>
+          <a:stretch/>
+        </p:blipFill>
+        <p:spPr>
+          <a:xfrm>
+            <a:off x="8238347" y="9664239"/>
+            <a:ext cx="2895782" cy="2637072"/>
+          </a:xfrm>
+          <a:prstGeom prst="rect">
+            <a:avLst/>
+          </a:prstGeom>
+        </p:spPr>
+      </p:pic>
+      <p:pic>
+        <p:nvPicPr>
+          <p:cNvPr id="65" name="Picture 64"/>
           <p:cNvPicPr>
             <a:picLocks noChangeAspect="1"/>
           </p:cNvPicPr>
@@ -11603,8 +11957,8 @@
         </p:blipFill>
         <p:spPr>
           <a:xfrm>
-            <a:off x="-1352347" y="39752445"/>
-            <a:ext cx="1734979" cy="2400840"/>
+            <a:off x="11134131" y="9442222"/>
+            <a:ext cx="3069346" cy="2656814"/>
           </a:xfrm>
           <a:prstGeom prst="rect">
             <a:avLst/>
@@ -11613,7 +11967,7 @@
       </p:pic>
       <p:pic>
         <p:nvPicPr>
-          <p:cNvPr id="62" name="Picture 61"/>
+          <p:cNvPr id="66" name="Picture 65"/>
           <p:cNvPicPr>
             <a:picLocks noChangeAspect="1"/>
           </p:cNvPicPr>
@@ -11627,8 +11981,8 @@
         </p:blipFill>
         <p:spPr>
           <a:xfrm>
-            <a:off x="3744555" y="31121369"/>
-            <a:ext cx="2288750" cy="2637432"/>
+            <a:off x="991827" y="10025083"/>
+            <a:ext cx="2122402" cy="1917466"/>
           </a:xfrm>
           <a:prstGeom prst="rect">
             <a:avLst/>
@@ -11637,7 +11991,7 @@
       </p:pic>
       <p:pic>
         <p:nvPicPr>
-          <p:cNvPr id="63" name="Picture 62"/>
+          <p:cNvPr id="67" name="Picture 66"/>
           <p:cNvPicPr>
             <a:picLocks noChangeAspect="1"/>
           </p:cNvPicPr>
@@ -11651,8 +12005,8 @@
         </p:blipFill>
         <p:spPr>
           <a:xfrm>
-            <a:off x="608698" y="31197866"/>
-            <a:ext cx="2545920" cy="2352427"/>
+            <a:off x="19033503" y="12876389"/>
+            <a:ext cx="2255568" cy="2069328"/>
           </a:xfrm>
           <a:prstGeom prst="rect">
             <a:avLst/>
@@ -11661,7 +12015,7 @@
       </p:pic>
       <p:pic>
         <p:nvPicPr>
-          <p:cNvPr id="64" name="Picture 63"/>
+          <p:cNvPr id="68" name="Picture 67"/>
           <p:cNvPicPr>
             <a:picLocks noChangeAspect="1"/>
           </p:cNvPicPr>
@@ -11669,13 +12023,13 @@
         </p:nvPicPr>
         <p:blipFill rotWithShape="1">
           <a:blip r:embed="rId22"/>
-          <a:srcRect r="73480"/>
+          <a:srcRect r="71369"/>
           <a:stretch/>
         </p:blipFill>
         <p:spPr>
           <a:xfrm>
-            <a:off x="-25561262" y="36075144"/>
-            <a:ext cx="2895782" cy="2637072"/>
+            <a:off x="16408655" y="12876389"/>
+            <a:ext cx="2138549" cy="2163322"/>
           </a:xfrm>
           <a:prstGeom prst="rect">
             <a:avLst/>
@@ -11684,22 +12038,21 @@
       </p:pic>
       <p:pic>
         <p:nvPicPr>
-          <p:cNvPr id="65" name="Picture 64"/>
+          <p:cNvPr id="71" name="Picture 70"/>
           <p:cNvPicPr>
             <a:picLocks noChangeAspect="1"/>
           </p:cNvPicPr>
           <p:nvPr/>
         </p:nvPicPr>
-        <p:blipFill>
+        <p:blipFill rotWithShape="1">
           <a:blip r:embed="rId23"/>
-          <a:stretch>
-            <a:fillRect/>
-          </a:stretch>
+          <a:srcRect l="51186" r="26169" b="53017"/>
+          <a:stretch/>
         </p:blipFill>
         <p:spPr>
           <a:xfrm>
-            <a:off x="-22665478" y="35853127"/>
-            <a:ext cx="3069346" cy="2656814"/>
+            <a:off x="10595903" y="16213241"/>
+            <a:ext cx="3464520" cy="2479877"/>
           </a:xfrm>
           <a:prstGeom prst="rect">
             <a:avLst/>
@@ -11708,22 +12061,21 @@
       </p:pic>
       <p:pic>
         <p:nvPicPr>
-          <p:cNvPr id="66" name="Picture 65"/>
+          <p:cNvPr id="72" name="Picture 71"/>
           <p:cNvPicPr>
             <a:picLocks noChangeAspect="1"/>
           </p:cNvPicPr>
           <p:nvPr/>
         </p:nvPicPr>
-        <p:blipFill>
+        <p:blipFill rotWithShape="1">
           <a:blip r:embed="rId24"/>
-          <a:stretch>
-            <a:fillRect/>
-          </a:stretch>
+          <a:srcRect l="33394" r="33923" b="34986"/>
+          <a:stretch/>
         </p:blipFill>
         <p:spPr>
           <a:xfrm>
-            <a:off x="-32807782" y="36435988"/>
-            <a:ext cx="2122402" cy="1917466"/>
+            <a:off x="8307111" y="16046842"/>
+            <a:ext cx="2288784" cy="2830291"/>
           </a:xfrm>
           <a:prstGeom prst="rect">
             <a:avLst/>
@@ -11732,7 +12084,7 @@
       </p:pic>
       <p:pic>
         <p:nvPicPr>
-          <p:cNvPr id="67" name="Picture 66"/>
+          <p:cNvPr id="2" name="Picture 1"/>
           <p:cNvPicPr>
             <a:picLocks noChangeAspect="1"/>
           </p:cNvPicPr>
@@ -11746,100 +12098,7 @@
         </p:blipFill>
         <p:spPr>
           <a:xfrm>
-            <a:off x="-14766106" y="39287294"/>
-            <a:ext cx="2255568" cy="2069328"/>
-          </a:xfrm>
-          <a:prstGeom prst="rect">
-            <a:avLst/>
-          </a:prstGeom>
-        </p:spPr>
-      </p:pic>
-      <p:pic>
-        <p:nvPicPr>
-          <p:cNvPr id="68" name="Picture 67"/>
-          <p:cNvPicPr>
-            <a:picLocks noChangeAspect="1"/>
-          </p:cNvPicPr>
-          <p:nvPr/>
-        </p:nvPicPr>
-        <p:blipFill rotWithShape="1">
-          <a:blip r:embed="rId26"/>
-          <a:srcRect r="71369"/>
-          <a:stretch/>
-        </p:blipFill>
-        <p:spPr>
-          <a:xfrm>
-            <a:off x="-17390954" y="39287294"/>
-            <a:ext cx="2138549" cy="2163322"/>
-          </a:xfrm>
-          <a:prstGeom prst="rect">
-            <a:avLst/>
-          </a:prstGeom>
-        </p:spPr>
-      </p:pic>
-      <p:pic>
-        <p:nvPicPr>
-          <p:cNvPr id="71" name="Picture 70"/>
-          <p:cNvPicPr>
-            <a:picLocks noChangeAspect="1"/>
-          </p:cNvPicPr>
-          <p:nvPr/>
-        </p:nvPicPr>
-        <p:blipFill rotWithShape="1">
-          <a:blip r:embed="rId27"/>
-          <a:srcRect l="51186" r="26169" b="53017"/>
-          <a:stretch/>
-        </p:blipFill>
-        <p:spPr>
-          <a:xfrm>
-            <a:off x="-23203706" y="42624146"/>
-            <a:ext cx="3464520" cy="2479877"/>
-          </a:xfrm>
-          <a:prstGeom prst="rect">
-            <a:avLst/>
-          </a:prstGeom>
-        </p:spPr>
-      </p:pic>
-      <p:pic>
-        <p:nvPicPr>
-          <p:cNvPr id="72" name="Picture 71"/>
-          <p:cNvPicPr>
-            <a:picLocks noChangeAspect="1"/>
-          </p:cNvPicPr>
-          <p:nvPr/>
-        </p:nvPicPr>
-        <p:blipFill rotWithShape="1">
-          <a:blip r:embed="rId28"/>
-          <a:srcRect l="33394" r="33923" b="34986"/>
-          <a:stretch/>
-        </p:blipFill>
-        <p:spPr>
-          <a:xfrm>
-            <a:off x="-25492498" y="42457747"/>
-            <a:ext cx="2288784" cy="2830291"/>
-          </a:xfrm>
-          <a:prstGeom prst="rect">
-            <a:avLst/>
-          </a:prstGeom>
-        </p:spPr>
-      </p:pic>
-      <p:pic>
-        <p:nvPicPr>
-          <p:cNvPr id="2" name="Picture 1"/>
-          <p:cNvPicPr>
-            <a:picLocks noChangeAspect="1"/>
-          </p:cNvPicPr>
-          <p:nvPr/>
-        </p:nvPicPr>
-        <p:blipFill>
-          <a:blip r:embed="rId29"/>
-          <a:stretch>
-            <a:fillRect/>
-          </a:stretch>
-        </p:blipFill>
-        <p:spPr>
-          <a:xfrm>
-            <a:off x="3545814" y="39382087"/>
+            <a:off x="37345423" y="12971182"/>
             <a:ext cx="2429846" cy="2429846"/>
           </a:xfrm>
           <a:prstGeom prst="rect">
@@ -11856,14 +12115,14 @@
           <p:nvPr/>
         </p:nvPicPr>
         <p:blipFill>
-          <a:blip r:embed="rId30"/>
+          <a:blip r:embed="rId26"/>
           <a:stretch>
             <a:fillRect/>
           </a:stretch>
         </p:blipFill>
         <p:spPr>
           <a:xfrm>
-            <a:off x="-11512179" y="39549120"/>
+            <a:off x="22287430" y="13138215"/>
             <a:ext cx="2819561" cy="2314129"/>
           </a:xfrm>
           <a:prstGeom prst="rect">
@@ -11880,11 +12139,11 @@
           <p:nvPr/>
         </p:nvPicPr>
         <p:blipFill>
-          <a:blip r:embed="rId31">
+          <a:blip r:embed="rId27">
             <a:extLst>
               <a:ext uri="{BEBA8EAE-BF5A-486C-A8C5-ECC9F3942E4B}">
                 <a14:imgProps xmlns:a14="http://schemas.microsoft.com/office/drawing/2010/main">
-                  <a14:imgLayer r:embed="rId32">
+                  <a14:imgLayer r:embed="rId28">
                     <a14:imgEffect>
                       <a14:backgroundRemoval t="0" b="86328" l="11426" r="89844">
                         <a14:foregroundMark x1="34473" y1="86328" x2="34473" y2="86328"/>
@@ -11901,7 +12160,7 @@
         </p:blipFill>
         <p:spPr>
           <a:xfrm>
-            <a:off x="-9356063" y="39607065"/>
+            <a:off x="24443546" y="13196160"/>
             <a:ext cx="2621406" cy="2621406"/>
           </a:xfrm>
           <a:prstGeom prst="rect">
@@ -11918,15 +12177,91 @@
           <p:nvPr/>
         </p:nvPicPr>
         <p:blipFill>
-          <a:blip r:embed="rId33"/>
+          <a:blip r:embed="rId29"/>
           <a:stretch>
             <a:fillRect/>
           </a:stretch>
         </p:blipFill>
         <p:spPr>
           <a:xfrm>
-            <a:off x="3545814" y="35992303"/>
+            <a:off x="37345423" y="9581398"/>
             <a:ext cx="6030152" cy="572631"/>
+          </a:xfrm>
+          <a:prstGeom prst="rect">
+            <a:avLst/>
+          </a:prstGeom>
+        </p:spPr>
+      </p:pic>
+      <p:pic>
+        <p:nvPicPr>
+          <p:cNvPr id="21" name="Picture 20"/>
+          <p:cNvPicPr>
+            <a:picLocks noChangeAspect="1"/>
+          </p:cNvPicPr>
+          <p:nvPr/>
+        </p:nvPicPr>
+        <p:blipFill>
+          <a:blip r:embed="rId30"/>
+          <a:stretch>
+            <a:fillRect/>
+          </a:stretch>
+        </p:blipFill>
+        <p:spPr>
+          <a:xfrm>
+            <a:off x="32049930" y="9491762"/>
+            <a:ext cx="2559932" cy="2047946"/>
+          </a:xfrm>
+          <a:prstGeom prst="rect">
+            <a:avLst/>
+          </a:prstGeom>
+        </p:spPr>
+      </p:pic>
+      <p:pic>
+        <p:nvPicPr>
+          <p:cNvPr id="22" name="Picture 21"/>
+          <p:cNvPicPr>
+            <a:picLocks noChangeAspect="1"/>
+          </p:cNvPicPr>
+          <p:nvPr/>
+        </p:nvPicPr>
+        <p:blipFill rotWithShape="1">
+          <a:blip r:embed="rId31"/>
+          <a:srcRect r="57171"/>
+          <a:stretch/>
+        </p:blipFill>
+        <p:spPr>
+          <a:xfrm>
+            <a:off x="32497942" y="13568785"/>
+            <a:ext cx="2016369" cy="1832243"/>
+          </a:xfrm>
+          <a:prstGeom prst="rect">
+            <a:avLst/>
+          </a:prstGeom>
+        </p:spPr>
+      </p:pic>
+      <p:pic>
+        <p:nvPicPr>
+          <p:cNvPr id="60" name="Picture 59" descr="Screen Shot 2016-10-25 at 12.56.38 AM.png"/>
+          <p:cNvPicPr>
+            <a:picLocks noChangeAspect="1"/>
+          </p:cNvPicPr>
+          <p:nvPr/>
+        </p:nvPicPr>
+        <p:blipFill rotWithShape="1">
+          <a:blip r:embed="rId32">
+            <a:extLst>
+              <a:ext uri="{28A0092B-C50C-407E-A947-70E740481C1C}">
+                <a14:useLocalDpi xmlns:a14="http://schemas.microsoft.com/office/drawing/2010/main" val="0"/>
+              </a:ext>
+            </a:extLst>
+          </a:blip>
+          <a:srcRect b="58954"/>
+          <a:stretch/>
+        </p:blipFill>
+        <p:spPr>
+          <a:xfrm>
+            <a:off x="25189551" y="15367589"/>
+            <a:ext cx="19824230" cy="10337211"/>
           </a:xfrm>
           <a:prstGeom prst="rect">
             <a:avLst/>
@@ -11936,7 +12271,7 @@
     </p:spTree>
     <p:extLst>
       <p:ext uri="{BB962C8B-B14F-4D97-AF65-F5344CB8AC3E}">
-        <p14:creationId xmlns:p14="http://schemas.microsoft.com/office/powerpoint/2010/main" val="3449162792"/>
+        <p14:creationId xmlns:p14="http://schemas.microsoft.com/office/powerpoint/2010/main" val="2813298059"/>
       </p:ext>
     </p:extLst>
   </p:cSld>
@@ -11964,7 +12299,7 @@
                             </p:stCondLst>
                             <p:childTnLst>
                               <p:par>
-                                <p:cTn id="5" presetID="1" presetClass="entr" presetSubtype="0" fill="hold" nodeType="clickEffect">
+                                <p:cTn id="5" presetID="1" presetClass="entr" presetSubtype="0" fill="hold" grpId="0" nodeType="clickEffect">
                                   <p:stCondLst>
                                     <p:cond delay="0"/>
                                   </p:stCondLst>
@@ -11977,7 +12312,7 @@
                                           </p:stCondLst>
                                         </p:cTn>
                                         <p:tgtEl>
-                                          <p:spTgt spid="20"/>
+                                          <p:spTgt spid="38"/>
                                         </p:tgtEl>
                                         <p:attrNameLst>
                                           <p:attrName>style.visibility</p:attrName>
@@ -11991,7 +12326,7 @@
                                 </p:cTn>
                               </p:par>
                               <p:par>
-                                <p:cTn id="7" presetID="1" presetClass="entr" presetSubtype="0" fill="hold" nodeType="withEffect">
+                                <p:cTn id="7" presetID="1" presetClass="entr" presetSubtype="0" fill="hold" grpId="0" nodeType="withEffect">
                                   <p:stCondLst>
                                     <p:cond delay="0"/>
                                   </p:stCondLst>
@@ -12004,7 +12339,7 @@
                                           </p:stCondLst>
                                         </p:cTn>
                                         <p:tgtEl>
-                                          <p:spTgt spid="19"/>
+                                          <p:spTgt spid="39"/>
                                         </p:tgtEl>
                                         <p:attrNameLst>
                                           <p:attrName>style.visibility</p:attrName>
@@ -12031,7 +12366,7 @@
                                           </p:stCondLst>
                                         </p:cTn>
                                         <p:tgtEl>
-                                          <p:spTgt spid="18"/>
+                                          <p:spTgt spid="40"/>
                                         </p:tgtEl>
                                         <p:attrNameLst>
                                           <p:attrName>style.visibility</p:attrName>
@@ -12044,26 +12379,35 @@
                                   </p:childTnLst>
                                 </p:cTn>
                               </p:par>
-                            </p:childTnLst>
-                          </p:cTn>
-                        </p:par>
-                      </p:childTnLst>
-                    </p:cTn>
-                  </p:par>
-                  <p:par>
-                    <p:cTn id="11" fill="hold">
-                      <p:stCondLst>
-                        <p:cond delay="indefinite"/>
-                      </p:stCondLst>
-                      <p:childTnLst>
-                        <p:par>
-                          <p:cTn id="12" fill="hold">
-                            <p:stCondLst>
-                              <p:cond delay="0"/>
-                            </p:stCondLst>
-                            <p:childTnLst>
                               <p:par>
-                                <p:cTn id="13" presetID="1" presetClass="entr" presetSubtype="0" fill="hold" grpId="0" nodeType="clickEffect">
+                                <p:cTn id="11" presetID="1" presetClass="entr" presetSubtype="0" fill="hold" grpId="0" nodeType="withEffect">
+                                  <p:stCondLst>
+                                    <p:cond delay="0"/>
+                                  </p:stCondLst>
+                                  <p:childTnLst>
+                                    <p:set>
+                                      <p:cBhvr>
+                                        <p:cTn id="12" dur="1" fill="hold">
+                                          <p:stCondLst>
+                                            <p:cond delay="0"/>
+                                          </p:stCondLst>
+                                        </p:cTn>
+                                        <p:tgtEl>
+                                          <p:spTgt spid="41"/>
+                                        </p:tgtEl>
+                                        <p:attrNameLst>
+                                          <p:attrName>style.visibility</p:attrName>
+                                        </p:attrNameLst>
+                                      </p:cBhvr>
+                                      <p:to>
+                                        <p:strVal val="visible"/>
+                                      </p:to>
+                                    </p:set>
+                                  </p:childTnLst>
+                                </p:cTn>
+                              </p:par>
+                              <p:par>
+                                <p:cTn id="13" presetID="1" presetClass="entr" presetSubtype="0" fill="hold" nodeType="withEffect">
                                   <p:stCondLst>
                                     <p:cond delay="0"/>
                                   </p:stCondLst>
@@ -12076,7 +12420,7 @@
                                           </p:stCondLst>
                                         </p:cTn>
                                         <p:tgtEl>
-                                          <p:spTgt spid="38"/>
+                                          <p:spTgt spid="42"/>
                                         </p:tgtEl>
                                         <p:attrNameLst>
                                           <p:attrName>style.visibility</p:attrName>
@@ -12103,7 +12447,7 @@
                                           </p:stCondLst>
                                         </p:cTn>
                                         <p:tgtEl>
-                                          <p:spTgt spid="39"/>
+                                          <p:spTgt spid="43"/>
                                         </p:tgtEl>
                                         <p:attrNameLst>
                                           <p:attrName>style.visibility</p:attrName>
@@ -12130,7 +12474,7 @@
                                           </p:stCondLst>
                                         </p:cTn>
                                         <p:tgtEl>
-                                          <p:spTgt spid="40"/>
+                                          <p:spTgt spid="44"/>
                                         </p:tgtEl>
                                         <p:attrNameLst>
                                           <p:attrName>style.visibility</p:attrName>
@@ -12144,7 +12488,7 @@
                                 </p:cTn>
                               </p:par>
                               <p:par>
-                                <p:cTn id="19" presetID="1" presetClass="entr" presetSubtype="0" fill="hold" grpId="0" nodeType="withEffect">
+                                <p:cTn id="19" presetID="1" presetClass="entr" presetSubtype="0" fill="hold" nodeType="withEffect">
                                   <p:stCondLst>
                                     <p:cond delay="0"/>
                                   </p:stCondLst>
@@ -12157,7 +12501,7 @@
                                           </p:stCondLst>
                                         </p:cTn>
                                         <p:tgtEl>
-                                          <p:spTgt spid="41"/>
+                                          <p:spTgt spid="45"/>
                                         </p:tgtEl>
                                         <p:attrNameLst>
                                           <p:attrName>style.visibility</p:attrName>
@@ -12171,7 +12515,7 @@
                                 </p:cTn>
                               </p:par>
                               <p:par>
-                                <p:cTn id="21" presetID="1" presetClass="entr" presetSubtype="0" fill="hold" nodeType="withEffect">
+                                <p:cTn id="21" presetID="1" presetClass="entr" presetSubtype="0" fill="hold" grpId="0" nodeType="withEffect">
                                   <p:stCondLst>
                                     <p:cond delay="0"/>
                                   </p:stCondLst>
@@ -12184,7 +12528,7 @@
                                           </p:stCondLst>
                                         </p:cTn>
                                         <p:tgtEl>
-                                          <p:spTgt spid="42"/>
+                                          <p:spTgt spid="46"/>
                                         </p:tgtEl>
                                         <p:attrNameLst>
                                           <p:attrName>style.visibility</p:attrName>
@@ -12211,7 +12555,7 @@
                                           </p:stCondLst>
                                         </p:cTn>
                                         <p:tgtEl>
-                                          <p:spTgt spid="43"/>
+                                          <p:spTgt spid="47"/>
                                         </p:tgtEl>
                                         <p:attrNameLst>
                                           <p:attrName>style.visibility</p:attrName>
@@ -12238,7 +12582,7 @@
                                           </p:stCondLst>
                                         </p:cTn>
                                         <p:tgtEl>
-                                          <p:spTgt spid="44"/>
+                                          <p:spTgt spid="48"/>
                                         </p:tgtEl>
                                         <p:attrNameLst>
                                           <p:attrName>style.visibility</p:attrName>
@@ -12252,7 +12596,7 @@
                                 </p:cTn>
                               </p:par>
                               <p:par>
-                                <p:cTn id="27" presetID="1" presetClass="entr" presetSubtype="0" fill="hold" nodeType="withEffect">
+                                <p:cTn id="27" presetID="1" presetClass="entr" presetSubtype="0" fill="hold" grpId="0" nodeType="withEffect">
                                   <p:stCondLst>
                                     <p:cond delay="0"/>
                                   </p:stCondLst>
@@ -12265,7 +12609,7 @@
                                           </p:stCondLst>
                                         </p:cTn>
                                         <p:tgtEl>
-                                          <p:spTgt spid="45"/>
+                                          <p:spTgt spid="49"/>
                                         </p:tgtEl>
                                         <p:attrNameLst>
                                           <p:attrName>style.visibility</p:attrName>
@@ -12279,7 +12623,7 @@
                                 </p:cTn>
                               </p:par>
                               <p:par>
-                                <p:cTn id="29" presetID="1" presetClass="entr" presetSubtype="0" fill="hold" grpId="0" nodeType="withEffect">
+                                <p:cTn id="29" presetID="1" presetClass="entr" presetSubtype="0" fill="hold" nodeType="withEffect">
                                   <p:stCondLst>
                                     <p:cond delay="0"/>
                                   </p:stCondLst>
@@ -12292,7 +12636,7 @@
                                           </p:stCondLst>
                                         </p:cTn>
                                         <p:tgtEl>
-                                          <p:spTgt spid="46"/>
+                                          <p:spTgt spid="50"/>
                                         </p:tgtEl>
                                         <p:attrNameLst>
                                           <p:attrName>style.visibility</p:attrName>
@@ -12306,7 +12650,7 @@
                                 </p:cTn>
                               </p:par>
                               <p:par>
-                                <p:cTn id="31" presetID="1" presetClass="entr" presetSubtype="0" fill="hold" grpId="0" nodeType="withEffect">
+                                <p:cTn id="31" presetID="1" presetClass="entr" presetSubtype="0" fill="hold" nodeType="withEffect">
                                   <p:stCondLst>
                                     <p:cond delay="0"/>
                                   </p:stCondLst>
@@ -12319,7 +12663,7 @@
                                           </p:stCondLst>
                                         </p:cTn>
                                         <p:tgtEl>
-                                          <p:spTgt spid="47"/>
+                                          <p:spTgt spid="51"/>
                                         </p:tgtEl>
                                         <p:attrNameLst>
                                           <p:attrName>style.visibility</p:attrName>
@@ -12346,7 +12690,7 @@
                                           </p:stCondLst>
                                         </p:cTn>
                                         <p:tgtEl>
-                                          <p:spTgt spid="48"/>
+                                          <p:spTgt spid="53"/>
                                         </p:tgtEl>
                                         <p:attrNameLst>
                                           <p:attrName>style.visibility</p:attrName>
@@ -12360,7 +12704,7 @@
                                 </p:cTn>
                               </p:par>
                               <p:par>
-                                <p:cTn id="35" presetID="1" presetClass="entr" presetSubtype="0" fill="hold" grpId="0" nodeType="withEffect">
+                                <p:cTn id="35" presetID="1" presetClass="entr" presetSubtype="0" fill="hold" nodeType="withEffect">
                                   <p:stCondLst>
                                     <p:cond delay="0"/>
                                   </p:stCondLst>
@@ -12373,7 +12717,7 @@
                                           </p:stCondLst>
                                         </p:cTn>
                                         <p:tgtEl>
-                                          <p:spTgt spid="49"/>
+                                          <p:spTgt spid="54"/>
                                         </p:tgtEl>
                                         <p:attrNameLst>
                                           <p:attrName>style.visibility</p:attrName>
@@ -12400,7 +12744,7 @@
                                           </p:stCondLst>
                                         </p:cTn>
                                         <p:tgtEl>
-                                          <p:spTgt spid="50"/>
+                                          <p:spTgt spid="55"/>
                                         </p:tgtEl>
                                         <p:attrNameLst>
                                           <p:attrName>style.visibility</p:attrName>
@@ -12427,7 +12771,7 @@
                                           </p:stCondLst>
                                         </p:cTn>
                                         <p:tgtEl>
-                                          <p:spTgt spid="51"/>
+                                          <p:spTgt spid="56"/>
                                         </p:tgtEl>
                                         <p:attrNameLst>
                                           <p:attrName>style.visibility</p:attrName>
@@ -12454,7 +12798,7 @@
                                           </p:stCondLst>
                                         </p:cTn>
                                         <p:tgtEl>
-                                          <p:spTgt spid="53"/>
+                                          <p:spTgt spid="57"/>
                                         </p:tgtEl>
                                         <p:attrNameLst>
                                           <p:attrName>style.visibility</p:attrName>
@@ -12481,7 +12825,7 @@
                                           </p:stCondLst>
                                         </p:cTn>
                                         <p:tgtEl>
-                                          <p:spTgt spid="54"/>
+                                          <p:spTgt spid="58"/>
                                         </p:tgtEl>
                                         <p:attrNameLst>
                                           <p:attrName>style.visibility</p:attrName>
@@ -12508,7 +12852,7 @@
                                           </p:stCondLst>
                                         </p:cTn>
                                         <p:tgtEl>
-                                          <p:spTgt spid="55"/>
+                                          <p:spTgt spid="59"/>
                                         </p:tgtEl>
                                         <p:attrNameLst>
                                           <p:attrName>style.visibility</p:attrName>
@@ -12535,7 +12879,7 @@
                                           </p:stCondLst>
                                         </p:cTn>
                                         <p:tgtEl>
-                                          <p:spTgt spid="56"/>
+                                          <p:spTgt spid="64"/>
                                         </p:tgtEl>
                                         <p:attrNameLst>
                                           <p:attrName>style.visibility</p:attrName>
@@ -12562,7 +12906,7 @@
                                           </p:stCondLst>
                                         </p:cTn>
                                         <p:tgtEl>
-                                          <p:spTgt spid="57"/>
+                                          <p:spTgt spid="65"/>
                                         </p:tgtEl>
                                         <p:attrNameLst>
                                           <p:attrName>style.visibility</p:attrName>
@@ -12589,7 +12933,7 @@
                                           </p:stCondLst>
                                         </p:cTn>
                                         <p:tgtEl>
-                                          <p:spTgt spid="58"/>
+                                          <p:spTgt spid="66"/>
                                         </p:tgtEl>
                                         <p:attrNameLst>
                                           <p:attrName>style.visibility</p:attrName>
@@ -12616,7 +12960,7 @@
                                           </p:stCondLst>
                                         </p:cTn>
                                         <p:tgtEl>
-                                          <p:spTgt spid="59"/>
+                                          <p:spTgt spid="67"/>
                                         </p:tgtEl>
                                         <p:attrNameLst>
                                           <p:attrName>style.visibility</p:attrName>
@@ -12643,7 +12987,7 @@
                                           </p:stCondLst>
                                         </p:cTn>
                                         <p:tgtEl>
-                                          <p:spTgt spid="60"/>
+                                          <p:spTgt spid="68"/>
                                         </p:tgtEl>
                                         <p:attrNameLst>
                                           <p:attrName>style.visibility</p:attrName>
@@ -12670,7 +13014,7 @@
                                           </p:stCondLst>
                                         </p:cTn>
                                         <p:tgtEl>
-                                          <p:spTgt spid="61"/>
+                                          <p:spTgt spid="71"/>
                                         </p:tgtEl>
                                         <p:attrNameLst>
                                           <p:attrName>style.visibility</p:attrName>
@@ -12697,7 +13041,7 @@
                                           </p:stCondLst>
                                         </p:cTn>
                                         <p:tgtEl>
-                                          <p:spTgt spid="64"/>
+                                          <p:spTgt spid="72"/>
                                         </p:tgtEl>
                                         <p:attrNameLst>
                                           <p:attrName>style.visibility</p:attrName>
@@ -12711,7 +13055,7 @@
                                 </p:cTn>
                               </p:par>
                               <p:par>
-                                <p:cTn id="61" presetID="1" presetClass="entr" presetSubtype="0" fill="hold" nodeType="withEffect">
+                                <p:cTn id="61" presetID="1" presetClass="entr" presetSubtype="0" fill="hold" grpId="0" nodeType="withEffect">
                                   <p:stCondLst>
                                     <p:cond delay="0"/>
                                   </p:stCondLst>
@@ -12724,7 +13068,7 @@
                                           </p:stCondLst>
                                         </p:cTn>
                                         <p:tgtEl>
-                                          <p:spTgt spid="65"/>
+                                          <p:spTgt spid="23"/>
                                         </p:tgtEl>
                                         <p:attrNameLst>
                                           <p:attrName>style.visibility</p:attrName>
@@ -12751,7 +13095,7 @@
                                           </p:stCondLst>
                                         </p:cTn>
                                         <p:tgtEl>
-                                          <p:spTgt spid="66"/>
+                                          <p:spTgt spid="63"/>
                                         </p:tgtEl>
                                         <p:attrNameLst>
                                           <p:attrName>style.visibility</p:attrName>
@@ -12778,7 +13122,7 @@
                                           </p:stCondLst>
                                         </p:cTn>
                                         <p:tgtEl>
-                                          <p:spTgt spid="67"/>
+                                          <p:spTgt spid="52"/>
                                         </p:tgtEl>
                                         <p:attrNameLst>
                                           <p:attrName>style.visibility</p:attrName>
@@ -12805,213 +13149,6 @@
                                           </p:stCondLst>
                                         </p:cTn>
                                         <p:tgtEl>
-                                          <p:spTgt spid="68"/>
-                                        </p:tgtEl>
-                                        <p:attrNameLst>
-                                          <p:attrName>style.visibility</p:attrName>
-                                        </p:attrNameLst>
-                                      </p:cBhvr>
-                                      <p:to>
-                                        <p:strVal val="visible"/>
-                                      </p:to>
-                                    </p:set>
-                                  </p:childTnLst>
-                                </p:cTn>
-                              </p:par>
-                              <p:par>
-                                <p:cTn id="69" presetID="1" presetClass="entr" presetSubtype="0" fill="hold" nodeType="withEffect">
-                                  <p:stCondLst>
-                                    <p:cond delay="0"/>
-                                  </p:stCondLst>
-                                  <p:childTnLst>
-                                    <p:set>
-                                      <p:cBhvr>
-                                        <p:cTn id="70" dur="1" fill="hold">
-                                          <p:stCondLst>
-                                            <p:cond delay="0"/>
-                                          </p:stCondLst>
-                                        </p:cTn>
-                                        <p:tgtEl>
-                                          <p:spTgt spid="71"/>
-                                        </p:tgtEl>
-                                        <p:attrNameLst>
-                                          <p:attrName>style.visibility</p:attrName>
-                                        </p:attrNameLst>
-                                      </p:cBhvr>
-                                      <p:to>
-                                        <p:strVal val="visible"/>
-                                      </p:to>
-                                    </p:set>
-                                  </p:childTnLst>
-                                </p:cTn>
-                              </p:par>
-                              <p:par>
-                                <p:cTn id="71" presetID="1" presetClass="entr" presetSubtype="0" fill="hold" nodeType="withEffect">
-                                  <p:stCondLst>
-                                    <p:cond delay="0"/>
-                                  </p:stCondLst>
-                                  <p:childTnLst>
-                                    <p:set>
-                                      <p:cBhvr>
-                                        <p:cTn id="72" dur="1" fill="hold">
-                                          <p:stCondLst>
-                                            <p:cond delay="0"/>
-                                          </p:stCondLst>
-                                        </p:cTn>
-                                        <p:tgtEl>
-                                          <p:spTgt spid="72"/>
-                                        </p:tgtEl>
-                                        <p:attrNameLst>
-                                          <p:attrName>style.visibility</p:attrName>
-                                        </p:attrNameLst>
-                                      </p:cBhvr>
-                                      <p:to>
-                                        <p:strVal val="visible"/>
-                                      </p:to>
-                                    </p:set>
-                                  </p:childTnLst>
-                                </p:cTn>
-                              </p:par>
-                            </p:childTnLst>
-                          </p:cTn>
-                        </p:par>
-                      </p:childTnLst>
-                    </p:cTn>
-                  </p:par>
-                  <p:par>
-                    <p:cTn id="73" fill="hold">
-                      <p:stCondLst>
-                        <p:cond delay="indefinite"/>
-                      </p:stCondLst>
-                      <p:childTnLst>
-                        <p:par>
-                          <p:cTn id="74" fill="hold">
-                            <p:stCondLst>
-                              <p:cond delay="0"/>
-                            </p:stCondLst>
-                            <p:childTnLst>
-                              <p:par>
-                                <p:cTn id="75" presetID="1" presetClass="entr" presetSubtype="0" fill="hold" nodeType="clickEffect">
-                                  <p:stCondLst>
-                                    <p:cond delay="0"/>
-                                  </p:stCondLst>
-                                  <p:childTnLst>
-                                    <p:set>
-                                      <p:cBhvr>
-                                        <p:cTn id="76" dur="1" fill="hold">
-                                          <p:stCondLst>
-                                            <p:cond delay="0"/>
-                                          </p:stCondLst>
-                                        </p:cTn>
-                                        <p:tgtEl>
-                                          <p:spTgt spid="73"/>
-                                        </p:tgtEl>
-                                        <p:attrNameLst>
-                                          <p:attrName>style.visibility</p:attrName>
-                                        </p:attrNameLst>
-                                      </p:cBhvr>
-                                      <p:to>
-                                        <p:strVal val="visible"/>
-                                      </p:to>
-                                    </p:set>
-                                  </p:childTnLst>
-                                </p:cTn>
-                              </p:par>
-                              <p:par>
-                                <p:cTn id="77" presetID="1" presetClass="entr" presetSubtype="0" fill="hold" grpId="0" nodeType="withEffect">
-                                  <p:stCondLst>
-                                    <p:cond delay="0"/>
-                                  </p:stCondLst>
-                                  <p:childTnLst>
-                                    <p:set>
-                                      <p:cBhvr>
-                                        <p:cTn id="78" dur="1" fill="hold">
-                                          <p:stCondLst>
-                                            <p:cond delay="0"/>
-                                          </p:stCondLst>
-                                        </p:cTn>
-                                        <p:tgtEl>
-                                          <p:spTgt spid="23"/>
-                                        </p:tgtEl>
-                                        <p:attrNameLst>
-                                          <p:attrName>style.visibility</p:attrName>
-                                        </p:attrNameLst>
-                                      </p:cBhvr>
-                                      <p:to>
-                                        <p:strVal val="visible"/>
-                                      </p:to>
-                                    </p:set>
-                                  </p:childTnLst>
-                                </p:cTn>
-                              </p:par>
-                              <p:par>
-                                <p:cTn id="79" presetID="1" presetClass="entr" presetSubtype="0" fill="hold" nodeType="withEffect">
-                                  <p:stCondLst>
-                                    <p:cond delay="0"/>
-                                  </p:stCondLst>
-                                  <p:childTnLst>
-                                    <p:set>
-                                      <p:cBhvr>
-                                        <p:cTn id="80" dur="1" fill="hold">
-                                          <p:stCondLst>
-                                            <p:cond delay="0"/>
-                                          </p:stCondLst>
-                                        </p:cTn>
-                                        <p:tgtEl>
-                                          <p:spTgt spid="63"/>
-                                        </p:tgtEl>
-                                        <p:attrNameLst>
-                                          <p:attrName>style.visibility</p:attrName>
-                                        </p:attrNameLst>
-                                      </p:cBhvr>
-                                      <p:to>
-                                        <p:strVal val="visible"/>
-                                      </p:to>
-                                    </p:set>
-                                  </p:childTnLst>
-                                </p:cTn>
-                              </p:par>
-                              <p:par>
-                                <p:cTn id="81" presetID="1" presetClass="entr" presetSubtype="0" fill="hold" nodeType="withEffect">
-                                  <p:stCondLst>
-                                    <p:cond delay="0"/>
-                                  </p:stCondLst>
-                                  <p:childTnLst>
-                                    <p:set>
-                                      <p:cBhvr>
-                                        <p:cTn id="82" dur="1" fill="hold">
-                                          <p:stCondLst>
-                                            <p:cond delay="0"/>
-                                          </p:stCondLst>
-                                        </p:cTn>
-                                        <p:tgtEl>
-                                          <p:spTgt spid="52"/>
-                                        </p:tgtEl>
-                                        <p:attrNameLst>
-                                          <p:attrName>style.visibility</p:attrName>
-                                        </p:attrNameLst>
-                                      </p:cBhvr>
-                                      <p:to>
-                                        <p:strVal val="visible"/>
-                                      </p:to>
-                                    </p:set>
-                                  </p:childTnLst>
-                                </p:cTn>
-                              </p:par>
-                              <p:par>
-                                <p:cTn id="83" presetID="1" presetClass="entr" presetSubtype="0" fill="hold" nodeType="withEffect">
-                                  <p:stCondLst>
-                                    <p:cond delay="0"/>
-                                  </p:stCondLst>
-                                  <p:childTnLst>
-                                    <p:set>
-                                      <p:cBhvr>
-                                        <p:cTn id="84" dur="1" fill="hold">
-                                          <p:stCondLst>
-                                            <p:cond delay="0"/>
-                                          </p:stCondLst>
-                                        </p:cTn>
-                                        <p:tgtEl>
                                           <p:spTgt spid="62"/>
                                         </p:tgtEl>
                                         <p:attrNameLst>
@@ -13032,26 +13169,26 @@
                     </p:cTn>
                   </p:par>
                   <p:par>
-                    <p:cTn id="85" fill="hold">
+                    <p:cTn id="69" fill="hold">
                       <p:stCondLst>
                         <p:cond delay="indefinite"/>
                       </p:stCondLst>
                       <p:childTnLst>
                         <p:par>
-                          <p:cTn id="86" fill="hold">
+                          <p:cTn id="70" fill="hold">
                             <p:stCondLst>
                               <p:cond delay="0"/>
                             </p:stCondLst>
                             <p:childTnLst>
                               <p:par>
-                                <p:cTn id="87" presetID="1" presetClass="entr" presetSubtype="0" fill="hold" nodeType="clickEffect">
+                                <p:cTn id="71" presetID="1" presetClass="entr" presetSubtype="0" fill="hold" nodeType="clickEffect">
                                   <p:stCondLst>
                                     <p:cond delay="0"/>
                                   </p:stCondLst>
                                   <p:childTnLst>
                                     <p:set>
                                       <p:cBhvr>
-                                        <p:cTn id="88" dur="1" fill="hold">
+                                        <p:cTn id="72" dur="1" fill="hold">
                                           <p:stCondLst>
                                             <p:cond delay="0"/>
                                           </p:stCondLst>
@@ -13071,14 +13208,14 @@
                                 </p:cTn>
                               </p:par>
                               <p:par>
-                                <p:cTn id="89" presetID="1" presetClass="entr" presetSubtype="0" fill="hold" nodeType="withEffect">
+                                <p:cTn id="73" presetID="1" presetClass="entr" presetSubtype="0" fill="hold" nodeType="withEffect">
                                   <p:stCondLst>
                                     <p:cond delay="0"/>
                                   </p:stCondLst>
                                   <p:childTnLst>
                                     <p:set>
                                       <p:cBhvr>
-                                        <p:cTn id="90" dur="1" fill="hold">
+                                        <p:cTn id="74" dur="1" fill="hold">
                                           <p:stCondLst>
                                             <p:cond delay="0"/>
                                           </p:stCondLst>
@@ -13098,20 +13235,65 @@
                                 </p:cTn>
                               </p:par>
                               <p:par>
-                                <p:cTn id="91" presetID="1" presetClass="entr" presetSubtype="0" fill="hold" nodeType="withEffect">
+                                <p:cTn id="75" presetID="1" presetClass="entr" presetSubtype="0" fill="hold" nodeType="withEffect">
                                   <p:stCondLst>
                                     <p:cond delay="0"/>
                                   </p:stCondLst>
                                   <p:childTnLst>
                                     <p:set>
                                       <p:cBhvr>
-                                        <p:cTn id="92" dur="1" fill="hold">
+                                        <p:cTn id="76" dur="1" fill="hold">
                                           <p:stCondLst>
                                             <p:cond delay="0"/>
                                           </p:stCondLst>
                                         </p:cTn>
                                         <p:tgtEl>
                                           <p:spTgt spid="74"/>
+                                        </p:tgtEl>
+                                        <p:attrNameLst>
+                                          <p:attrName>style.visibility</p:attrName>
+                                        </p:attrNameLst>
+                                      </p:cBhvr>
+                                      <p:to>
+                                        <p:strVal val="visible"/>
+                                      </p:to>
+                                    </p:set>
+                                  </p:childTnLst>
+                                </p:cTn>
+                              </p:par>
+                            </p:childTnLst>
+                          </p:cTn>
+                        </p:par>
+                      </p:childTnLst>
+                    </p:cTn>
+                  </p:par>
+                  <p:par>
+                    <p:cTn id="77" fill="hold">
+                      <p:stCondLst>
+                        <p:cond delay="indefinite"/>
+                      </p:stCondLst>
+                      <p:childTnLst>
+                        <p:par>
+                          <p:cTn id="78" fill="hold">
+                            <p:stCondLst>
+                              <p:cond delay="0"/>
+                            </p:stCondLst>
+                            <p:childTnLst>
+                              <p:par>
+                                <p:cTn id="79" presetID="1" presetClass="entr" presetSubtype="0" fill="hold" nodeType="clickEffect">
+                                  <p:stCondLst>
+                                    <p:cond delay="0"/>
+                                  </p:stCondLst>
+                                  <p:childTnLst>
+                                    <p:set>
+                                      <p:cBhvr>
+                                        <p:cTn id="80" dur="1" fill="hold">
+                                          <p:stCondLst>
+                                            <p:cond delay="0"/>
+                                          </p:stCondLst>
+                                        </p:cTn>
+                                        <p:tgtEl>
+                                          <p:spTgt spid="60"/>
                                         </p:tgtEl>
                                         <p:attrNameLst>
                                           <p:attrName>style.visibility</p:attrName>

</xml_diff>

<commit_message>
Version submitted to reppar
</commit_message>
<xml_diff>
--- a/paper/figures/diagrams.pptx
+++ b/paper/figures/diagrams.pptx
@@ -12255,13 +12255,13 @@
               </a:ext>
             </a:extLst>
           </a:blip>
-          <a:srcRect b="58954"/>
+          <a:srcRect t="1" b="-22503"/>
           <a:stretch/>
         </p:blipFill>
         <p:spPr>
           <a:xfrm>
-            <a:off x="25189551" y="15367589"/>
-            <a:ext cx="19824230" cy="10337211"/>
+            <a:off x="27064951" y="15367589"/>
+            <a:ext cx="17948829" cy="30851495"/>
           </a:xfrm>
           <a:prstGeom prst="rect">
             <a:avLst/>

</xml_diff>